<commit_message>
REPORTGEN-39 : update templates for portfolio
REPORTGEN-39 : update templates for portfolio
</commit_message>
<xml_diff>
--- a/CastReporting.Reporting/PortfolioTemplatesFiles/1- Portfolio-Powerpoint-components-library.pptx
+++ b/CastReporting.Reporting/PortfolioTemplatesFiles/1- Portfolio-Powerpoint-components-library.pptx
@@ -134,7 +134,7 @@
   </p:defaultTextStyle>
   <p:extLst>
     <p:ext uri="{EFAFB233-063F-42B5-8137-9DF3F51BA10A}">
-      <p15:sldGuideLst xmlns="" xmlns:p15="http://schemas.microsoft.com/office/powerpoint/2012/main">
+      <p15:sldGuideLst xmlns:p15="http://schemas.microsoft.com/office/powerpoint/2012/main" xmlns="">
         <p15:guide id="1" orient="horz" pos="2160">
           <p15:clr>
             <a:srgbClr val="A4A3A4"/>
@@ -328,11 +328,11 @@
         </c:dLbls>
         <c:gapWidth val="150"/>
         <c:overlap val="100"/>
-        <c:axId val="227149312"/>
-        <c:axId val="227150848"/>
+        <c:axId val="167147776"/>
+        <c:axId val="167149568"/>
       </c:barChart>
       <c:catAx>
-        <c:axId val="227149312"/>
+        <c:axId val="167147776"/>
         <c:scaling>
           <c:orientation val="minMax"/>
         </c:scaling>
@@ -351,7 +351,7 @@
             </a:solidFill>
           </a:ln>
         </c:spPr>
-        <c:crossAx val="227150848"/>
+        <c:crossAx val="167149568"/>
         <c:crosses val="autoZero"/>
         <c:auto val="0"/>
         <c:lblAlgn val="ctr"/>
@@ -359,7 +359,7 @@
         <c:noMultiLvlLbl val="1"/>
       </c:catAx>
       <c:valAx>
-        <c:axId val="227150848"/>
+        <c:axId val="167149568"/>
         <c:scaling>
           <c:orientation val="minMax"/>
         </c:scaling>
@@ -379,7 +379,7 @@
             </a:solidFill>
           </a:ln>
         </c:spPr>
-        <c:crossAx val="227149312"/>
+        <c:crossAx val="167147776"/>
         <c:crosses val="autoZero"/>
         <c:crossBetween val="between"/>
       </c:valAx>
@@ -595,11 +595,11 @@
         </c:dLbls>
         <c:gapWidth val="150"/>
         <c:overlap val="100"/>
-        <c:axId val="227368320"/>
-        <c:axId val="227370112"/>
+        <c:axId val="167408000"/>
+        <c:axId val="167409536"/>
       </c:barChart>
       <c:catAx>
-        <c:axId val="227368320"/>
+        <c:axId val="167408000"/>
         <c:scaling>
           <c:orientation val="minMax"/>
         </c:scaling>
@@ -618,7 +618,7 @@
             </a:solidFill>
           </a:ln>
         </c:spPr>
-        <c:crossAx val="227370112"/>
+        <c:crossAx val="167409536"/>
         <c:crosses val="autoZero"/>
         <c:auto val="0"/>
         <c:lblAlgn val="ctr"/>
@@ -626,7 +626,7 @@
         <c:noMultiLvlLbl val="1"/>
       </c:catAx>
       <c:valAx>
-        <c:axId val="227370112"/>
+        <c:axId val="167409536"/>
         <c:scaling>
           <c:orientation val="minMax"/>
         </c:scaling>
@@ -646,7 +646,7 @@
             </a:solidFill>
           </a:ln>
         </c:spPr>
-        <c:crossAx val="227368320"/>
+        <c:crossAx val="167408000"/>
         <c:crosses val="autoZero"/>
         <c:crossBetween val="between"/>
       </c:valAx>
@@ -1470,8 +1470,8 @@
         <c:bubbleScale val="100"/>
         <c:showNegBubbles val="0"/>
         <c:sizeRepresents val="w"/>
-        <c:axId val="227469184"/>
-        <c:axId val="227491840"/>
+        <c:axId val="167451264"/>
+        <c:axId val="167523072"/>
         <c:extLst>
           <c:ext xmlns:c15="http://schemas.microsoft.com/office/drawing/2012/chart" uri="{02D57815-91ED-43cb-92C2-25804820EDAC}">
             <c15:filteredBubbleSeries>
@@ -1661,7 +1661,7 @@
         </c:extLst>
       </c:bubbleChart>
       <c:valAx>
-        <c:axId val="227469184"/>
+        <c:axId val="167451264"/>
         <c:scaling>
           <c:orientation val="minMax"/>
           <c:max val="4"/>
@@ -1747,13 +1747,13 @@
             <a:endParaRPr lang="en-US"/>
           </a:p>
         </c:txPr>
-        <c:crossAx val="227491840"/>
+        <c:crossAx val="167523072"/>
         <c:crosses val="autoZero"/>
         <c:crossBetween val="midCat"/>
         <c:minorUnit val="0.25"/>
       </c:valAx>
       <c:valAx>
-        <c:axId val="227491840"/>
+        <c:axId val="167523072"/>
         <c:scaling>
           <c:orientation val="minMax"/>
           <c:min val="0"/>
@@ -1838,7 +1838,7 @@
             <a:endParaRPr lang="en-US"/>
           </a:p>
         </c:txPr>
-        <c:crossAx val="227469184"/>
+        <c:crossAx val="167451264"/>
         <c:crosses val="autoZero"/>
         <c:crossBetween val="midCat"/>
       </c:valAx>
@@ -1959,7 +1959,7 @@
           <a:p>
             <a:fld id="{268042A1-6D91-4513-A62D-1E3FD70C84BE}" type="datetimeFigureOut">
               <a:rPr lang="fr-FR" smtClean="0"/>
-              <a:t>30/08/2016</a:t>
+              <a:t>06/09/2016</a:t>
             </a:fld>
             <a:endParaRPr lang="fr-FR"/>
           </a:p>
@@ -2562,7 +2562,7 @@
             <a:fld id="{D8E3BBD6-5DF7-411E-B793-6A3558CCCDCA}" type="datetimeFigureOut">
               <a:rPr lang="fr-FR" smtClean="0"/>
               <a:pPr/>
-              <a:t>30/08/2016</a:t>
+              <a:t>06/09/2016</a:t>
             </a:fld>
             <a:endParaRPr lang="fr-FR" dirty="0"/>
           </a:p>
@@ -2727,7 +2727,7 @@
             <a:fld id="{D8E3BBD6-5DF7-411E-B793-6A3558CCCDCA}" type="datetimeFigureOut">
               <a:rPr lang="fr-FR" smtClean="0"/>
               <a:pPr/>
-              <a:t>30/08/2016</a:t>
+              <a:t>06/09/2016</a:t>
             </a:fld>
             <a:endParaRPr lang="fr-FR" dirty="0"/>
           </a:p>
@@ -4261,7 +4261,7 @@
             <a:fld id="{D8E3BBD6-5DF7-411E-B793-6A3558CCCDCA}" type="datetimeFigureOut">
               <a:rPr lang="fr-FR" smtClean="0"/>
               <a:pPr/>
-              <a:t>30/08/2016</a:t>
+              <a:t>06/09/2016</a:t>
             </a:fld>
             <a:endParaRPr lang="fr-FR" dirty="0"/>
           </a:p>
@@ -6686,7 +6686,7 @@
             <a:fld id="{D8E3BBD6-5DF7-411E-B793-6A3558CCCDCA}" type="datetimeFigureOut">
               <a:rPr lang="fr-FR" smtClean="0"/>
               <a:pPr/>
-              <a:t>30/08/2016</a:t>
+              <a:t>06/09/2016</a:t>
             </a:fld>
             <a:endParaRPr lang="fr-FR" dirty="0"/>
           </a:p>
@@ -9367,7 +9367,7 @@
             <a:fld id="{D8E3BBD6-5DF7-411E-B793-6A3558CCCDCA}" type="datetimeFigureOut">
               <a:rPr lang="fr-FR" smtClean="0"/>
               <a:pPr/>
-              <a:t>30/08/2016</a:t>
+              <a:t>06/09/2016</a:t>
             </a:fld>
             <a:endParaRPr lang="fr-FR" dirty="0"/>
           </a:p>
@@ -12273,7 +12273,7 @@
             <a:fld id="{D8E3BBD6-5DF7-411E-B793-6A3558CCCDCA}" type="datetimeFigureOut">
               <a:rPr lang="fr-FR" smtClean="0"/>
               <a:pPr/>
-              <a:t>30/08/2016</a:t>
+              <a:t>06/09/2016</a:t>
             </a:fld>
             <a:endParaRPr lang="fr-FR" dirty="0"/>
           </a:p>
@@ -14060,7 +14060,7 @@
             <a:fld id="{D8E3BBD6-5DF7-411E-B793-6A3558CCCDCA}" type="datetimeFigureOut">
               <a:rPr lang="fr-FR" smtClean="0"/>
               <a:pPr/>
-              <a:t>30/08/2016</a:t>
+              <a:t>06/09/2016</a:t>
             </a:fld>
             <a:endParaRPr lang="fr-FR" dirty="0"/>
           </a:p>
@@ -14140,7 +14140,7 @@
             <a:fld id="{D8E3BBD6-5DF7-411E-B793-6A3558CCCDCA}" type="datetimeFigureOut">
               <a:rPr lang="fr-FR" smtClean="0"/>
               <a:pPr/>
-              <a:t>30/08/2016</a:t>
+              <a:t>06/09/2016</a:t>
             </a:fld>
             <a:endParaRPr lang="fr-FR" dirty="0"/>
           </a:p>
@@ -14402,7 +14402,7 @@
             <a:fld id="{D8E3BBD6-5DF7-411E-B793-6A3558CCCDCA}" type="datetimeFigureOut">
               <a:rPr lang="fr-FR" smtClean="0"/>
               <a:pPr/>
-              <a:t>30/08/2016</a:t>
+              <a:t>06/09/2016</a:t>
             </a:fld>
             <a:endParaRPr lang="fr-FR" dirty="0"/>
           </a:p>
@@ -14645,7 +14645,7 @@
             <a:fld id="{D8E3BBD6-5DF7-411E-B793-6A3558CCCDCA}" type="datetimeFigureOut">
               <a:rPr lang="fr-FR" smtClean="0"/>
               <a:pPr/>
-              <a:t>30/08/2016</a:t>
+              <a:t>06/09/2016</a:t>
             </a:fld>
             <a:endParaRPr lang="fr-FR" dirty="0"/>
           </a:p>
@@ -14847,7 +14847,7 @@
             <a:fld id="{D8E3BBD6-5DF7-411E-B793-6A3558CCCDCA}" type="datetimeFigureOut">
               <a:rPr lang="fr-FR" smtClean="0"/>
               <a:pPr/>
-              <a:t>30/08/2016</a:t>
+              <a:t>06/09/2016</a:t>
             </a:fld>
             <a:endParaRPr lang="fr-FR" dirty="0"/>
           </a:p>
@@ -22995,7 +22995,7 @@
         <p:spPr>
           <a:xfrm>
             <a:off x="251520" y="908720"/>
-            <a:ext cx="8399280" cy="5256584"/>
+            <a:ext cx="8399280" cy="5472608"/>
           </a:xfrm>
           <a:prstGeom prst="roundRect">
             <a:avLst>
@@ -23047,7 +23047,7 @@
         </p:nvSpPr>
         <p:spPr>
           <a:xfrm>
-            <a:off x="251520" y="1052736"/>
+            <a:off x="251520" y="980728"/>
             <a:ext cx="8143200" cy="369332"/>
           </a:xfrm>
           <a:prstGeom prst="rect">
@@ -23076,12 +23076,16 @@
           </a:lstStyle>
           <a:p>
             <a:r>
+              <a:rPr lang="en-US" sz="1800" dirty="0" smtClean="0"/>
+              <a:t>TQI </a:t>
+            </a:r>
+            <a:r>
               <a:rPr lang="en-US" sz="1800" dirty="0"/>
-              <a:t>Total Quality Score by Critical </a:t>
+              <a:t>Score by Critical </a:t>
             </a:r>
             <a:r>
               <a:rPr lang="en-US" sz="1800" dirty="0" smtClean="0"/>
-              <a:t>Violations/LoC</a:t>
+              <a:t>Violations/LoC by AFP</a:t>
             </a:r>
             <a:endParaRPr lang="en-US" sz="1800" dirty="0"/>
           </a:p>
@@ -23095,8 +23099,8 @@
         </p:nvSpPr>
         <p:spPr>
           <a:xfrm>
-            <a:off x="1973914" y="1412776"/>
-            <a:ext cx="6630534" cy="369332"/>
+            <a:off x="1973914" y="1340768"/>
+            <a:ext cx="2670094" cy="369332"/>
           </a:xfrm>
           <a:prstGeom prst="rect">
             <a:avLst/>
@@ -23136,7 +23140,7 @@
         </p:nvSpPr>
         <p:spPr>
           <a:xfrm>
-            <a:off x="496294" y="1412776"/>
+            <a:off x="494884" y="1340768"/>
             <a:ext cx="1556836" cy="369332"/>
           </a:xfrm>
           <a:prstGeom prst="rect">
@@ -23178,7 +23182,7 @@
         </p:nvSpPr>
         <p:spPr>
           <a:xfrm>
-            <a:off x="1252911" y="1800986"/>
+            <a:off x="1252911" y="1907540"/>
             <a:ext cx="800219" cy="369332"/>
           </a:xfrm>
           <a:prstGeom prst="rect">
@@ -23225,13 +23229,13 @@
           <p:nvPr>
             <p:extLst>
               <p:ext uri="{D42A27DB-BD31-4B8C-83A1-F6EECF244321}">
-                <p14:modId xmlns:p14="http://schemas.microsoft.com/office/powerpoint/2010/main" val="4216672882"/>
+                <p14:modId xmlns:p14="http://schemas.microsoft.com/office/powerpoint/2010/main" val="4023650552"/>
               </p:ext>
             </p:extLst>
           </p:nvPr>
         </p:nvGraphicFramePr>
         <p:xfrm>
-          <a:off x="827584" y="2156309"/>
+          <a:off x="827584" y="2348880"/>
           <a:ext cx="6696744" cy="4176464"/>
         </p:xfrm>
         <a:graphic>
@@ -23248,7 +23252,7 @@
         </p:nvSpPr>
         <p:spPr>
           <a:xfrm>
-            <a:off x="2020266" y="1798943"/>
+            <a:off x="1979712" y="1907540"/>
             <a:ext cx="6630534" cy="369332"/>
           </a:xfrm>
           <a:prstGeom prst="rect">
@@ -23291,8 +23295,8 @@
         </p:nvSpPr>
         <p:spPr>
           <a:xfrm>
-            <a:off x="4572000" y="1421485"/>
-            <a:ext cx="4032448" cy="369332"/>
+            <a:off x="5289181" y="908720"/>
+            <a:ext cx="3528392" cy="1077218"/>
           </a:xfrm>
           <a:prstGeom prst="rect">
             <a:avLst/>
@@ -23319,7 +23323,7 @@
           </a:lstStyle>
           <a:p>
             <a:r>
-              <a:rPr lang="en-US" b="1" dirty="0" smtClean="0">
+              <a:rPr lang="en-US" sz="1600" i="0" dirty="0" smtClean="0">
                 <a:solidFill>
                   <a:srgbClr val="FF0000"/>
                 </a:solidFill>
@@ -23327,7 +23331,7 @@
               <a:t>Only working with </a:t>
             </a:r>
             <a:r>
-              <a:rPr lang="en-US" b="1" u="sng" dirty="0" err="1" smtClean="0">
+              <a:rPr lang="en-US" sz="1600" i="0" dirty="0" err="1" smtClean="0">
                 <a:solidFill>
                   <a:srgbClr val="FF0000"/>
                 </a:solidFill>
@@ -23335,14 +23339,38 @@
               <a:t>Powerpoint</a:t>
             </a:r>
             <a:r>
-              <a:rPr lang="en-US" b="1" u="sng" dirty="0" smtClean="0">
+              <a:rPr lang="en-US" sz="1600" i="0" dirty="0" smtClean="0">
                 <a:solidFill>
                   <a:srgbClr val="FF0000"/>
                 </a:solidFill>
               </a:rPr>
-              <a:t> 2013</a:t>
-            </a:r>
-            <a:endParaRPr lang="en-US" b="1" u="sng" dirty="0">
+              <a:t> </a:t>
+            </a:r>
+            <a:r>
+              <a:rPr lang="en-US" sz="1600" i="0" dirty="0" smtClean="0">
+                <a:solidFill>
+                  <a:srgbClr val="FF0000"/>
+                </a:solidFill>
+              </a:rPr>
+              <a:t>2013, after report generated, need to edit data in </a:t>
+            </a:r>
+            <a:r>
+              <a:rPr lang="en-US" sz="1600" i="0" dirty="0" err="1" smtClean="0">
+                <a:solidFill>
+                  <a:srgbClr val="FF0000"/>
+                </a:solidFill>
+              </a:rPr>
+              <a:t>exel</a:t>
+            </a:r>
+            <a:r>
+              <a:rPr lang="en-US" sz="1600" i="0" dirty="0" smtClean="0">
+                <a:solidFill>
+                  <a:srgbClr val="FF0000"/>
+                </a:solidFill>
+              </a:rPr>
+              <a:t> to get label of applications updated into the graph</a:t>
+            </a:r>
+            <a:endParaRPr lang="en-US" sz="1600" i="0" dirty="0">
               <a:solidFill>
                 <a:srgbClr val="FF0000"/>
               </a:solidFill>
@@ -23880,14 +23908,14 @@
       </p:sp>
       <p:graphicFrame>
         <p:nvGraphicFramePr>
-          <p:cNvPr id="10" name="Table 9" descr="TABLE;PF_TOP_RISKIEST_APPS;COUNT=13;ALT=60017"/>
+          <p:cNvPr id="10" name="Table 9" descr="TABLE;PF_TOP_RISKIEST_APPS;COUNT=5;ALT=60017"/>
           <p:cNvGraphicFramePr>
             <a:graphicFrameLocks noGrp="1"/>
           </p:cNvGraphicFramePr>
           <p:nvPr>
             <p:extLst>
               <p:ext uri="{D42A27DB-BD31-4B8C-83A1-F6EECF244321}">
-                <p14:modId xmlns:p14="http://schemas.microsoft.com/office/powerpoint/2010/main" val="3040957299"/>
+                <p14:modId xmlns:p14="http://schemas.microsoft.com/office/powerpoint/2010/main" val="4037980700"/>
               </p:ext>
             </p:extLst>
           </p:nvPr>
@@ -27447,27 +27475,7 @@
                   </a:schemeClr>
                 </a:solidFill>
               </a:rPr>
-              <a:t>SLA </a:t>
-            </a:r>
-            <a:r>
-              <a:rPr lang="en-US" sz="1100" b="1" dirty="0" smtClean="0">
-                <a:solidFill>
-                  <a:schemeClr val="bg1">
-                    <a:lumMod val="50000"/>
-                  </a:schemeClr>
-                </a:solidFill>
-              </a:rPr>
-              <a:t>Assessment </a:t>
-            </a:r>
-            <a:r>
-              <a:rPr lang="en-US" sz="1100" b="1" dirty="0" smtClean="0">
-                <a:solidFill>
-                  <a:schemeClr val="bg1">
-                    <a:lumMod val="50000"/>
-                  </a:schemeClr>
-                </a:solidFill>
-              </a:rPr>
-              <a:t>thresholds</a:t>
+              <a:t>SLA Assessment thresholds</a:t>
             </a:r>
           </a:p>
           <a:p>
@@ -27528,27 +27536,7 @@
                   </a:schemeClr>
                 </a:solidFill>
               </a:rPr>
-              <a:t>: </a:t>
-            </a:r>
-            <a:r>
-              <a:rPr lang="en-US" sz="1100" dirty="0" smtClean="0">
-                <a:solidFill>
-                  <a:schemeClr val="bg1">
-                    <a:lumMod val="50000"/>
-                  </a:schemeClr>
-                </a:solidFill>
-              </a:rPr>
-              <a:t>average score using latest snapshot </a:t>
-            </a:r>
-            <a:r>
-              <a:rPr lang="en-US" sz="1100" dirty="0" smtClean="0">
-                <a:solidFill>
-                  <a:schemeClr val="bg1">
-                    <a:lumMod val="50000"/>
-                  </a:schemeClr>
-                </a:solidFill>
-              </a:rPr>
-              <a:t>data (even if snapshot date is before current quarter</a:t>
+              <a:t>: average score using latest snapshot data (even if snapshot date is before current quarter</a:t>
             </a:r>
           </a:p>
           <a:p>

</xml_diff>

<commit_message>
REPORTGEN-39 : update portfolio templates
REPORTGEN-39 : update portfolio templates
</commit_message>
<xml_diff>
--- a/CastReporting.Reporting/PortfolioTemplatesFiles/1- Portfolio-Powerpoint-components-library.pptx
+++ b/CastReporting.Reporting/PortfolioTemplatesFiles/1- Portfolio-Powerpoint-components-library.pptx
@@ -134,7 +134,7 @@
   </p:defaultTextStyle>
   <p:extLst>
     <p:ext uri="{EFAFB233-063F-42B5-8137-9DF3F51BA10A}">
-      <p15:sldGuideLst xmlns:p15="http://schemas.microsoft.com/office/powerpoint/2012/main" xmlns="">
+      <p15:sldGuideLst xmlns="" xmlns:p15="http://schemas.microsoft.com/office/powerpoint/2012/main">
         <p15:guide id="1" orient="horz" pos="2160">
           <p15:clr>
             <a:srgbClr val="A4A3A4"/>
@@ -328,11 +328,11 @@
         </c:dLbls>
         <c:gapWidth val="150"/>
         <c:overlap val="100"/>
-        <c:axId val="167147776"/>
-        <c:axId val="167149568"/>
+        <c:axId val="154912640"/>
+        <c:axId val="154914176"/>
       </c:barChart>
       <c:catAx>
-        <c:axId val="167147776"/>
+        <c:axId val="154912640"/>
         <c:scaling>
           <c:orientation val="minMax"/>
         </c:scaling>
@@ -351,7 +351,7 @@
             </a:solidFill>
           </a:ln>
         </c:spPr>
-        <c:crossAx val="167149568"/>
+        <c:crossAx val="154914176"/>
         <c:crosses val="autoZero"/>
         <c:auto val="0"/>
         <c:lblAlgn val="ctr"/>
@@ -359,7 +359,7 @@
         <c:noMultiLvlLbl val="1"/>
       </c:catAx>
       <c:valAx>
-        <c:axId val="167149568"/>
+        <c:axId val="154914176"/>
         <c:scaling>
           <c:orientation val="minMax"/>
         </c:scaling>
@@ -379,7 +379,7 @@
             </a:solidFill>
           </a:ln>
         </c:spPr>
-        <c:crossAx val="167147776"/>
+        <c:crossAx val="154912640"/>
         <c:crosses val="autoZero"/>
         <c:crossBetween val="between"/>
       </c:valAx>
@@ -595,11 +595,11 @@
         </c:dLbls>
         <c:gapWidth val="150"/>
         <c:overlap val="100"/>
-        <c:axId val="167408000"/>
-        <c:axId val="167409536"/>
+        <c:axId val="155336704"/>
+        <c:axId val="155338240"/>
       </c:barChart>
       <c:catAx>
-        <c:axId val="167408000"/>
+        <c:axId val="155336704"/>
         <c:scaling>
           <c:orientation val="minMax"/>
         </c:scaling>
@@ -618,7 +618,7 @@
             </a:solidFill>
           </a:ln>
         </c:spPr>
-        <c:crossAx val="167409536"/>
+        <c:crossAx val="155338240"/>
         <c:crosses val="autoZero"/>
         <c:auto val="0"/>
         <c:lblAlgn val="ctr"/>
@@ -626,7 +626,7 @@
         <c:noMultiLvlLbl val="1"/>
       </c:catAx>
       <c:valAx>
-        <c:axId val="167409536"/>
+        <c:axId val="155338240"/>
         <c:scaling>
           <c:orientation val="minMax"/>
         </c:scaling>
@@ -646,7 +646,7 @@
             </a:solidFill>
           </a:ln>
         </c:spPr>
-        <c:crossAx val="167408000"/>
+        <c:crossAx val="155336704"/>
         <c:crosses val="autoZero"/>
         <c:crossBetween val="between"/>
       </c:valAx>
@@ -1470,8 +1470,8 @@
         <c:bubbleScale val="100"/>
         <c:showNegBubbles val="0"/>
         <c:sizeRepresents val="w"/>
-        <c:axId val="167451264"/>
-        <c:axId val="167523072"/>
+        <c:axId val="155928832"/>
+        <c:axId val="155931008"/>
         <c:extLst>
           <c:ext xmlns:c15="http://schemas.microsoft.com/office/drawing/2012/chart" uri="{02D57815-91ED-43cb-92C2-25804820EDAC}">
             <c15:filteredBubbleSeries>
@@ -1661,7 +1661,7 @@
         </c:extLst>
       </c:bubbleChart>
       <c:valAx>
-        <c:axId val="167451264"/>
+        <c:axId val="155928832"/>
         <c:scaling>
           <c:orientation val="minMax"/>
           <c:max val="4"/>
@@ -1747,13 +1747,13 @@
             <a:endParaRPr lang="en-US"/>
           </a:p>
         </c:txPr>
-        <c:crossAx val="167523072"/>
+        <c:crossAx val="155931008"/>
         <c:crosses val="autoZero"/>
         <c:crossBetween val="midCat"/>
         <c:minorUnit val="0.25"/>
       </c:valAx>
       <c:valAx>
-        <c:axId val="167523072"/>
+        <c:axId val="155931008"/>
         <c:scaling>
           <c:orientation val="minMax"/>
           <c:min val="0"/>
@@ -1838,7 +1838,7 @@
             <a:endParaRPr lang="en-US"/>
           </a:p>
         </c:txPr>
-        <c:crossAx val="167451264"/>
+        <c:crossAx val="155928832"/>
         <c:crosses val="autoZero"/>
         <c:crossBetween val="midCat"/>
       </c:valAx>
@@ -1959,7 +1959,7 @@
           <a:p>
             <a:fld id="{268042A1-6D91-4513-A62D-1E3FD70C84BE}" type="datetimeFigureOut">
               <a:rPr lang="fr-FR" smtClean="0"/>
-              <a:t>06/09/2016</a:t>
+              <a:t>08/09/2016</a:t>
             </a:fld>
             <a:endParaRPr lang="fr-FR"/>
           </a:p>
@@ -2562,7 +2562,7 @@
             <a:fld id="{D8E3BBD6-5DF7-411E-B793-6A3558CCCDCA}" type="datetimeFigureOut">
               <a:rPr lang="fr-FR" smtClean="0"/>
               <a:pPr/>
-              <a:t>06/09/2016</a:t>
+              <a:t>08/09/2016</a:t>
             </a:fld>
             <a:endParaRPr lang="fr-FR" dirty="0"/>
           </a:p>
@@ -2727,7 +2727,7 @@
             <a:fld id="{D8E3BBD6-5DF7-411E-B793-6A3558CCCDCA}" type="datetimeFigureOut">
               <a:rPr lang="fr-FR" smtClean="0"/>
               <a:pPr/>
-              <a:t>06/09/2016</a:t>
+              <a:t>08/09/2016</a:t>
             </a:fld>
             <a:endParaRPr lang="fr-FR" dirty="0"/>
           </a:p>
@@ -4261,7 +4261,7 @@
             <a:fld id="{D8E3BBD6-5DF7-411E-B793-6A3558CCCDCA}" type="datetimeFigureOut">
               <a:rPr lang="fr-FR" smtClean="0"/>
               <a:pPr/>
-              <a:t>06/09/2016</a:t>
+              <a:t>08/09/2016</a:t>
             </a:fld>
             <a:endParaRPr lang="fr-FR" dirty="0"/>
           </a:p>
@@ -6686,7 +6686,7 @@
             <a:fld id="{D8E3BBD6-5DF7-411E-B793-6A3558CCCDCA}" type="datetimeFigureOut">
               <a:rPr lang="fr-FR" smtClean="0"/>
               <a:pPr/>
-              <a:t>06/09/2016</a:t>
+              <a:t>08/09/2016</a:t>
             </a:fld>
             <a:endParaRPr lang="fr-FR" dirty="0"/>
           </a:p>
@@ -9367,7 +9367,7 @@
             <a:fld id="{D8E3BBD6-5DF7-411E-B793-6A3558CCCDCA}" type="datetimeFigureOut">
               <a:rPr lang="fr-FR" smtClean="0"/>
               <a:pPr/>
-              <a:t>06/09/2016</a:t>
+              <a:t>08/09/2016</a:t>
             </a:fld>
             <a:endParaRPr lang="fr-FR" dirty="0"/>
           </a:p>
@@ -12273,7 +12273,7 @@
             <a:fld id="{D8E3BBD6-5DF7-411E-B793-6A3558CCCDCA}" type="datetimeFigureOut">
               <a:rPr lang="fr-FR" smtClean="0"/>
               <a:pPr/>
-              <a:t>06/09/2016</a:t>
+              <a:t>08/09/2016</a:t>
             </a:fld>
             <a:endParaRPr lang="fr-FR" dirty="0"/>
           </a:p>
@@ -14060,7 +14060,7 @@
             <a:fld id="{D8E3BBD6-5DF7-411E-B793-6A3558CCCDCA}" type="datetimeFigureOut">
               <a:rPr lang="fr-FR" smtClean="0"/>
               <a:pPr/>
-              <a:t>06/09/2016</a:t>
+              <a:t>08/09/2016</a:t>
             </a:fld>
             <a:endParaRPr lang="fr-FR" dirty="0"/>
           </a:p>
@@ -14140,7 +14140,7 @@
             <a:fld id="{D8E3BBD6-5DF7-411E-B793-6A3558CCCDCA}" type="datetimeFigureOut">
               <a:rPr lang="fr-FR" smtClean="0"/>
               <a:pPr/>
-              <a:t>06/09/2016</a:t>
+              <a:t>08/09/2016</a:t>
             </a:fld>
             <a:endParaRPr lang="fr-FR" dirty="0"/>
           </a:p>
@@ -14402,7 +14402,7 @@
             <a:fld id="{D8E3BBD6-5DF7-411E-B793-6A3558CCCDCA}" type="datetimeFigureOut">
               <a:rPr lang="fr-FR" smtClean="0"/>
               <a:pPr/>
-              <a:t>06/09/2016</a:t>
+              <a:t>08/09/2016</a:t>
             </a:fld>
             <a:endParaRPr lang="fr-FR" dirty="0"/>
           </a:p>
@@ -14645,7 +14645,7 @@
             <a:fld id="{D8E3BBD6-5DF7-411E-B793-6A3558CCCDCA}" type="datetimeFigureOut">
               <a:rPr lang="fr-FR" smtClean="0"/>
               <a:pPr/>
-              <a:t>06/09/2016</a:t>
+              <a:t>08/09/2016</a:t>
             </a:fld>
             <a:endParaRPr lang="fr-FR" dirty="0"/>
           </a:p>
@@ -14847,7 +14847,7 @@
             <a:fld id="{D8E3BBD6-5DF7-411E-B793-6A3558CCCDCA}" type="datetimeFigureOut">
               <a:rPr lang="fr-FR" smtClean="0"/>
               <a:pPr/>
-              <a:t>06/09/2016</a:t>
+              <a:t>08/09/2016</a:t>
             </a:fld>
             <a:endParaRPr lang="fr-FR" dirty="0"/>
           </a:p>
@@ -23344,15 +23344,7 @@
                   <a:srgbClr val="FF0000"/>
                 </a:solidFill>
               </a:rPr>
-              <a:t> </a:t>
-            </a:r>
-            <a:r>
-              <a:rPr lang="en-US" sz="1600" i="0" dirty="0" smtClean="0">
-                <a:solidFill>
-                  <a:srgbClr val="FF0000"/>
-                </a:solidFill>
-              </a:rPr>
-              <a:t>2013, after report generated, need to edit data in </a:t>
+              <a:t> 2013, after report generated, need to edit data in </a:t>
             </a:r>
             <a:r>
               <a:rPr lang="en-US" sz="1600" i="0" dirty="0" err="1" smtClean="0">
@@ -25870,7 +25862,7 @@
           <p:nvPr>
             <p:extLst>
               <p:ext uri="{D42A27DB-BD31-4B8C-83A1-F6EECF244321}">
-                <p14:modId xmlns:p14="http://schemas.microsoft.com/office/powerpoint/2010/main" val="1821160741"/>
+                <p14:modId xmlns:p14="http://schemas.microsoft.com/office/powerpoint/2010/main" val="2044810906"/>
               </p:ext>
             </p:extLst>
           </p:nvPr>
@@ -26011,21 +26003,17 @@
                         </a:rPr>
                         <a:t>Target</a:t>
                       </a:r>
-                    </a:p>
-                    <a:p>
-                      <a:pPr algn="ctr">
-                        <a:lnSpc>
-                          <a:spcPct val="115000"/>
-                        </a:lnSpc>
-                        <a:spcAft>
-                          <a:spcPts val="0"/>
-                        </a:spcAft>
-                      </a:pPr>
+                      <a:r>
+                        <a:rPr lang="en-US" sz="1100" kern="1200" baseline="0" dirty="0" smtClean="0">
+                          <a:effectLst/>
+                        </a:rPr>
+                        <a:t> s</a:t>
+                      </a:r>
                       <a:r>
                         <a:rPr lang="en-US" sz="1100" kern="1200" dirty="0" smtClean="0">
                           <a:effectLst/>
                         </a:rPr>
-                        <a:t>Score</a:t>
+                        <a:t>core</a:t>
                       </a:r>
                       <a:endParaRPr lang="en-IN" sz="1100" kern="1200" dirty="0">
                         <a:solidFill>

</xml_diff>

<commit_message>
REPORTGEN-40 : Update the word, ppt and excel templates
</commit_message>
<xml_diff>
--- a/CastReporting.Reporting/PortfolioTemplatesFiles/1- Portfolio-Powerpoint-components-library.pptx
+++ b/CastReporting.Reporting/PortfolioTemplatesFiles/1- Portfolio-Powerpoint-components-library.pptx
@@ -10,7 +10,7 @@
     <p:sldMasterId id="2147483713" r:id="rId6"/>
   </p:sldMasterIdLst>
   <p:notesMasterIdLst>
-    <p:notesMasterId r:id="rId29"/>
+    <p:notesMasterId r:id="rId30"/>
   </p:notesMasterIdLst>
   <p:sldIdLst>
     <p:sldId id="262" r:id="rId7"/>
@@ -24,17 +24,18 @@
     <p:sldId id="271" r:id="rId15"/>
     <p:sldId id="321" r:id="rId16"/>
     <p:sldId id="324" r:id="rId17"/>
-    <p:sldId id="295" r:id="rId18"/>
-    <p:sldId id="276" r:id="rId19"/>
-    <p:sldId id="279" r:id="rId20"/>
-    <p:sldId id="331" r:id="rId21"/>
-    <p:sldId id="297" r:id="rId22"/>
-    <p:sldId id="294" r:id="rId23"/>
-    <p:sldId id="280" r:id="rId24"/>
-    <p:sldId id="332" r:id="rId25"/>
-    <p:sldId id="303" r:id="rId26"/>
-    <p:sldId id="333" r:id="rId27"/>
-    <p:sldId id="318" r:id="rId28"/>
+    <p:sldId id="334" r:id="rId18"/>
+    <p:sldId id="295" r:id="rId19"/>
+    <p:sldId id="276" r:id="rId20"/>
+    <p:sldId id="279" r:id="rId21"/>
+    <p:sldId id="331" r:id="rId22"/>
+    <p:sldId id="297" r:id="rId23"/>
+    <p:sldId id="294" r:id="rId24"/>
+    <p:sldId id="280" r:id="rId25"/>
+    <p:sldId id="332" r:id="rId26"/>
+    <p:sldId id="303" r:id="rId27"/>
+    <p:sldId id="333" r:id="rId28"/>
+    <p:sldId id="318" r:id="rId29"/>
   </p:sldIdLst>
   <p:sldSz cx="9144000" cy="6858000" type="screen4x3"/>
   <p:notesSz cx="6858000" cy="9144000"/>
@@ -135,7 +136,7 @@
   </p:defaultTextStyle>
   <p:extLst>
     <p:ext uri="{EFAFB233-063F-42B5-8137-9DF3F51BA10A}">
-      <p15:sldGuideLst xmlns:p15="http://schemas.microsoft.com/office/powerpoint/2012/main" xmlns="">
+      <p15:sldGuideLst xmlns:p15="http://schemas.microsoft.com/office/powerpoint/2012/main">
         <p15:guide id="1" orient="horz" pos="2160">
           <p15:clr>
             <a:srgbClr val="A4A3A4"/>
@@ -329,11 +330,11 @@
         </c:dLbls>
         <c:gapWidth val="150"/>
         <c:overlap val="100"/>
-        <c:axId val="189446016"/>
-        <c:axId val="189447552"/>
+        <c:axId val="348383072"/>
+        <c:axId val="348385032"/>
       </c:barChart>
       <c:catAx>
-        <c:axId val="189446016"/>
+        <c:axId val="348383072"/>
         <c:scaling>
           <c:orientation val="minMax"/>
         </c:scaling>
@@ -352,7 +353,7 @@
             </a:solidFill>
           </a:ln>
         </c:spPr>
-        <c:crossAx val="189447552"/>
+        <c:crossAx val="348385032"/>
         <c:crosses val="autoZero"/>
         <c:auto val="0"/>
         <c:lblAlgn val="ctr"/>
@@ -360,7 +361,7 @@
         <c:noMultiLvlLbl val="1"/>
       </c:catAx>
       <c:valAx>
-        <c:axId val="189447552"/>
+        <c:axId val="348385032"/>
         <c:scaling>
           <c:orientation val="minMax"/>
         </c:scaling>
@@ -380,7 +381,7 @@
             </a:solidFill>
           </a:ln>
         </c:spPr>
-        <c:crossAx val="189446016"/>
+        <c:crossAx val="348383072"/>
         <c:crosses val="autoZero"/>
         <c:crossBetween val="between"/>
       </c:valAx>
@@ -596,11 +597,11 @@
         </c:dLbls>
         <c:gapWidth val="150"/>
         <c:overlap val="100"/>
-        <c:axId val="189513728"/>
-        <c:axId val="189515264"/>
+        <c:axId val="348384248"/>
+        <c:axId val="236237000"/>
       </c:barChart>
       <c:catAx>
-        <c:axId val="189513728"/>
+        <c:axId val="348384248"/>
         <c:scaling>
           <c:orientation val="minMax"/>
         </c:scaling>
@@ -619,7 +620,7 @@
             </a:solidFill>
           </a:ln>
         </c:spPr>
-        <c:crossAx val="189515264"/>
+        <c:crossAx val="236237000"/>
         <c:crosses val="autoZero"/>
         <c:auto val="0"/>
         <c:lblAlgn val="ctr"/>
@@ -627,7 +628,7 @@
         <c:noMultiLvlLbl val="1"/>
       </c:catAx>
       <c:valAx>
-        <c:axId val="189515264"/>
+        <c:axId val="236237000"/>
         <c:scaling>
           <c:orientation val="minMax"/>
         </c:scaling>
@@ -647,7 +648,7 @@
             </a:solidFill>
           </a:ln>
         </c:spPr>
-        <c:crossAx val="189513728"/>
+        <c:crossAx val="348384248"/>
         <c:crosses val="autoZero"/>
         <c:crossBetween val="between"/>
       </c:valAx>
@@ -737,7 +738,6 @@
           <c:dLbls>
             <c:dLbl>
               <c:idx val="0"/>
-              <c:layout/>
               <c:tx>
                 <c:rich>
                   <a:bodyPr/>
@@ -765,16 +765,13 @@
               <c:showBubbleSize val="0"/>
               <c:extLst>
                 <c:ext xmlns:c15="http://schemas.microsoft.com/office/drawing/2012/chart" uri="{CE6537A1-D6FC-4f65-9D91-7224C49458BB}">
-                  <c15:layout/>
                   <c15:dlblFieldTable/>
-                  <c15:xForSave val="1"/>
                   <c15:showDataLabelsRange val="1"/>
                 </c:ext>
               </c:extLst>
             </c:dLbl>
             <c:dLbl>
               <c:idx val="1"/>
-              <c:layout/>
               <c:tx>
                 <c:rich>
                   <a:bodyPr/>
@@ -802,16 +799,13 @@
               <c:showBubbleSize val="0"/>
               <c:extLst>
                 <c:ext xmlns:c15="http://schemas.microsoft.com/office/drawing/2012/chart" uri="{CE6537A1-D6FC-4f65-9D91-7224C49458BB}">
-                  <c15:layout/>
                   <c15:dlblFieldTable/>
-                  <c15:xForSave val="1"/>
                   <c15:showDataLabelsRange val="1"/>
                 </c:ext>
               </c:extLst>
             </c:dLbl>
             <c:dLbl>
               <c:idx val="2"/>
-              <c:layout/>
               <c:tx>
                 <c:rich>
                   <a:bodyPr/>
@@ -839,16 +833,13 @@
               <c:showBubbleSize val="0"/>
               <c:extLst>
                 <c:ext xmlns:c15="http://schemas.microsoft.com/office/drawing/2012/chart" uri="{CE6537A1-D6FC-4f65-9D91-7224C49458BB}">
-                  <c15:layout/>
                   <c15:dlblFieldTable/>
-                  <c15:xForSave val="1"/>
                   <c15:showDataLabelsRange val="1"/>
                 </c:ext>
               </c:extLst>
             </c:dLbl>
             <c:dLbl>
               <c:idx val="3"/>
-              <c:layout/>
               <c:tx>
                 <c:rich>
                   <a:bodyPr/>
@@ -876,16 +867,13 @@
               <c:showBubbleSize val="0"/>
               <c:extLst>
                 <c:ext xmlns:c15="http://schemas.microsoft.com/office/drawing/2012/chart" uri="{CE6537A1-D6FC-4f65-9D91-7224C49458BB}">
-                  <c15:layout/>
                   <c15:dlblFieldTable/>
-                  <c15:xForSave val="1"/>
                   <c15:showDataLabelsRange val="1"/>
                 </c:ext>
               </c:extLst>
             </c:dLbl>
             <c:dLbl>
               <c:idx val="4"/>
-              <c:layout/>
               <c:tx>
                 <c:rich>
                   <a:bodyPr/>
@@ -913,16 +901,13 @@
               <c:showBubbleSize val="0"/>
               <c:extLst>
                 <c:ext xmlns:c15="http://schemas.microsoft.com/office/drawing/2012/chart" uri="{CE6537A1-D6FC-4f65-9D91-7224C49458BB}">
-                  <c15:layout/>
                   <c15:dlblFieldTable/>
-                  <c15:xForSave val="1"/>
                   <c15:showDataLabelsRange val="1"/>
                 </c:ext>
               </c:extLst>
             </c:dLbl>
             <c:dLbl>
               <c:idx val="5"/>
-              <c:layout/>
               <c:tx>
                 <c:rich>
                   <a:bodyPr/>
@@ -950,16 +935,13 @@
               <c:showBubbleSize val="0"/>
               <c:extLst>
                 <c:ext xmlns:c15="http://schemas.microsoft.com/office/drawing/2012/chart" uri="{CE6537A1-D6FC-4f65-9D91-7224C49458BB}">
-                  <c15:layout/>
                   <c15:dlblFieldTable/>
-                  <c15:xForSave val="1"/>
                   <c15:showDataLabelsRange val="1"/>
                 </c:ext>
               </c:extLst>
             </c:dLbl>
             <c:dLbl>
               <c:idx val="6"/>
-              <c:layout/>
               <c:tx>
                 <c:rich>
                   <a:bodyPr/>
@@ -987,16 +969,13 @@
               <c:showBubbleSize val="0"/>
               <c:extLst>
                 <c:ext xmlns:c15="http://schemas.microsoft.com/office/drawing/2012/chart" uri="{CE6537A1-D6FC-4f65-9D91-7224C49458BB}">
-                  <c15:layout/>
                   <c15:dlblFieldTable/>
-                  <c15:xForSave val="1"/>
                   <c15:showDataLabelsRange val="1"/>
                 </c:ext>
               </c:extLst>
             </c:dLbl>
             <c:dLbl>
               <c:idx val="7"/>
-              <c:layout/>
               <c:tx>
                 <c:rich>
                   <a:bodyPr/>
@@ -1024,16 +1003,13 @@
               <c:showBubbleSize val="0"/>
               <c:extLst>
                 <c:ext xmlns:c15="http://schemas.microsoft.com/office/drawing/2012/chart" uri="{CE6537A1-D6FC-4f65-9D91-7224C49458BB}">
-                  <c15:layout/>
                   <c15:dlblFieldTable/>
-                  <c15:xForSave val="1"/>
                   <c15:showDataLabelsRange val="1"/>
                 </c:ext>
               </c:extLst>
             </c:dLbl>
             <c:dLbl>
               <c:idx val="8"/>
-              <c:layout/>
               <c:tx>
                 <c:rich>
                   <a:bodyPr/>
@@ -1061,16 +1037,13 @@
               <c:showBubbleSize val="0"/>
               <c:extLst>
                 <c:ext xmlns:c15="http://schemas.microsoft.com/office/drawing/2012/chart" uri="{CE6537A1-D6FC-4f65-9D91-7224C49458BB}">
-                  <c15:layout/>
                   <c15:dlblFieldTable/>
-                  <c15:xForSave val="1"/>
                   <c15:showDataLabelsRange val="1"/>
                 </c:ext>
               </c:extLst>
             </c:dLbl>
             <c:dLbl>
               <c:idx val="9"/>
-              <c:layout/>
               <c:tx>
                 <c:rich>
                   <a:bodyPr/>
@@ -1098,16 +1071,13 @@
               <c:showBubbleSize val="0"/>
               <c:extLst>
                 <c:ext xmlns:c15="http://schemas.microsoft.com/office/drawing/2012/chart" uri="{CE6537A1-D6FC-4f65-9D91-7224C49458BB}">
-                  <c15:layout/>
                   <c15:dlblFieldTable/>
-                  <c15:xForSave val="1"/>
                   <c15:showDataLabelsRange val="1"/>
                 </c:ext>
               </c:extLst>
             </c:dLbl>
             <c:dLbl>
               <c:idx val="10"/>
-              <c:layout/>
               <c:tx>
                 <c:rich>
                   <a:bodyPr/>
@@ -1135,16 +1105,13 @@
               <c:showBubbleSize val="0"/>
               <c:extLst>
                 <c:ext xmlns:c15="http://schemas.microsoft.com/office/drawing/2012/chart" uri="{CE6537A1-D6FC-4f65-9D91-7224C49458BB}">
-                  <c15:layout/>
                   <c15:dlblFieldTable/>
-                  <c15:xForSave val="1"/>
                   <c15:showDataLabelsRange val="1"/>
                 </c:ext>
               </c:extLst>
             </c:dLbl>
             <c:dLbl>
               <c:idx val="11"/>
-              <c:layout/>
               <c:tx>
                 <c:rich>
                   <a:bodyPr/>
@@ -1159,7 +1126,7 @@
                       <a:pPr/>
                       <a:t>[CELLRANGE]</a:t>
                     </a:fld>
-                    <a:endParaRPr lang="en-US" dirty="0"/>
+                    <a:endParaRPr lang="en-US"/>
                   </a:p>
                 </c:rich>
               </c:tx>
@@ -1172,16 +1139,13 @@
               <c:showBubbleSize val="0"/>
               <c:extLst>
                 <c:ext xmlns:c15="http://schemas.microsoft.com/office/drawing/2012/chart" uri="{CE6537A1-D6FC-4f65-9D91-7224C49458BB}">
-                  <c15:layout/>
                   <c15:dlblFieldTable/>
-                  <c15:xForSave val="1"/>
                   <c15:showDataLabelsRange val="1"/>
                 </c:ext>
               </c:extLst>
             </c:dLbl>
             <c:dLbl>
               <c:idx val="12"/>
-              <c:layout/>
               <c:tx>
                 <c:rich>
                   <a:bodyPr/>
@@ -1196,7 +1160,7 @@
                       <a:pPr/>
                       <a:t>[CELLRANGE]</a:t>
                     </a:fld>
-                    <a:endParaRPr lang="en-US" dirty="0"/>
+                    <a:endParaRPr lang="en-US"/>
                   </a:p>
                 </c:rich>
               </c:tx>
@@ -1209,9 +1173,7 @@
               <c:showBubbleSize val="0"/>
               <c:extLst>
                 <c:ext xmlns:c15="http://schemas.microsoft.com/office/drawing/2012/chart" uri="{CE6537A1-D6FC-4f65-9D91-7224C49458BB}">
-                  <c15:layout/>
                   <c15:dlblFieldTable/>
-                  <c15:xForSave val="1"/>
                   <c15:showDataLabelsRange val="1"/>
                 </c:ext>
               </c:extLst>
@@ -1252,6 +1214,7 @@
             <c:showSerName val="0"/>
             <c:showPercent val="0"/>
             <c:showBubbleSize val="0"/>
+            <c:showLeaderLines val="0"/>
             <c:extLst>
               <c:ext xmlns:c15="http://schemas.microsoft.com/office/drawing/2012/chart" uri="{CE6537A1-D6FC-4f65-9D91-7224C49458BB}">
                 <c15:spPr xmlns:c15="http://schemas.microsoft.com/office/drawing/2012/chart">
@@ -1259,7 +1222,6 @@
                     <a:avLst/>
                   </a:prstGeom>
                 </c15:spPr>
-                <c15:layout/>
                 <c15:showDataLabelsRange val="1"/>
                 <c15:showLeaderLines val="0"/>
               </c:ext>
@@ -1471,8 +1433,8 @@
         <c:bubbleScale val="100"/>
         <c:showNegBubbles val="0"/>
         <c:sizeRepresents val="w"/>
-        <c:axId val="189667584"/>
-        <c:axId val="189714816"/>
+        <c:axId val="327138488"/>
+        <c:axId val="327133392"/>
         <c:extLst>
           <c:ext xmlns:c15="http://schemas.microsoft.com/office/drawing/2012/chart" uri="{02D57815-91ED-43cb-92C2-25804820EDAC}">
             <c15:filteredBubbleSeries>
@@ -1662,7 +1624,7 @@
         </c:extLst>
       </c:bubbleChart>
       <c:valAx>
-        <c:axId val="189667584"/>
+        <c:axId val="327138488"/>
         <c:scaling>
           <c:orientation val="minMax"/>
           <c:max val="4"/>
@@ -1713,7 +1675,6 @@
               </a:p>
             </c:rich>
           </c:tx>
-          <c:layout/>
           <c:overlay val="0"/>
         </c:title>
         <c:numFmt formatCode="0.00" sourceLinked="0"/>
@@ -1748,13 +1709,13 @@
             <a:endParaRPr lang="en-US"/>
           </a:p>
         </c:txPr>
-        <c:crossAx val="189714816"/>
+        <c:crossAx val="327133392"/>
         <c:crosses val="autoZero"/>
         <c:crossBetween val="midCat"/>
         <c:minorUnit val="0.25"/>
       </c:valAx>
       <c:valAx>
-        <c:axId val="189714816"/>
+        <c:axId val="327133392"/>
         <c:scaling>
           <c:orientation val="minMax"/>
           <c:min val="0"/>
@@ -1804,7 +1765,6 @@
               </a:p>
             </c:rich>
           </c:tx>
-          <c:layout/>
           <c:overlay val="0"/>
         </c:title>
         <c:numFmt formatCode="General" sourceLinked="0"/>
@@ -1839,7 +1799,7 @@
             <a:endParaRPr lang="en-US"/>
           </a:p>
         </c:txPr>
-        <c:crossAx val="189667584"/>
+        <c:crossAx val="327138488"/>
         <c:crosses val="autoZero"/>
         <c:crossBetween val="midCat"/>
       </c:valAx>
@@ -1960,7 +1920,7 @@
           <a:p>
             <a:fld id="{268042A1-6D91-4513-A62D-1E3FD70C84BE}" type="datetimeFigureOut">
               <a:rPr lang="fr-FR" smtClean="0"/>
-              <a:t>05/10/2016</a:t>
+              <a:t>15/11/2016</a:t>
             </a:fld>
             <a:endParaRPr lang="fr-FR"/>
           </a:p>
@@ -2563,7 +2523,7 @@
             <a:fld id="{D8E3BBD6-5DF7-411E-B793-6A3558CCCDCA}" type="datetimeFigureOut">
               <a:rPr lang="fr-FR" smtClean="0"/>
               <a:pPr/>
-              <a:t>05/10/2016</a:t>
+              <a:t>15/11/2016</a:t>
             </a:fld>
             <a:endParaRPr lang="fr-FR" dirty="0"/>
           </a:p>
@@ -2728,7 +2688,7 @@
             <a:fld id="{D8E3BBD6-5DF7-411E-B793-6A3558CCCDCA}" type="datetimeFigureOut">
               <a:rPr lang="fr-FR" smtClean="0"/>
               <a:pPr/>
-              <a:t>05/10/2016</a:t>
+              <a:t>15/11/2016</a:t>
             </a:fld>
             <a:endParaRPr lang="fr-FR" dirty="0"/>
           </a:p>
@@ -4262,7 +4222,7 @@
             <a:fld id="{D8E3BBD6-5DF7-411E-B793-6A3558CCCDCA}" type="datetimeFigureOut">
               <a:rPr lang="fr-FR" smtClean="0"/>
               <a:pPr/>
-              <a:t>05/10/2016</a:t>
+              <a:t>15/11/2016</a:t>
             </a:fld>
             <a:endParaRPr lang="fr-FR" dirty="0"/>
           </a:p>
@@ -6687,7 +6647,7 @@
             <a:fld id="{D8E3BBD6-5DF7-411E-B793-6A3558CCCDCA}" type="datetimeFigureOut">
               <a:rPr lang="fr-FR" smtClean="0"/>
               <a:pPr/>
-              <a:t>05/10/2016</a:t>
+              <a:t>15/11/2016</a:t>
             </a:fld>
             <a:endParaRPr lang="fr-FR" dirty="0"/>
           </a:p>
@@ -9368,7 +9328,7 @@
             <a:fld id="{D8E3BBD6-5DF7-411E-B793-6A3558CCCDCA}" type="datetimeFigureOut">
               <a:rPr lang="fr-FR" smtClean="0"/>
               <a:pPr/>
-              <a:t>05/10/2016</a:t>
+              <a:t>15/11/2016</a:t>
             </a:fld>
             <a:endParaRPr lang="fr-FR" dirty="0"/>
           </a:p>
@@ -12274,7 +12234,7 @@
             <a:fld id="{D8E3BBD6-5DF7-411E-B793-6A3558CCCDCA}" type="datetimeFigureOut">
               <a:rPr lang="fr-FR" smtClean="0"/>
               <a:pPr/>
-              <a:t>05/10/2016</a:t>
+              <a:t>15/11/2016</a:t>
             </a:fld>
             <a:endParaRPr lang="fr-FR" dirty="0"/>
           </a:p>
@@ -14061,7 +14021,7 @@
             <a:fld id="{D8E3BBD6-5DF7-411E-B793-6A3558CCCDCA}" type="datetimeFigureOut">
               <a:rPr lang="fr-FR" smtClean="0"/>
               <a:pPr/>
-              <a:t>05/10/2016</a:t>
+              <a:t>15/11/2016</a:t>
             </a:fld>
             <a:endParaRPr lang="fr-FR" dirty="0"/>
           </a:p>
@@ -14141,7 +14101,7 @@
             <a:fld id="{D8E3BBD6-5DF7-411E-B793-6A3558CCCDCA}" type="datetimeFigureOut">
               <a:rPr lang="fr-FR" smtClean="0"/>
               <a:pPr/>
-              <a:t>05/10/2016</a:t>
+              <a:t>15/11/2016</a:t>
             </a:fld>
             <a:endParaRPr lang="fr-FR" dirty="0"/>
           </a:p>
@@ -14403,7 +14363,7 @@
             <a:fld id="{D8E3BBD6-5DF7-411E-B793-6A3558CCCDCA}" type="datetimeFigureOut">
               <a:rPr lang="fr-FR" smtClean="0"/>
               <a:pPr/>
-              <a:t>05/10/2016</a:t>
+              <a:t>15/11/2016</a:t>
             </a:fld>
             <a:endParaRPr lang="fr-FR" dirty="0"/>
           </a:p>
@@ -14646,7 +14606,7 @@
             <a:fld id="{D8E3BBD6-5DF7-411E-B793-6A3558CCCDCA}" type="datetimeFigureOut">
               <a:rPr lang="fr-FR" smtClean="0"/>
               <a:pPr/>
-              <a:t>05/10/2016</a:t>
+              <a:t>15/11/2016</a:t>
             </a:fld>
             <a:endParaRPr lang="fr-FR" dirty="0"/>
           </a:p>
@@ -14848,7 +14808,7 @@
             <a:fld id="{D8E3BBD6-5DF7-411E-B793-6A3558CCCDCA}" type="datetimeFigureOut">
               <a:rPr lang="fr-FR" smtClean="0"/>
               <a:pPr/>
-              <a:t>05/10/2016</a:t>
+              <a:t>15/11/2016</a:t>
             </a:fld>
             <a:endParaRPr lang="fr-FR" dirty="0"/>
           </a:p>
@@ -21894,12 +21854,12 @@
       </p:grpSpPr>
       <p:sp>
         <p:nvSpPr>
-          <p:cNvPr id="11" name="Subtitle 10"/>
+          <p:cNvPr id="2" name="Slide Number Placeholder 1"/>
           <p:cNvSpPr>
             <a:spLocks noGrp="1"/>
           </p:cNvSpPr>
           <p:nvPr>
-            <p:ph type="subTitle" idx="1"/>
+            <p:ph type="sldNum" sz="quarter" idx="10"/>
           </p:nvPr>
         </p:nvSpPr>
         <p:spPr/>
@@ -21907,49 +21867,650 @@
           <a:bodyPr/>
           <a:lstStyle/>
           <a:p>
-            <a:r>
-              <a:rPr lang="en-US" dirty="0" smtClean="0"/>
-              <a:t>Graphic Templates</a:t>
-            </a:r>
-            <a:endParaRPr lang="en-US" dirty="0"/>
-          </a:p>
-        </p:txBody>
-      </p:sp>
-      <p:sp>
-        <p:nvSpPr>
-          <p:cNvPr id="10" name="Title 9"/>
+            <a:pPr>
+              <a:buClr>
+                <a:prstClr val="black"/>
+              </a:buClr>
+            </a:pPr>
+            <a:fld id="{F71C7896-8E11-4384-BFC5-C0974CDBC83D}" type="slidenum">
+              <a:rPr lang="en-US" smtClean="0">
+                <a:solidFill>
+                  <a:srgbClr val="000000">
+                    <a:lumMod val="65000"/>
+                    <a:lumOff val="35000"/>
+                  </a:srgbClr>
+                </a:solidFill>
+              </a:rPr>
+              <a:pPr>
+                <a:buClr>
+                  <a:prstClr val="black"/>
+                </a:buClr>
+              </a:pPr>
+              <a:t>12</a:t>
+            </a:fld>
+            <a:endParaRPr lang="en-US" dirty="0">
+              <a:solidFill>
+                <a:srgbClr val="000000">
+                  <a:lumMod val="65000"/>
+                  <a:lumOff val="35000"/>
+                </a:srgbClr>
+              </a:solidFill>
+            </a:endParaRPr>
+          </a:p>
+        </p:txBody>
+      </p:sp>
+      <p:sp>
+        <p:nvSpPr>
+          <p:cNvPr id="5" name="Title 1"/>
           <p:cNvSpPr>
             <a:spLocks noGrp="1"/>
           </p:cNvSpPr>
           <p:nvPr>
-            <p:ph type="ctrTitle" sz="quarter"/>
+            <p:ph type="title"/>
           </p:nvPr>
         </p:nvSpPr>
-        <p:spPr/>
+        <p:spPr>
+          <a:xfrm>
+            <a:off x="320040" y="237738"/>
+            <a:ext cx="8503920" cy="378565"/>
+          </a:xfrm>
+        </p:spPr>
         <p:txBody>
           <a:bodyPr/>
           <a:lstStyle/>
           <a:p>
             <a:r>
               <a:rPr lang="en-US" dirty="0" smtClean="0"/>
-              <a:t>PowerPoint Templates</a:t>
+              <a:t>PowerPoint Templates – Text </a:t>
+            </a:r>
+            <a:r>
+              <a:rPr lang="en-US" dirty="0" smtClean="0"/>
+              <a:t>[4]</a:t>
             </a:r>
             <a:endParaRPr lang="en-US" dirty="0"/>
           </a:p>
         </p:txBody>
       </p:sp>
+      <p:sp>
+        <p:nvSpPr>
+          <p:cNvPr id="6" name="Rounded Rectangle 5"/>
+          <p:cNvSpPr/>
+          <p:nvPr/>
+        </p:nvSpPr>
+        <p:spPr>
+          <a:xfrm>
+            <a:off x="1187624" y="848940"/>
+            <a:ext cx="6624736" cy="5172348"/>
+          </a:xfrm>
+          <a:prstGeom prst="roundRect">
+            <a:avLst>
+              <a:gd name="adj" fmla="val 4881"/>
+            </a:avLst>
+          </a:prstGeom>
+          <a:solidFill>
+            <a:schemeClr val="bg1">
+              <a:lumMod val="95000"/>
+            </a:schemeClr>
+          </a:solidFill>
+          <a:ln>
+            <a:noFill/>
+          </a:ln>
+          <a:effectLst/>
+        </p:spPr>
+        <p:style>
+          <a:lnRef idx="1">
+            <a:schemeClr val="accent5"/>
+          </a:lnRef>
+          <a:fillRef idx="3">
+            <a:schemeClr val="accent5"/>
+          </a:fillRef>
+          <a:effectRef idx="2">
+            <a:schemeClr val="accent5"/>
+          </a:effectRef>
+          <a:fontRef idx="minor">
+            <a:schemeClr val="lt1"/>
+          </a:fontRef>
+        </p:style>
+        <p:txBody>
+          <a:bodyPr rtlCol="0" anchor="ctr"/>
+          <a:lstStyle/>
+          <a:p>
+            <a:pPr algn="ctr"/>
+            <a:endParaRPr lang="en-US" dirty="0">
+              <a:solidFill>
+                <a:schemeClr val="lt1"/>
+              </a:solidFill>
+            </a:endParaRPr>
+          </a:p>
+        </p:txBody>
+      </p:sp>
+      <p:sp>
+        <p:nvSpPr>
+          <p:cNvPr id="7" name="TextBox 6"/>
+          <p:cNvSpPr txBox="1"/>
+          <p:nvPr/>
+        </p:nvSpPr>
+        <p:spPr>
+          <a:xfrm>
+            <a:off x="1115616" y="899428"/>
+            <a:ext cx="4314002" cy="369332"/>
+          </a:xfrm>
+          <a:prstGeom prst="rect">
+            <a:avLst/>
+          </a:prstGeom>
+          <a:noFill/>
+        </p:spPr>
+        <p:txBody>
+          <a:bodyPr wrap="square" lIns="180000" rIns="180000" rtlCol="0">
+            <a:spAutoFit/>
+          </a:bodyPr>
+          <a:lstStyle>
+            <a:defPPr>
+              <a:defRPr lang="fr-FR"/>
+            </a:defPPr>
+            <a:lvl1pPr>
+              <a:defRPr sz="2000" b="1">
+                <a:solidFill>
+                  <a:schemeClr val="tx1">
+                    <a:lumMod val="75000"/>
+                    <a:lumOff val="25000"/>
+                  </a:schemeClr>
+                </a:solidFill>
+              </a:defRPr>
+            </a:lvl1pPr>
+          </a:lstStyle>
+          <a:p>
+            <a:r>
+              <a:rPr lang="en-US" sz="1800" dirty="0" smtClean="0"/>
+              <a:t>Custom Expression</a:t>
+            </a:r>
+            <a:endParaRPr lang="en-US" sz="1800" dirty="0"/>
+          </a:p>
+        </p:txBody>
+      </p:sp>
+      <p:sp>
+        <p:nvSpPr>
+          <p:cNvPr id="8" name="TextBox 7"/>
+          <p:cNvSpPr txBox="1"/>
+          <p:nvPr/>
+        </p:nvSpPr>
+        <p:spPr>
+          <a:xfrm>
+            <a:off x="2771800" y="1296056"/>
+            <a:ext cx="4097978" cy="338554"/>
+          </a:xfrm>
+          <a:prstGeom prst="rect">
+            <a:avLst/>
+          </a:prstGeom>
+          <a:noFill/>
+        </p:spPr>
+        <p:txBody>
+          <a:bodyPr wrap="square" rtlCol="0">
+            <a:spAutoFit/>
+          </a:bodyPr>
+          <a:lstStyle>
+            <a:defPPr>
+              <a:defRPr lang="fr-FR"/>
+            </a:defPPr>
+            <a:lvl1pPr>
+              <a:defRPr sz="2000" b="1">
+                <a:solidFill>
+                  <a:srgbClr val="5E5E5E"/>
+                </a:solidFill>
+              </a:defRPr>
+            </a:lvl1pPr>
+          </a:lstStyle>
+          <a:p>
+            <a:r>
+              <a:rPr lang="en-US" sz="1600" dirty="0" smtClean="0"/>
+              <a:t>PF_CUSTOM_EXPRESSION</a:t>
+            </a:r>
+            <a:endParaRPr lang="en-US" sz="1600" dirty="0"/>
+          </a:p>
+        </p:txBody>
+      </p:sp>
+      <p:sp>
+        <p:nvSpPr>
+          <p:cNvPr id="9" name="TextBox 8"/>
+          <p:cNvSpPr txBox="1"/>
+          <p:nvPr/>
+        </p:nvSpPr>
+        <p:spPr>
+          <a:xfrm>
+            <a:off x="2300183" y="3296044"/>
+            <a:ext cx="436338" cy="400110"/>
+          </a:xfrm>
+          <a:prstGeom prst="rect">
+            <a:avLst/>
+          </a:prstGeom>
+          <a:noFill/>
+        </p:spPr>
+        <p:txBody>
+          <a:bodyPr wrap="square" rtlCol="0">
+            <a:normAutofit/>
+          </a:bodyPr>
+          <a:lstStyle>
+            <a:defPPr>
+              <a:defRPr lang="fr-FR"/>
+            </a:defPPr>
+            <a:lvl1pPr>
+              <a:defRPr sz="2000" b="1">
+                <a:solidFill>
+                  <a:schemeClr val="bg1">
+                    <a:lumMod val="50000"/>
+                  </a:schemeClr>
+                </a:solidFill>
+              </a:defRPr>
+            </a:lvl1pPr>
+          </a:lstStyle>
+          <a:p>
+            <a:r>
+              <a:rPr lang="en-US" dirty="0" smtClean="0">
+                <a:sym typeface="Wingdings" pitchFamily="2" charset="2"/>
+              </a:rPr>
+              <a:t></a:t>
+            </a:r>
+            <a:endParaRPr lang="en-US" dirty="0"/>
+          </a:p>
+        </p:txBody>
+      </p:sp>
+      <p:sp>
+        <p:nvSpPr>
+          <p:cNvPr id="10" name="TextBox 9"/>
+          <p:cNvSpPr txBox="1"/>
+          <p:nvPr/>
+        </p:nvSpPr>
+        <p:spPr>
+          <a:xfrm>
+            <a:off x="1214964" y="1259468"/>
+            <a:ext cx="1556836" cy="369332"/>
+          </a:xfrm>
+          <a:prstGeom prst="rect">
+            <a:avLst/>
+          </a:prstGeom>
+          <a:noFill/>
+        </p:spPr>
+        <p:txBody>
+          <a:bodyPr wrap="none" rtlCol="0">
+            <a:spAutoFit/>
+          </a:bodyPr>
+          <a:lstStyle>
+            <a:defPPr>
+              <a:defRPr lang="fr-FR"/>
+            </a:defPPr>
+            <a:lvl1pPr algn="r">
+              <a:defRPr sz="2000">
+                <a:solidFill>
+                  <a:schemeClr val="bg1">
+                    <a:lumMod val="50000"/>
+                  </a:schemeClr>
+                </a:solidFill>
+              </a:defRPr>
+            </a:lvl1pPr>
+          </a:lstStyle>
+          <a:p>
+            <a:r>
+              <a:rPr lang="en-US" sz="1800" dirty="0" smtClean="0"/>
+              <a:t>Block Name :</a:t>
+            </a:r>
+            <a:endParaRPr lang="en-US" sz="1800" dirty="0"/>
+          </a:p>
+        </p:txBody>
+      </p:sp>
+      <p:sp>
+        <p:nvSpPr>
+          <p:cNvPr id="11" name="TextBox 10"/>
+          <p:cNvSpPr txBox="1"/>
+          <p:nvPr/>
+        </p:nvSpPr>
+        <p:spPr>
+          <a:xfrm>
+            <a:off x="2771800" y="1588730"/>
+            <a:ext cx="4824536" cy="1615827"/>
+          </a:xfrm>
+          <a:prstGeom prst="rect">
+            <a:avLst/>
+          </a:prstGeom>
+          <a:noFill/>
+        </p:spPr>
+        <p:txBody>
+          <a:bodyPr wrap="square" rtlCol="0">
+            <a:spAutoFit/>
+          </a:bodyPr>
+          <a:lstStyle>
+            <a:defPPr>
+              <a:defRPr lang="fr-FR"/>
+            </a:defPPr>
+            <a:lvl1pPr>
+              <a:defRPr sz="2000" i="1">
+                <a:solidFill>
+                  <a:schemeClr val="bg1">
+                    <a:lumMod val="50000"/>
+                  </a:schemeClr>
+                </a:solidFill>
+              </a:defRPr>
+            </a:lvl1pPr>
+          </a:lstStyle>
+          <a:p>
+            <a:r>
+              <a:rPr lang="en-US" sz="1100" dirty="0" smtClean="0"/>
+              <a:t>- PARAMS=SZ </a:t>
+            </a:r>
+            <a:r>
+              <a:rPr lang="en-US" sz="1100" dirty="0"/>
+              <a:t>a SZ b, (SZ pour sizing measure, QR pour quality rule, BF for background fact)</a:t>
+            </a:r>
+          </a:p>
+          <a:p>
+            <a:r>
+              <a:rPr lang="en-US" sz="1100" dirty="0" smtClean="0"/>
+              <a:t>- EXPR=b/a</a:t>
+            </a:r>
+            <a:r>
+              <a:rPr lang="en-US" sz="1100" dirty="0"/>
+              <a:t>, (operators can be +, -, *, / , (, ) )</a:t>
+            </a:r>
+          </a:p>
+          <a:p>
+            <a:r>
+              <a:rPr lang="en-US" sz="1100" dirty="0" smtClean="0"/>
+              <a:t>- a=67011</a:t>
+            </a:r>
+            <a:r>
+              <a:rPr lang="en-US" sz="1100" dirty="0"/>
+              <a:t>,</a:t>
+            </a:r>
+          </a:p>
+          <a:p>
+            <a:r>
+              <a:rPr lang="en-US" sz="1100" dirty="0" smtClean="0"/>
+              <a:t>- b=67010</a:t>
+            </a:r>
+            <a:r>
+              <a:rPr lang="en-US" sz="1100" dirty="0"/>
+              <a:t>,</a:t>
+            </a:r>
+          </a:p>
+          <a:p>
+            <a:r>
+              <a:rPr lang="en-US" sz="1100" dirty="0" smtClean="0"/>
+              <a:t>- FORMAT=N0 </a:t>
+            </a:r>
+            <a:r>
+              <a:rPr lang="en-US" sz="1100" dirty="0"/>
+              <a:t>(N2 by default, if nothing or erroneous format is set),</a:t>
+            </a:r>
+          </a:p>
+          <a:p>
+            <a:r>
+              <a:rPr lang="en-US" sz="1100" dirty="0" smtClean="0"/>
+              <a:t>- AGGREGATOR=SUM|AVERAGE </a:t>
+            </a:r>
+            <a:r>
+              <a:rPr lang="en-US" sz="1100" dirty="0"/>
+              <a:t>(for portfolio component, to aggregate results of all applications for the custom expression, AVERAGE by default or if erroneous format is set)</a:t>
+            </a:r>
+            <a:endParaRPr lang="en-US" sz="1100" dirty="0"/>
+          </a:p>
+        </p:txBody>
+      </p:sp>
+      <p:sp>
+        <p:nvSpPr>
+          <p:cNvPr id="12" name="TextBox 11"/>
+          <p:cNvSpPr txBox="1"/>
+          <p:nvPr/>
+        </p:nvSpPr>
+        <p:spPr>
+          <a:xfrm>
+            <a:off x="1663804" y="1619508"/>
+            <a:ext cx="1107996" cy="369332"/>
+          </a:xfrm>
+          <a:prstGeom prst="rect">
+            <a:avLst/>
+          </a:prstGeom>
+          <a:noFill/>
+        </p:spPr>
+        <p:txBody>
+          <a:bodyPr wrap="none" rtlCol="0">
+            <a:spAutoFit/>
+          </a:bodyPr>
+          <a:lstStyle>
+            <a:defPPr>
+              <a:defRPr lang="fr-FR"/>
+            </a:defPPr>
+            <a:lvl1pPr algn="r">
+              <a:defRPr sz="2000">
+                <a:solidFill>
+                  <a:schemeClr val="bg1">
+                    <a:lumMod val="50000"/>
+                  </a:schemeClr>
+                </a:solidFill>
+              </a:defRPr>
+            </a:lvl1pPr>
+          </a:lstStyle>
+          <a:p>
+            <a:r>
+              <a:rPr lang="en-US" sz="1800" dirty="0" smtClean="0"/>
+              <a:t>Options :</a:t>
+            </a:r>
+            <a:endParaRPr lang="en-US" sz="1800" dirty="0"/>
+          </a:p>
+        </p:txBody>
+      </p:sp>
+      <p:sp>
+        <p:nvSpPr>
+          <p:cNvPr id="13" name="Rounded Rectangle 12"/>
+          <p:cNvSpPr/>
+          <p:nvPr/>
+        </p:nvSpPr>
+        <p:spPr>
+          <a:xfrm>
+            <a:off x="2809636" y="3302205"/>
+            <a:ext cx="3634572" cy="393949"/>
+          </a:xfrm>
+          <a:prstGeom prst="roundRect">
+            <a:avLst>
+              <a:gd name="adj" fmla="val 4881"/>
+            </a:avLst>
+          </a:prstGeom>
+          <a:solidFill>
+            <a:schemeClr val="bg1">
+              <a:lumMod val="75000"/>
+              <a:alpha val="45000"/>
+            </a:schemeClr>
+          </a:solidFill>
+          <a:ln>
+            <a:noFill/>
+          </a:ln>
+          <a:effectLst/>
+        </p:spPr>
+        <p:style>
+          <a:lnRef idx="1">
+            <a:schemeClr val="accent5"/>
+          </a:lnRef>
+          <a:fillRef idx="3">
+            <a:schemeClr val="accent5"/>
+          </a:fillRef>
+          <a:effectRef idx="2">
+            <a:schemeClr val="accent5"/>
+          </a:effectRef>
+          <a:fontRef idx="minor">
+            <a:schemeClr val="lt1"/>
+          </a:fontRef>
+        </p:style>
+        <p:txBody>
+          <a:bodyPr rtlCol="0" anchor="ctr"/>
+          <a:lstStyle/>
+          <a:p>
+            <a:pPr algn="ctr"/>
+            <a:endParaRPr lang="en-US" dirty="0"/>
+          </a:p>
+        </p:txBody>
+      </p:sp>
+      <p:sp>
+        <p:nvSpPr>
+          <p:cNvPr id="14" name="TextBox 13" descr="TEXT;PF_CUSTOM_EXPRESSION;PARAMS=SZ a SZ b,EXPR = a/b,a=67011, b=67211,FORMAT=N0,AGGREGATOR=SUM"/>
+          <p:cNvSpPr txBox="1"/>
+          <p:nvPr/>
+        </p:nvSpPr>
+        <p:spPr>
+          <a:xfrm>
+            <a:off x="2808529" y="3284984"/>
+            <a:ext cx="3844118" cy="400110"/>
+          </a:xfrm>
+          <a:prstGeom prst="rect">
+            <a:avLst/>
+          </a:prstGeom>
+          <a:noFill/>
+        </p:spPr>
+        <p:txBody>
+          <a:bodyPr wrap="square" rtlCol="0">
+            <a:normAutofit/>
+          </a:bodyPr>
+          <a:lstStyle>
+            <a:defPPr>
+              <a:defRPr lang="fr-FR"/>
+            </a:defPPr>
+            <a:lvl1pPr>
+              <a:defRPr sz="2000" b="1">
+                <a:solidFill>
+                  <a:schemeClr val="bg1">
+                    <a:lumMod val="50000"/>
+                  </a:schemeClr>
+                </a:solidFill>
+              </a:defRPr>
+            </a:lvl1pPr>
+          </a:lstStyle>
+          <a:p>
+            <a:r>
+              <a:rPr lang="en-US" dirty="0" smtClean="0"/>
+              <a:t>Value</a:t>
+            </a:r>
+            <a:endParaRPr lang="en-US" dirty="0"/>
+          </a:p>
+        </p:txBody>
+      </p:sp>
+      <p:sp>
+        <p:nvSpPr>
+          <p:cNvPr id="34" name="TextBox 33"/>
+          <p:cNvSpPr txBox="1"/>
+          <p:nvPr/>
+        </p:nvSpPr>
+        <p:spPr>
+          <a:xfrm>
+            <a:off x="1828111" y="3863690"/>
+            <a:ext cx="4824536" cy="1954381"/>
+          </a:xfrm>
+          <a:prstGeom prst="rect">
+            <a:avLst/>
+          </a:prstGeom>
+          <a:noFill/>
+        </p:spPr>
+        <p:txBody>
+          <a:bodyPr wrap="square" rtlCol="0">
+            <a:spAutoFit/>
+          </a:bodyPr>
+          <a:lstStyle>
+            <a:defPPr>
+              <a:defRPr lang="fr-FR"/>
+            </a:defPPr>
+            <a:lvl1pPr>
+              <a:defRPr sz="2000" i="1">
+                <a:solidFill>
+                  <a:schemeClr val="bg1">
+                    <a:lumMod val="50000"/>
+                  </a:schemeClr>
+                </a:solidFill>
+              </a:defRPr>
+            </a:lvl1pPr>
+          </a:lstStyle>
+          <a:p>
+            <a:r>
+              <a:rPr lang="en-GB" sz="1100" dirty="0"/>
+              <a:t>you could have as number of parameters as you want (</a:t>
+            </a:r>
+            <a:r>
+              <a:rPr lang="en-GB" sz="1100" dirty="0" err="1"/>
+              <a:t>theorical</a:t>
+            </a:r>
+            <a:r>
+              <a:rPr lang="en-GB" sz="1100" dirty="0"/>
+              <a:t> limit is 16383 !!)</a:t>
+            </a:r>
+            <a:endParaRPr lang="en-US" sz="1100" dirty="0"/>
+          </a:p>
+          <a:p>
+            <a:r>
+              <a:rPr lang="en-GB" sz="1100" dirty="0" err="1"/>
+              <a:t>cf</a:t>
+            </a:r>
+            <a:r>
+              <a:rPr lang="en-GB" sz="1100" dirty="0"/>
+              <a:t> https://msdn.microsoft.com/en-us/library/dwhawy9k.aspx for the format</a:t>
+            </a:r>
+            <a:endParaRPr lang="en-US" sz="1100" dirty="0"/>
+          </a:p>
+          <a:p>
+            <a:r>
+              <a:rPr lang="en-GB" sz="1100" dirty="0"/>
+              <a:t>(examples for double https://msdn.microsoft.com/en-us/library/kfsatb94.aspx)</a:t>
+            </a:r>
+            <a:endParaRPr lang="en-US" sz="1100" dirty="0"/>
+          </a:p>
+          <a:p>
+            <a:r>
+              <a:rPr lang="en-GB" sz="1100" dirty="0"/>
+              <a:t>only N format is interesting here :</a:t>
+            </a:r>
+            <a:endParaRPr lang="en-US" sz="1100" dirty="0"/>
+          </a:p>
+          <a:p>
+            <a:r>
+              <a:rPr lang="en-GB" sz="1100" dirty="0"/>
+              <a:t>N: -195,489,100.84</a:t>
+            </a:r>
+            <a:endParaRPr lang="en-US" sz="1100" dirty="0"/>
+          </a:p>
+          <a:p>
+            <a:r>
+              <a:rPr lang="en-GB" sz="1100" dirty="0"/>
+              <a:t>N0: -195,489,101</a:t>
+            </a:r>
+            <a:endParaRPr lang="en-US" sz="1100" dirty="0"/>
+          </a:p>
+          <a:p>
+            <a:r>
+              <a:rPr lang="en-GB" sz="1100" dirty="0"/>
+              <a:t>N1: -195,489,100.8</a:t>
+            </a:r>
+            <a:endParaRPr lang="en-US" sz="1100" dirty="0"/>
+          </a:p>
+          <a:p>
+            <a:r>
+              <a:rPr lang="en-GB" sz="1100" dirty="0"/>
+              <a:t>N2: -195,489,100.84</a:t>
+            </a:r>
+            <a:endParaRPr lang="en-US" sz="1100" dirty="0"/>
+          </a:p>
+          <a:p>
+            <a:r>
+              <a:rPr lang="en-GB" sz="1100" dirty="0"/>
+              <a:t>N3: -195,489,100.838</a:t>
+            </a:r>
+            <a:endParaRPr lang="en-US" sz="1100" dirty="0"/>
+          </a:p>
+        </p:txBody>
+      </p:sp>
     </p:spTree>
+    <p:extLst>
+      <p:ext uri="{BB962C8B-B14F-4D97-AF65-F5344CB8AC3E}">
+        <p14:creationId xmlns:p14="http://schemas.microsoft.com/office/powerpoint/2010/main" val="2392893736"/>
+      </p:ext>
+    </p:extLst>
   </p:cSld>
   <p:clrMapOvr>
     <a:masterClrMapping/>
   </p:clrMapOvr>
-  <p:timing>
-    <p:tnLst>
-      <p:par>
-        <p:cTn id="1" dur="indefinite" restart="never" nodeType="tmRoot"/>
-      </p:par>
-    </p:tnLst>
-  </p:timing>
 </p:sld>
 </file>
 
@@ -21972,80 +22533,47 @@
       </p:grpSpPr>
       <p:sp>
         <p:nvSpPr>
-          <p:cNvPr id="2" name="Title 1"/>
+          <p:cNvPr id="11" name="Subtitle 10"/>
           <p:cNvSpPr>
             <a:spLocks noGrp="1"/>
           </p:cNvSpPr>
           <p:nvPr>
-            <p:ph type="title"/>
+            <p:ph type="subTitle" idx="1"/>
           </p:nvPr>
         </p:nvSpPr>
         <p:spPr/>
         <p:txBody>
-          <a:bodyPr>
-            <a:normAutofit/>
-          </a:bodyPr>
+          <a:bodyPr/>
           <a:lstStyle/>
           <a:p>
             <a:r>
-              <a:rPr lang="fr-FR" dirty="0" smtClean="0"/>
-              <a:t>PowerPoint Templates – Graphics [1]</a:t>
-            </a:r>
-            <a:endParaRPr lang="fr-FR" dirty="0"/>
-          </a:p>
-        </p:txBody>
-      </p:sp>
-      <p:sp>
-        <p:nvSpPr>
-          <p:cNvPr id="78" name="Content Placeholder 77"/>
+              <a:rPr lang="en-US" dirty="0" smtClean="0"/>
+              <a:t>Graphic Templates</a:t>
+            </a:r>
+            <a:endParaRPr lang="en-US" dirty="0"/>
+          </a:p>
+        </p:txBody>
+      </p:sp>
+      <p:sp>
+        <p:nvSpPr>
+          <p:cNvPr id="10" name="Title 9"/>
           <p:cNvSpPr>
             <a:spLocks noGrp="1"/>
           </p:cNvSpPr>
           <p:nvPr>
-            <p:ph type="body" sz="quarter" idx="11"/>
+            <p:ph type="ctrTitle" sz="quarter"/>
           </p:nvPr>
         </p:nvSpPr>
-        <p:spPr>
-          <a:xfrm>
-            <a:off x="325438" y="907126"/>
-            <a:ext cx="8504237" cy="1749197"/>
-          </a:xfrm>
-        </p:spPr>
+        <p:spPr/>
         <p:txBody>
           <a:bodyPr/>
           <a:lstStyle/>
           <a:p>
             <a:r>
-              <a:rPr lang="fr-FR" sz="2400" dirty="0" smtClean="0"/>
-              <a:t>This kind of template is identified by a type value as</a:t>
-            </a:r>
-            <a:br>
-              <a:rPr lang="fr-FR" sz="2400" dirty="0" smtClean="0"/>
-            </a:br>
-            <a:r>
-              <a:rPr lang="fr-FR" sz="2400" dirty="0" smtClean="0"/>
-              <a:t>			</a:t>
-            </a:r>
-          </a:p>
-          <a:p>
-            <a:pPr marL="0" indent="0">
-              <a:buNone/>
-            </a:pPr>
-            <a:r>
-              <a:rPr lang="fr-FR" sz="2400" dirty="0"/>
-              <a:t>	</a:t>
-            </a:r>
-            <a:r>
-              <a:rPr lang="fr-FR" sz="2400" dirty="0" smtClean="0"/>
-              <a:t>		Type = </a:t>
-            </a:r>
-            <a:r>
-              <a:rPr lang="fr-FR" sz="2400" b="1" dirty="0" smtClean="0"/>
-              <a:t>GRAPH</a:t>
-            </a:r>
-          </a:p>
-          <a:p>
-            <a:endParaRPr lang="fr-FR" sz="2400" b="1" dirty="0" smtClean="0"/>
+              <a:rPr lang="en-US" dirty="0" smtClean="0"/>
+              <a:t>PowerPoint Templates</a:t>
+            </a:r>
+            <a:endParaRPr lang="en-US" dirty="0"/>
           </a:p>
         </p:txBody>
       </p:sp>
@@ -22065,6 +22593,117 @@
 </file>
 
 <file path=ppt/slides/slide14.xml><?xml version="1.0" encoding="utf-8"?>
+<p:sld xmlns:a="http://schemas.openxmlformats.org/drawingml/2006/main" xmlns:r="http://schemas.openxmlformats.org/officeDocument/2006/relationships" xmlns:p="http://schemas.openxmlformats.org/presentationml/2006/main">
+  <p:cSld>
+    <p:spTree>
+      <p:nvGrpSpPr>
+        <p:cNvPr id="1" name=""/>
+        <p:cNvGrpSpPr/>
+        <p:nvPr/>
+      </p:nvGrpSpPr>
+      <p:grpSpPr>
+        <a:xfrm>
+          <a:off x="0" y="0"/>
+          <a:ext cx="0" cy="0"/>
+          <a:chOff x="0" y="0"/>
+          <a:chExt cx="0" cy="0"/>
+        </a:xfrm>
+      </p:grpSpPr>
+      <p:sp>
+        <p:nvSpPr>
+          <p:cNvPr id="2" name="Title 1"/>
+          <p:cNvSpPr>
+            <a:spLocks noGrp="1"/>
+          </p:cNvSpPr>
+          <p:nvPr>
+            <p:ph type="title"/>
+          </p:nvPr>
+        </p:nvSpPr>
+        <p:spPr/>
+        <p:txBody>
+          <a:bodyPr>
+            <a:normAutofit/>
+          </a:bodyPr>
+          <a:lstStyle/>
+          <a:p>
+            <a:r>
+              <a:rPr lang="fr-FR" dirty="0" smtClean="0"/>
+              <a:t>PowerPoint Templates – Graphics [1]</a:t>
+            </a:r>
+            <a:endParaRPr lang="fr-FR" dirty="0"/>
+          </a:p>
+        </p:txBody>
+      </p:sp>
+      <p:sp>
+        <p:nvSpPr>
+          <p:cNvPr id="78" name="Content Placeholder 77"/>
+          <p:cNvSpPr>
+            <a:spLocks noGrp="1"/>
+          </p:cNvSpPr>
+          <p:nvPr>
+            <p:ph type="body" sz="quarter" idx="11"/>
+          </p:nvPr>
+        </p:nvSpPr>
+        <p:spPr>
+          <a:xfrm>
+            <a:off x="325438" y="907126"/>
+            <a:ext cx="8504237" cy="1749197"/>
+          </a:xfrm>
+        </p:spPr>
+        <p:txBody>
+          <a:bodyPr/>
+          <a:lstStyle/>
+          <a:p>
+            <a:r>
+              <a:rPr lang="fr-FR" sz="2400" dirty="0" smtClean="0"/>
+              <a:t>This kind of template is identified by a type value as</a:t>
+            </a:r>
+            <a:br>
+              <a:rPr lang="fr-FR" sz="2400" dirty="0" smtClean="0"/>
+            </a:br>
+            <a:r>
+              <a:rPr lang="fr-FR" sz="2400" dirty="0" smtClean="0"/>
+              <a:t>			</a:t>
+            </a:r>
+          </a:p>
+          <a:p>
+            <a:pPr marL="0" indent="0">
+              <a:buNone/>
+            </a:pPr>
+            <a:r>
+              <a:rPr lang="fr-FR" sz="2400" dirty="0"/>
+              <a:t>	</a:t>
+            </a:r>
+            <a:r>
+              <a:rPr lang="fr-FR" sz="2400" dirty="0" smtClean="0"/>
+              <a:t>		Type = </a:t>
+            </a:r>
+            <a:r>
+              <a:rPr lang="fr-FR" sz="2400" b="1" dirty="0" smtClean="0"/>
+              <a:t>GRAPH</a:t>
+            </a:r>
+          </a:p>
+          <a:p>
+            <a:endParaRPr lang="fr-FR" sz="2400" b="1" dirty="0" smtClean="0"/>
+          </a:p>
+        </p:txBody>
+      </p:sp>
+    </p:spTree>
+  </p:cSld>
+  <p:clrMapOvr>
+    <a:masterClrMapping/>
+  </p:clrMapOvr>
+  <p:timing>
+    <p:tnLst>
+      <p:par>
+        <p:cTn id="1" dur="indefinite" restart="never" nodeType="tmRoot"/>
+      </p:par>
+    </p:tnLst>
+  </p:timing>
+</p:sld>
+</file>
+
+<file path=ppt/slides/slide15.xml><?xml version="1.0" encoding="utf-8"?>
 <p:sld xmlns:a="http://schemas.openxmlformats.org/drawingml/2006/main" xmlns:r="http://schemas.openxmlformats.org/officeDocument/2006/relationships" xmlns:p="http://schemas.openxmlformats.org/presentationml/2006/main">
   <p:cSld>
     <p:spTree>
@@ -22496,7 +23135,7 @@
 </p:sld>
 </file>
 
-<file path=ppt/slides/slide15.xml><?xml version="1.0" encoding="utf-8"?>
+<file path=ppt/slides/slide16.xml><?xml version="1.0" encoding="utf-8"?>
 <p:sld xmlns:a="http://schemas.openxmlformats.org/drawingml/2006/main" xmlns:r="http://schemas.openxmlformats.org/officeDocument/2006/relationships" xmlns:p="http://schemas.openxmlformats.org/presentationml/2006/main">
   <p:cSld>
     <p:spTree>
@@ -22937,7 +23576,7 @@
 </p:sld>
 </file>
 
-<file path=ppt/slides/slide16.xml><?xml version="1.0" encoding="utf-8"?>
+<file path=ppt/slides/slide17.xml><?xml version="1.0" encoding="utf-8"?>
 <p:sld xmlns:a="http://schemas.openxmlformats.org/drawingml/2006/main" xmlns:r="http://schemas.openxmlformats.org/officeDocument/2006/relationships" xmlns:p="http://schemas.openxmlformats.org/presentationml/2006/main">
   <p:cSld>
     <p:spTree>
@@ -23386,84 +24025,6 @@
 </p:sld>
 </file>
 
-<file path=ppt/slides/slide17.xml><?xml version="1.0" encoding="utf-8"?>
-<p:sld xmlns:a="http://schemas.openxmlformats.org/drawingml/2006/main" xmlns:r="http://schemas.openxmlformats.org/officeDocument/2006/relationships" xmlns:p="http://schemas.openxmlformats.org/presentationml/2006/main">
-  <p:cSld>
-    <p:spTree>
-      <p:nvGrpSpPr>
-        <p:cNvPr id="1" name=""/>
-        <p:cNvGrpSpPr/>
-        <p:nvPr/>
-      </p:nvGrpSpPr>
-      <p:grpSpPr>
-        <a:xfrm>
-          <a:off x="0" y="0"/>
-          <a:ext cx="0" cy="0"/>
-          <a:chOff x="0" y="0"/>
-          <a:chExt cx="0" cy="0"/>
-        </a:xfrm>
-      </p:grpSpPr>
-      <p:sp>
-        <p:nvSpPr>
-          <p:cNvPr id="11" name="Subtitle 10"/>
-          <p:cNvSpPr>
-            <a:spLocks noGrp="1"/>
-          </p:cNvSpPr>
-          <p:nvPr>
-            <p:ph type="subTitle" idx="1"/>
-          </p:nvPr>
-        </p:nvSpPr>
-        <p:spPr/>
-        <p:txBody>
-          <a:bodyPr/>
-          <a:lstStyle/>
-          <a:p>
-            <a:r>
-              <a:rPr lang="en-US" dirty="0" smtClean="0"/>
-              <a:t>Table Templates</a:t>
-            </a:r>
-            <a:endParaRPr lang="en-US" dirty="0"/>
-          </a:p>
-        </p:txBody>
-      </p:sp>
-      <p:sp>
-        <p:nvSpPr>
-          <p:cNvPr id="10" name="Title 9"/>
-          <p:cNvSpPr>
-            <a:spLocks noGrp="1"/>
-          </p:cNvSpPr>
-          <p:nvPr>
-            <p:ph type="ctrTitle" sz="quarter"/>
-          </p:nvPr>
-        </p:nvSpPr>
-        <p:spPr/>
-        <p:txBody>
-          <a:bodyPr/>
-          <a:lstStyle/>
-          <a:p>
-            <a:r>
-              <a:rPr lang="en-US" dirty="0" smtClean="0"/>
-              <a:t>PowerPoint Templates</a:t>
-            </a:r>
-            <a:endParaRPr lang="en-US" dirty="0"/>
-          </a:p>
-        </p:txBody>
-      </p:sp>
-    </p:spTree>
-  </p:cSld>
-  <p:clrMapOvr>
-    <a:masterClrMapping/>
-  </p:clrMapOvr>
-  <p:timing>
-    <p:tnLst>
-      <p:par>
-        <p:cTn id="1" dur="indefinite" restart="never" nodeType="tmRoot"/>
-      </p:par>
-    </p:tnLst>
-  </p:timing>
-</p:sld>
-</file>
-
 <file path=ppt/slides/slide18.xml><?xml version="1.0" encoding="utf-8"?>
 <p:sld xmlns:a="http://schemas.openxmlformats.org/drawingml/2006/main" xmlns:r="http://schemas.openxmlformats.org/officeDocument/2006/relationships" xmlns:p="http://schemas.openxmlformats.org/presentationml/2006/main">
   <p:cSld>
@@ -23483,85 +24044,47 @@
       </p:grpSpPr>
       <p:sp>
         <p:nvSpPr>
-          <p:cNvPr id="2" name="Title 1"/>
+          <p:cNvPr id="11" name="Subtitle 10"/>
           <p:cNvSpPr>
             <a:spLocks noGrp="1"/>
           </p:cNvSpPr>
           <p:nvPr>
-            <p:ph type="title"/>
+            <p:ph type="subTitle" idx="1"/>
           </p:nvPr>
         </p:nvSpPr>
         <p:spPr/>
         <p:txBody>
-          <a:bodyPr>
-            <a:normAutofit/>
-          </a:bodyPr>
+          <a:bodyPr/>
           <a:lstStyle/>
           <a:p>
             <a:r>
-              <a:rPr lang="fr-FR" dirty="0" smtClean="0"/>
-              <a:t>PowerPoint Templates – Tables [1]</a:t>
-            </a:r>
-            <a:endParaRPr lang="fr-FR" dirty="0"/>
-          </a:p>
-        </p:txBody>
-      </p:sp>
-      <p:sp>
-        <p:nvSpPr>
-          <p:cNvPr id="78" name="Content Placeholder 77"/>
+              <a:rPr lang="en-US" dirty="0" smtClean="0"/>
+              <a:t>Table Templates</a:t>
+            </a:r>
+            <a:endParaRPr lang="en-US" dirty="0"/>
+          </a:p>
+        </p:txBody>
+      </p:sp>
+      <p:sp>
+        <p:nvSpPr>
+          <p:cNvPr id="10" name="Title 9"/>
           <p:cNvSpPr>
             <a:spLocks noGrp="1"/>
           </p:cNvSpPr>
           <p:nvPr>
-            <p:ph type="body" sz="quarter" idx="11"/>
+            <p:ph type="ctrTitle" sz="quarter"/>
           </p:nvPr>
         </p:nvSpPr>
-        <p:spPr>
-          <a:xfrm>
-            <a:off x="325438" y="907126"/>
-            <a:ext cx="8504237" cy="2208297"/>
-          </a:xfrm>
-        </p:spPr>
+        <p:spPr/>
         <p:txBody>
           <a:bodyPr/>
           <a:lstStyle/>
           <a:p>
             <a:r>
-              <a:rPr lang="fr-FR" sz="2400" dirty="0" smtClean="0"/>
-              <a:t>This kind of template is identified by a type value as</a:t>
-            </a:r>
-            <a:br>
-              <a:rPr lang="fr-FR" sz="2400" dirty="0" smtClean="0"/>
-            </a:br>
-            <a:r>
-              <a:rPr lang="fr-FR" sz="2400" dirty="0" smtClean="0"/>
-              <a:t>			</a:t>
-            </a:r>
-          </a:p>
-          <a:p>
-            <a:pPr marL="0" indent="0">
-              <a:buNone/>
-            </a:pPr>
-            <a:r>
-              <a:rPr lang="fr-FR" sz="2400" dirty="0" smtClean="0"/>
-              <a:t>			Type = </a:t>
-            </a:r>
-            <a:r>
-              <a:rPr lang="fr-FR" sz="2400" b="1" dirty="0" smtClean="0"/>
-              <a:t>TABLE</a:t>
-            </a:r>
-          </a:p>
-          <a:p>
-            <a:pPr marL="0" indent="0">
-              <a:buNone/>
-            </a:pPr>
-            <a:endParaRPr lang="fr-FR" sz="2400" b="1" dirty="0" smtClean="0"/>
-          </a:p>
-          <a:p>
-            <a:pPr marL="0" indent="0">
-              <a:buNone/>
-            </a:pPr>
-            <a:endParaRPr lang="fr-FR" sz="2400" b="1" dirty="0" smtClean="0"/>
+              <a:rPr lang="en-US" dirty="0" smtClean="0"/>
+              <a:t>PowerPoint Templates</a:t>
+            </a:r>
+            <a:endParaRPr lang="en-US" dirty="0"/>
           </a:p>
         </p:txBody>
       </p:sp>
@@ -23581,6 +24104,212 @@
 </file>
 
 <file path=ppt/slides/slide19.xml><?xml version="1.0" encoding="utf-8"?>
+<p:sld xmlns:a="http://schemas.openxmlformats.org/drawingml/2006/main" xmlns:r="http://schemas.openxmlformats.org/officeDocument/2006/relationships" xmlns:p="http://schemas.openxmlformats.org/presentationml/2006/main">
+  <p:cSld>
+    <p:spTree>
+      <p:nvGrpSpPr>
+        <p:cNvPr id="1" name=""/>
+        <p:cNvGrpSpPr/>
+        <p:nvPr/>
+      </p:nvGrpSpPr>
+      <p:grpSpPr>
+        <a:xfrm>
+          <a:off x="0" y="0"/>
+          <a:ext cx="0" cy="0"/>
+          <a:chOff x="0" y="0"/>
+          <a:chExt cx="0" cy="0"/>
+        </a:xfrm>
+      </p:grpSpPr>
+      <p:sp>
+        <p:nvSpPr>
+          <p:cNvPr id="2" name="Title 1"/>
+          <p:cNvSpPr>
+            <a:spLocks noGrp="1"/>
+          </p:cNvSpPr>
+          <p:nvPr>
+            <p:ph type="title"/>
+          </p:nvPr>
+        </p:nvSpPr>
+        <p:spPr/>
+        <p:txBody>
+          <a:bodyPr>
+            <a:normAutofit/>
+          </a:bodyPr>
+          <a:lstStyle/>
+          <a:p>
+            <a:r>
+              <a:rPr lang="fr-FR" dirty="0" smtClean="0"/>
+              <a:t>PowerPoint Templates – Tables [1]</a:t>
+            </a:r>
+            <a:endParaRPr lang="fr-FR" dirty="0"/>
+          </a:p>
+        </p:txBody>
+      </p:sp>
+      <p:sp>
+        <p:nvSpPr>
+          <p:cNvPr id="78" name="Content Placeholder 77"/>
+          <p:cNvSpPr>
+            <a:spLocks noGrp="1"/>
+          </p:cNvSpPr>
+          <p:nvPr>
+            <p:ph type="body" sz="quarter" idx="11"/>
+          </p:nvPr>
+        </p:nvSpPr>
+        <p:spPr>
+          <a:xfrm>
+            <a:off x="325438" y="907126"/>
+            <a:ext cx="8504237" cy="2208297"/>
+          </a:xfrm>
+        </p:spPr>
+        <p:txBody>
+          <a:bodyPr/>
+          <a:lstStyle/>
+          <a:p>
+            <a:r>
+              <a:rPr lang="fr-FR" sz="2400" dirty="0" smtClean="0"/>
+              <a:t>This kind of template is identified by a type value as</a:t>
+            </a:r>
+            <a:br>
+              <a:rPr lang="fr-FR" sz="2400" dirty="0" smtClean="0"/>
+            </a:br>
+            <a:r>
+              <a:rPr lang="fr-FR" sz="2400" dirty="0" smtClean="0"/>
+              <a:t>			</a:t>
+            </a:r>
+          </a:p>
+          <a:p>
+            <a:pPr marL="0" indent="0">
+              <a:buNone/>
+            </a:pPr>
+            <a:r>
+              <a:rPr lang="fr-FR" sz="2400" dirty="0" smtClean="0"/>
+              <a:t>			Type = </a:t>
+            </a:r>
+            <a:r>
+              <a:rPr lang="fr-FR" sz="2400" b="1" dirty="0" smtClean="0"/>
+              <a:t>TABLE</a:t>
+            </a:r>
+          </a:p>
+          <a:p>
+            <a:pPr marL="0" indent="0">
+              <a:buNone/>
+            </a:pPr>
+            <a:endParaRPr lang="fr-FR" sz="2400" b="1" dirty="0" smtClean="0"/>
+          </a:p>
+          <a:p>
+            <a:pPr marL="0" indent="0">
+              <a:buNone/>
+            </a:pPr>
+            <a:endParaRPr lang="fr-FR" sz="2400" b="1" dirty="0" smtClean="0"/>
+          </a:p>
+        </p:txBody>
+      </p:sp>
+    </p:spTree>
+  </p:cSld>
+  <p:clrMapOvr>
+    <a:masterClrMapping/>
+  </p:clrMapOvr>
+  <p:timing>
+    <p:tnLst>
+      <p:par>
+        <p:cTn id="1" dur="indefinite" restart="never" nodeType="tmRoot"/>
+      </p:par>
+    </p:tnLst>
+  </p:timing>
+</p:sld>
+</file>
+
+<file path=ppt/slides/slide2.xml><?xml version="1.0" encoding="utf-8"?>
+<p:sld xmlns:a="http://schemas.openxmlformats.org/drawingml/2006/main" xmlns:r="http://schemas.openxmlformats.org/officeDocument/2006/relationships" xmlns:p="http://schemas.openxmlformats.org/presentationml/2006/main">
+  <p:cSld>
+    <p:spTree>
+      <p:nvGrpSpPr>
+        <p:cNvPr id="1" name=""/>
+        <p:cNvGrpSpPr/>
+        <p:nvPr/>
+      </p:nvGrpSpPr>
+      <p:grpSpPr>
+        <a:xfrm>
+          <a:off x="0" y="0"/>
+          <a:ext cx="0" cy="0"/>
+          <a:chOff x="0" y="0"/>
+          <a:chExt cx="0" cy="0"/>
+        </a:xfrm>
+      </p:grpSpPr>
+      <p:sp>
+        <p:nvSpPr>
+          <p:cNvPr id="2" name="Title 1"/>
+          <p:cNvSpPr>
+            <a:spLocks noGrp="1"/>
+          </p:cNvSpPr>
+          <p:nvPr>
+            <p:ph type="title"/>
+          </p:nvPr>
+        </p:nvSpPr>
+        <p:spPr/>
+        <p:txBody>
+          <a:bodyPr/>
+          <a:lstStyle/>
+          <a:p>
+            <a:r>
+              <a:rPr lang="fr-FR" dirty="0" smtClean="0"/>
+              <a:t>Powerpoint Templates</a:t>
+            </a:r>
+            <a:endParaRPr lang="fr-FR" dirty="0"/>
+          </a:p>
+        </p:txBody>
+      </p:sp>
+      <p:sp>
+        <p:nvSpPr>
+          <p:cNvPr id="3" name="Content Placeholder 2"/>
+          <p:cNvSpPr>
+            <a:spLocks noGrp="1"/>
+          </p:cNvSpPr>
+          <p:nvPr>
+            <p:ph type="body" sz="quarter" idx="11"/>
+          </p:nvPr>
+        </p:nvSpPr>
+        <p:spPr/>
+        <p:txBody>
+          <a:bodyPr/>
+          <a:lstStyle/>
+          <a:p>
+            <a:pPr algn="just"/>
+            <a:r>
+              <a:rPr lang="fr-FR" dirty="0" smtClean="0"/>
+              <a:t>When Word uses placeholder to target a customizable component, PowerPoint uses alternative text property of TextBox, Table or ChartArea</a:t>
+            </a:r>
+          </a:p>
+          <a:p>
+            <a:pPr algn="just"/>
+            <a:endParaRPr lang="fr-FR" dirty="0" smtClean="0"/>
+          </a:p>
+          <a:p>
+            <a:pPr algn="just"/>
+            <a:r>
+              <a:rPr lang="fr-FR" dirty="0" smtClean="0"/>
+              <a:t>To see alternative text property of all component, you should activate « Size and Position »  button in Powerpoint properties</a:t>
+            </a:r>
+            <a:endParaRPr lang="fr-FR" dirty="0"/>
+          </a:p>
+        </p:txBody>
+      </p:sp>
+    </p:spTree>
+  </p:cSld>
+  <p:clrMapOvr>
+    <a:masterClrMapping/>
+  </p:clrMapOvr>
+  <p:timing>
+    <p:tnLst>
+      <p:par>
+        <p:cTn id="1" dur="indefinite" restart="never" nodeType="tmRoot"/>
+      </p:par>
+    </p:tnLst>
+  </p:timing>
+</p:sld>
+</file>
+
+<file path=ppt/slides/slide20.xml><?xml version="1.0" encoding="utf-8"?>
 <p:sld xmlns:a="http://schemas.openxmlformats.org/drawingml/2006/main" xmlns:r="http://schemas.openxmlformats.org/officeDocument/2006/relationships" xmlns:p="http://schemas.openxmlformats.org/presentationml/2006/main">
   <p:cSld>
     <p:spTree>
@@ -25407,97 +26136,7 @@
 </p:sld>
 </file>
 
-<file path=ppt/slides/slide2.xml><?xml version="1.0" encoding="utf-8"?>
-<p:sld xmlns:a="http://schemas.openxmlformats.org/drawingml/2006/main" xmlns:r="http://schemas.openxmlformats.org/officeDocument/2006/relationships" xmlns:p="http://schemas.openxmlformats.org/presentationml/2006/main">
-  <p:cSld>
-    <p:spTree>
-      <p:nvGrpSpPr>
-        <p:cNvPr id="1" name=""/>
-        <p:cNvGrpSpPr/>
-        <p:nvPr/>
-      </p:nvGrpSpPr>
-      <p:grpSpPr>
-        <a:xfrm>
-          <a:off x="0" y="0"/>
-          <a:ext cx="0" cy="0"/>
-          <a:chOff x="0" y="0"/>
-          <a:chExt cx="0" cy="0"/>
-        </a:xfrm>
-      </p:grpSpPr>
-      <p:sp>
-        <p:nvSpPr>
-          <p:cNvPr id="2" name="Title 1"/>
-          <p:cNvSpPr>
-            <a:spLocks noGrp="1"/>
-          </p:cNvSpPr>
-          <p:nvPr>
-            <p:ph type="title"/>
-          </p:nvPr>
-        </p:nvSpPr>
-        <p:spPr/>
-        <p:txBody>
-          <a:bodyPr/>
-          <a:lstStyle/>
-          <a:p>
-            <a:r>
-              <a:rPr lang="fr-FR" dirty="0" smtClean="0"/>
-              <a:t>Powerpoint Templates</a:t>
-            </a:r>
-            <a:endParaRPr lang="fr-FR" dirty="0"/>
-          </a:p>
-        </p:txBody>
-      </p:sp>
-      <p:sp>
-        <p:nvSpPr>
-          <p:cNvPr id="3" name="Content Placeholder 2"/>
-          <p:cNvSpPr>
-            <a:spLocks noGrp="1"/>
-          </p:cNvSpPr>
-          <p:nvPr>
-            <p:ph type="body" sz="quarter" idx="11"/>
-          </p:nvPr>
-        </p:nvSpPr>
-        <p:spPr/>
-        <p:txBody>
-          <a:bodyPr/>
-          <a:lstStyle/>
-          <a:p>
-            <a:pPr algn="just"/>
-            <a:r>
-              <a:rPr lang="fr-FR" dirty="0" smtClean="0"/>
-              <a:t>When Word uses placeholder to target a customizable component, PowerPoint uses alternative text property of TextBox, Table or ChartArea</a:t>
-            </a:r>
-          </a:p>
-          <a:p>
-            <a:pPr algn="just"/>
-            <a:endParaRPr lang="fr-FR" dirty="0" smtClean="0"/>
-          </a:p>
-          <a:p>
-            <a:pPr algn="just"/>
-            <a:r>
-              <a:rPr lang="fr-FR" dirty="0" smtClean="0"/>
-              <a:t>To see alternative text property of all component, you should activate « Size and Position »  button in Powerpoint properties</a:t>
-            </a:r>
-            <a:endParaRPr lang="fr-FR" dirty="0"/>
-          </a:p>
-        </p:txBody>
-      </p:sp>
-    </p:spTree>
-  </p:cSld>
-  <p:clrMapOvr>
-    <a:masterClrMapping/>
-  </p:clrMapOvr>
-  <p:timing>
-    <p:tnLst>
-      <p:par>
-        <p:cTn id="1" dur="indefinite" restart="never" nodeType="tmRoot"/>
-      </p:par>
-    </p:tnLst>
-  </p:timing>
-</p:sld>
-</file>
-
-<file path=ppt/slides/slide20.xml><?xml version="1.0" encoding="utf-8"?>
+<file path=ppt/slides/slide21.xml><?xml version="1.0" encoding="utf-8"?>
 <p:sld xmlns:a="http://schemas.openxmlformats.org/drawingml/2006/main" xmlns:r="http://schemas.openxmlformats.org/officeDocument/2006/relationships" xmlns:p="http://schemas.openxmlformats.org/presentationml/2006/main">
   <p:cSld>
     <p:spTree>
@@ -27663,7 +28302,7 @@
 </p:sld>
 </file>
 
-<file path=ppt/slides/slide21.xml><?xml version="1.0" encoding="utf-8"?>
+<file path=ppt/slides/slide22.xml><?xml version="1.0" encoding="utf-8"?>
 <p:sld xmlns:a="http://schemas.openxmlformats.org/drawingml/2006/main" xmlns:r="http://schemas.openxmlformats.org/officeDocument/2006/relationships" xmlns:p="http://schemas.openxmlformats.org/presentationml/2006/main">
   <p:cSld>
     <p:spTree>
@@ -28806,7 +29445,7 @@
 </p:sld>
 </file>
 
-<file path=ppt/slides/slide22.xml><?xml version="1.0" encoding="utf-8"?>
+<file path=ppt/slides/slide23.xml><?xml version="1.0" encoding="utf-8"?>
 <p:sld xmlns:a="http://schemas.openxmlformats.org/drawingml/2006/main" xmlns:r="http://schemas.openxmlformats.org/officeDocument/2006/relationships" xmlns:p="http://schemas.openxmlformats.org/presentationml/2006/main">
   <p:cSld>
     <p:spTree>
@@ -28857,7 +29496,7 @@
                   <a:prstClr val="black"/>
                 </a:buClr>
               </a:pPr>
-              <a:t>22</a:t>
+              <a:t>23</a:t>
             </a:fld>
             <a:endParaRPr lang="en-US" dirty="0">
               <a:solidFill>

</xml_diff>

<commit_message>
REPORTGEN-40 : update templates
</commit_message>
<xml_diff>
--- a/CastReporting.Reporting/PortfolioTemplatesFiles/1- Portfolio-Powerpoint-components-library.pptx
+++ b/CastReporting.Reporting/PortfolioTemplatesFiles/1- Portfolio-Powerpoint-components-library.pptx
@@ -330,11 +330,11 @@
         </c:dLbls>
         <c:gapWidth val="150"/>
         <c:overlap val="100"/>
-        <c:axId val="348383072"/>
-        <c:axId val="348385032"/>
+        <c:axId val="431822856"/>
+        <c:axId val="431812664"/>
       </c:barChart>
       <c:catAx>
-        <c:axId val="348383072"/>
+        <c:axId val="431822856"/>
         <c:scaling>
           <c:orientation val="minMax"/>
         </c:scaling>
@@ -353,7 +353,7 @@
             </a:solidFill>
           </a:ln>
         </c:spPr>
-        <c:crossAx val="348385032"/>
+        <c:crossAx val="431812664"/>
         <c:crosses val="autoZero"/>
         <c:auto val="0"/>
         <c:lblAlgn val="ctr"/>
@@ -361,7 +361,7 @@
         <c:noMultiLvlLbl val="1"/>
       </c:catAx>
       <c:valAx>
-        <c:axId val="348385032"/>
+        <c:axId val="431812664"/>
         <c:scaling>
           <c:orientation val="minMax"/>
         </c:scaling>
@@ -381,7 +381,7 @@
             </a:solidFill>
           </a:ln>
         </c:spPr>
-        <c:crossAx val="348383072"/>
+        <c:crossAx val="431822856"/>
         <c:crosses val="autoZero"/>
         <c:crossBetween val="between"/>
       </c:valAx>
@@ -597,11 +597,11 @@
         </c:dLbls>
         <c:gapWidth val="150"/>
         <c:overlap val="100"/>
-        <c:axId val="348384248"/>
-        <c:axId val="236237000"/>
+        <c:axId val="431818544"/>
+        <c:axId val="431818936"/>
       </c:barChart>
       <c:catAx>
-        <c:axId val="348384248"/>
+        <c:axId val="431818544"/>
         <c:scaling>
           <c:orientation val="minMax"/>
         </c:scaling>
@@ -620,7 +620,7 @@
             </a:solidFill>
           </a:ln>
         </c:spPr>
-        <c:crossAx val="236237000"/>
+        <c:crossAx val="431818936"/>
         <c:crosses val="autoZero"/>
         <c:auto val="0"/>
         <c:lblAlgn val="ctr"/>
@@ -628,7 +628,7 @@
         <c:noMultiLvlLbl val="1"/>
       </c:catAx>
       <c:valAx>
-        <c:axId val="236237000"/>
+        <c:axId val="431818936"/>
         <c:scaling>
           <c:orientation val="minMax"/>
         </c:scaling>
@@ -648,7 +648,7 @@
             </a:solidFill>
           </a:ln>
         </c:spPr>
-        <c:crossAx val="348384248"/>
+        <c:crossAx val="431818544"/>
         <c:crosses val="autoZero"/>
         <c:crossBetween val="between"/>
       </c:valAx>
@@ -1433,8 +1433,8 @@
         <c:bubbleScale val="100"/>
         <c:showNegBubbles val="0"/>
         <c:sizeRepresents val="w"/>
-        <c:axId val="327138488"/>
-        <c:axId val="327133392"/>
+        <c:axId val="431813840"/>
+        <c:axId val="431814232"/>
         <c:extLst>
           <c:ext xmlns:c15="http://schemas.microsoft.com/office/drawing/2012/chart" uri="{02D57815-91ED-43cb-92C2-25804820EDAC}">
             <c15:filteredBubbleSeries>
@@ -1624,7 +1624,7 @@
         </c:extLst>
       </c:bubbleChart>
       <c:valAx>
-        <c:axId val="327138488"/>
+        <c:axId val="431813840"/>
         <c:scaling>
           <c:orientation val="minMax"/>
           <c:max val="4"/>
@@ -1709,13 +1709,13 @@
             <a:endParaRPr lang="en-US"/>
           </a:p>
         </c:txPr>
-        <c:crossAx val="327133392"/>
+        <c:crossAx val="431814232"/>
         <c:crosses val="autoZero"/>
         <c:crossBetween val="midCat"/>
         <c:minorUnit val="0.25"/>
       </c:valAx>
       <c:valAx>
-        <c:axId val="327133392"/>
+        <c:axId val="431814232"/>
         <c:scaling>
           <c:orientation val="minMax"/>
           <c:min val="0"/>
@@ -1799,7 +1799,7 @@
             <a:endParaRPr lang="en-US"/>
           </a:p>
         </c:txPr>
-        <c:crossAx val="327138488"/>
+        <c:crossAx val="431813840"/>
         <c:crosses val="autoZero"/>
         <c:crossBetween val="midCat"/>
       </c:valAx>
@@ -21921,11 +21921,7 @@
           <a:p>
             <a:r>
               <a:rPr lang="en-US" dirty="0" smtClean="0"/>
-              <a:t>PowerPoint Templates – Text </a:t>
-            </a:r>
-            <a:r>
-              <a:rPr lang="en-US" dirty="0" smtClean="0"/>
-              <a:t>[4]</a:t>
+              <a:t>PowerPoint Templates – Text [4]</a:t>
             </a:r>
             <a:endParaRPr lang="en-US" dirty="0"/>
           </a:p>
@@ -22250,7 +22246,6 @@
               <a:rPr lang="en-US" sz="1100" dirty="0"/>
               <a:t>(for portfolio component, to aggregate results of all applications for the custom expression, AVERAGE by default or if erroneous format is set)</a:t>
             </a:r>
-            <a:endParaRPr lang="en-US" sz="1100" dirty="0"/>
           </a:p>
         </p:txBody>
       </p:sp>
@@ -22349,7 +22344,7 @@
       </p:sp>
       <p:sp>
         <p:nvSpPr>
-          <p:cNvPr id="14" name="TextBox 13" descr="TEXT;PF_CUSTOM_EXPRESSION;PARAMS=SZ a SZ b,EXPR = a/b,a=67011, b=67211,FORMAT=N0,AGGREGATOR=SUM"/>
+          <p:cNvPr id="14" name="TextBox 13" descr="TEXT;PF_CUSTOM_EXPRESSION;PARAMS=SZ a SZ b,EXPR = a/b,a=67010, b=67011,FORMAT=N0,AGGREGATOR=SUM"/>
           <p:cNvSpPr txBox="1"/>
           <p:nvPr/>
         </p:nvSpPr>

</xml_diff>

<commit_message>
REPORTGEN-40 : fix templates issues
</commit_message>
<xml_diff>
--- a/CastReporting.Reporting/PortfolioTemplatesFiles/1- Portfolio-Powerpoint-components-library.pptx
+++ b/CastReporting.Reporting/PortfolioTemplatesFiles/1- Portfolio-Powerpoint-components-library.pptx
@@ -330,11 +330,11 @@
         </c:dLbls>
         <c:gapWidth val="150"/>
         <c:overlap val="100"/>
-        <c:axId val="431822856"/>
-        <c:axId val="431812664"/>
+        <c:axId val="249590528"/>
+        <c:axId val="249592880"/>
       </c:barChart>
       <c:catAx>
-        <c:axId val="431822856"/>
+        <c:axId val="249590528"/>
         <c:scaling>
           <c:orientation val="minMax"/>
         </c:scaling>
@@ -353,7 +353,7 @@
             </a:solidFill>
           </a:ln>
         </c:spPr>
-        <c:crossAx val="431812664"/>
+        <c:crossAx val="249592880"/>
         <c:crosses val="autoZero"/>
         <c:auto val="0"/>
         <c:lblAlgn val="ctr"/>
@@ -361,7 +361,7 @@
         <c:noMultiLvlLbl val="1"/>
       </c:catAx>
       <c:valAx>
-        <c:axId val="431812664"/>
+        <c:axId val="249592880"/>
         <c:scaling>
           <c:orientation val="minMax"/>
         </c:scaling>
@@ -381,7 +381,7 @@
             </a:solidFill>
           </a:ln>
         </c:spPr>
-        <c:crossAx val="431822856"/>
+        <c:crossAx val="249590528"/>
         <c:crosses val="autoZero"/>
         <c:crossBetween val="between"/>
       </c:valAx>
@@ -597,11 +597,11 @@
         </c:dLbls>
         <c:gapWidth val="150"/>
         <c:overlap val="100"/>
-        <c:axId val="431818544"/>
-        <c:axId val="431818936"/>
+        <c:axId val="249595624"/>
+        <c:axId val="249596016"/>
       </c:barChart>
       <c:catAx>
-        <c:axId val="431818544"/>
+        <c:axId val="249595624"/>
         <c:scaling>
           <c:orientation val="minMax"/>
         </c:scaling>
@@ -620,7 +620,7 @@
             </a:solidFill>
           </a:ln>
         </c:spPr>
-        <c:crossAx val="431818936"/>
+        <c:crossAx val="249596016"/>
         <c:crosses val="autoZero"/>
         <c:auto val="0"/>
         <c:lblAlgn val="ctr"/>
@@ -628,7 +628,7 @@
         <c:noMultiLvlLbl val="1"/>
       </c:catAx>
       <c:valAx>
-        <c:axId val="431818936"/>
+        <c:axId val="249596016"/>
         <c:scaling>
           <c:orientation val="minMax"/>
         </c:scaling>
@@ -648,7 +648,7 @@
             </a:solidFill>
           </a:ln>
         </c:spPr>
-        <c:crossAx val="431818544"/>
+        <c:crossAx val="249595624"/>
         <c:crosses val="autoZero"/>
         <c:crossBetween val="between"/>
       </c:valAx>
@@ -1433,8 +1433,8 @@
         <c:bubbleScale val="100"/>
         <c:showNegBubbles val="0"/>
         <c:sizeRepresents val="w"/>
-        <c:axId val="431813840"/>
-        <c:axId val="431814232"/>
+        <c:axId val="249597192"/>
+        <c:axId val="332531192"/>
         <c:extLst>
           <c:ext xmlns:c15="http://schemas.microsoft.com/office/drawing/2012/chart" uri="{02D57815-91ED-43cb-92C2-25804820EDAC}">
             <c15:filteredBubbleSeries>
@@ -1624,7 +1624,7 @@
         </c:extLst>
       </c:bubbleChart>
       <c:valAx>
-        <c:axId val="431813840"/>
+        <c:axId val="249597192"/>
         <c:scaling>
           <c:orientation val="minMax"/>
           <c:max val="4"/>
@@ -1709,13 +1709,13 @@
             <a:endParaRPr lang="en-US"/>
           </a:p>
         </c:txPr>
-        <c:crossAx val="431814232"/>
+        <c:crossAx val="332531192"/>
         <c:crosses val="autoZero"/>
         <c:crossBetween val="midCat"/>
         <c:minorUnit val="0.25"/>
       </c:valAx>
       <c:valAx>
-        <c:axId val="431814232"/>
+        <c:axId val="332531192"/>
         <c:scaling>
           <c:orientation val="minMax"/>
           <c:min val="0"/>
@@ -1799,7 +1799,7 @@
             <a:endParaRPr lang="en-US"/>
           </a:p>
         </c:txPr>
-        <c:crossAx val="431813840"/>
+        <c:crossAx val="249597192"/>
         <c:crosses val="autoZero"/>
         <c:crossBetween val="midCat"/>
       </c:valAx>
@@ -1920,7 +1920,7 @@
           <a:p>
             <a:fld id="{268042A1-6D91-4513-A62D-1E3FD70C84BE}" type="datetimeFigureOut">
               <a:rPr lang="fr-FR" smtClean="0"/>
-              <a:t>15/11/2016</a:t>
+              <a:t>17/11/2016</a:t>
             </a:fld>
             <a:endParaRPr lang="fr-FR"/>
           </a:p>
@@ -2523,7 +2523,7 @@
             <a:fld id="{D8E3BBD6-5DF7-411E-B793-6A3558CCCDCA}" type="datetimeFigureOut">
               <a:rPr lang="fr-FR" smtClean="0"/>
               <a:pPr/>
-              <a:t>15/11/2016</a:t>
+              <a:t>17/11/2016</a:t>
             </a:fld>
             <a:endParaRPr lang="fr-FR" dirty="0"/>
           </a:p>
@@ -2688,7 +2688,7 @@
             <a:fld id="{D8E3BBD6-5DF7-411E-B793-6A3558CCCDCA}" type="datetimeFigureOut">
               <a:rPr lang="fr-FR" smtClean="0"/>
               <a:pPr/>
-              <a:t>15/11/2016</a:t>
+              <a:t>17/11/2016</a:t>
             </a:fld>
             <a:endParaRPr lang="fr-FR" dirty="0"/>
           </a:p>
@@ -4222,7 +4222,7 @@
             <a:fld id="{D8E3BBD6-5DF7-411E-B793-6A3558CCCDCA}" type="datetimeFigureOut">
               <a:rPr lang="fr-FR" smtClean="0"/>
               <a:pPr/>
-              <a:t>15/11/2016</a:t>
+              <a:t>17/11/2016</a:t>
             </a:fld>
             <a:endParaRPr lang="fr-FR" dirty="0"/>
           </a:p>
@@ -6647,7 +6647,7 @@
             <a:fld id="{D8E3BBD6-5DF7-411E-B793-6A3558CCCDCA}" type="datetimeFigureOut">
               <a:rPr lang="fr-FR" smtClean="0"/>
               <a:pPr/>
-              <a:t>15/11/2016</a:t>
+              <a:t>17/11/2016</a:t>
             </a:fld>
             <a:endParaRPr lang="fr-FR" dirty="0"/>
           </a:p>
@@ -9328,7 +9328,7 @@
             <a:fld id="{D8E3BBD6-5DF7-411E-B793-6A3558CCCDCA}" type="datetimeFigureOut">
               <a:rPr lang="fr-FR" smtClean="0"/>
               <a:pPr/>
-              <a:t>15/11/2016</a:t>
+              <a:t>17/11/2016</a:t>
             </a:fld>
             <a:endParaRPr lang="fr-FR" dirty="0"/>
           </a:p>
@@ -12234,7 +12234,7 @@
             <a:fld id="{D8E3BBD6-5DF7-411E-B793-6A3558CCCDCA}" type="datetimeFigureOut">
               <a:rPr lang="fr-FR" smtClean="0"/>
               <a:pPr/>
-              <a:t>15/11/2016</a:t>
+              <a:t>17/11/2016</a:t>
             </a:fld>
             <a:endParaRPr lang="fr-FR" dirty="0"/>
           </a:p>
@@ -14021,7 +14021,7 @@
             <a:fld id="{D8E3BBD6-5DF7-411E-B793-6A3558CCCDCA}" type="datetimeFigureOut">
               <a:rPr lang="fr-FR" smtClean="0"/>
               <a:pPr/>
-              <a:t>15/11/2016</a:t>
+              <a:t>17/11/2016</a:t>
             </a:fld>
             <a:endParaRPr lang="fr-FR" dirty="0"/>
           </a:p>
@@ -14101,7 +14101,7 @@
             <a:fld id="{D8E3BBD6-5DF7-411E-B793-6A3558CCCDCA}" type="datetimeFigureOut">
               <a:rPr lang="fr-FR" smtClean="0"/>
               <a:pPr/>
-              <a:t>15/11/2016</a:t>
+              <a:t>17/11/2016</a:t>
             </a:fld>
             <a:endParaRPr lang="fr-FR" dirty="0"/>
           </a:p>
@@ -14363,7 +14363,7 @@
             <a:fld id="{D8E3BBD6-5DF7-411E-B793-6A3558CCCDCA}" type="datetimeFigureOut">
               <a:rPr lang="fr-FR" smtClean="0"/>
               <a:pPr/>
-              <a:t>15/11/2016</a:t>
+              <a:t>17/11/2016</a:t>
             </a:fld>
             <a:endParaRPr lang="fr-FR" dirty="0"/>
           </a:p>
@@ -14606,7 +14606,7 @@
             <a:fld id="{D8E3BBD6-5DF7-411E-B793-6A3558CCCDCA}" type="datetimeFigureOut">
               <a:rPr lang="fr-FR" smtClean="0"/>
               <a:pPr/>
-              <a:t>15/11/2016</a:t>
+              <a:t>17/11/2016</a:t>
             </a:fld>
             <a:endParaRPr lang="fr-FR" dirty="0"/>
           </a:p>
@@ -14808,7 +14808,7 @@
             <a:fld id="{D8E3BBD6-5DF7-411E-B793-6A3558CCCDCA}" type="datetimeFigureOut">
               <a:rPr lang="fr-FR" smtClean="0"/>
               <a:pPr/>
-              <a:t>15/11/2016</a:t>
+              <a:t>17/11/2016</a:t>
             </a:fld>
             <a:endParaRPr lang="fr-FR" dirty="0"/>
           </a:p>
@@ -22344,7 +22344,7 @@
       </p:sp>
       <p:sp>
         <p:nvSpPr>
-          <p:cNvPr id="14" name="TextBox 13" descr="TEXT;PF_CUSTOM_EXPRESSION;PARAMS=SZ a SZ b,EXPR = a/b,a=67010, b=67011,FORMAT=N0,AGGREGATOR=SUM"/>
+          <p:cNvPr id="14" name="TextBox 13" descr="TEXT;PF_CUSTOM_EXPRESSION;PARAMS=SZ a SZ b,EXPR=a/b,a=67010,b=67011,FORMAT=N2,AGGREGATOR=SUM"/>
           <p:cNvSpPr txBox="1"/>
           <p:nvPr/>
         </p:nvSpPr>
@@ -22393,8 +22393,8 @@
         </p:nvSpPr>
         <p:spPr>
           <a:xfrm>
-            <a:off x="1828111" y="3863690"/>
-            <a:ext cx="4824536" cy="1954381"/>
+            <a:off x="1576290" y="4050807"/>
+            <a:ext cx="5760640" cy="1615827"/>
           </a:xfrm>
           <a:prstGeom prst="rect">
             <a:avLst/>
@@ -22422,7 +22422,7 @@
           <a:p>
             <a:r>
               <a:rPr lang="en-GB" sz="1100" dirty="0"/>
-              <a:t>you could have as number of parameters as you want (</a:t>
+              <a:t>You can have as number of parameters as you want (</a:t>
             </a:r>
             <a:r>
               <a:rPr lang="en-GB" sz="1100" dirty="0" err="1"/>
@@ -22430,32 +22430,34 @@
             </a:r>
             <a:r>
               <a:rPr lang="en-GB" sz="1100" dirty="0"/>
-              <a:t> limit is 16383 !!)</a:t>
+              <a:t> limit is 16383…).</a:t>
             </a:r>
             <a:endParaRPr lang="en-US" sz="1100" dirty="0"/>
           </a:p>
           <a:p>
             <a:r>
-              <a:rPr lang="en-GB" sz="1100" dirty="0" err="1"/>
-              <a:t>cf</a:t>
-            </a:r>
-            <a:r>
               <a:rPr lang="en-GB" sz="1100" dirty="0"/>
-              <a:t> https://msdn.microsoft.com/en-us/library/dwhawy9k.aspx for the format</a:t>
-            </a:r>
-            <a:endParaRPr lang="en-US" sz="1100" dirty="0"/>
-          </a:p>
-          <a:p>
+              <a:t>The format of return value is explained here : </a:t>
+            </a:r>
+            <a:r>
+              <a:rPr lang="en-GB" sz="1100" dirty="0">
+                <a:hlinkClick r:id="rId2"/>
+              </a:rPr>
+              <a:t>https://msdn.microsoft.com/en-us/library/dwhawy9k.aspx</a:t>
+            </a:r>
             <a:r>
               <a:rPr lang="en-GB" sz="1100" dirty="0"/>
-              <a:t>(examples for double https://msdn.microsoft.com/en-us/library/kfsatb94.aspx)</a:t>
-            </a:r>
-            <a:endParaRPr lang="en-US" sz="1100" dirty="0"/>
-          </a:p>
-          <a:p>
+              <a:t>, with examples for double here : </a:t>
+            </a:r>
+            <a:r>
+              <a:rPr lang="en-GB" sz="1100" dirty="0">
+                <a:hlinkClick r:id="rId3"/>
+              </a:rPr>
+              <a:t>https://msdn.microsoft.com/en-us/library/kfsatb94.aspx</a:t>
+            </a:r>
             <a:r>
               <a:rPr lang="en-GB" sz="1100" dirty="0"/>
-              <a:t>only N format is interesting here :</a:t>
+              <a:t> ), only N format is interesting here :</a:t>
             </a:r>
             <a:endParaRPr lang="en-US" sz="1100" dirty="0"/>
           </a:p>
@@ -22490,9 +22492,8 @@
           <a:p>
             <a:r>
               <a:rPr lang="en-GB" sz="1100" dirty="0"/>
-              <a:t>N3: -195,489,100.838</a:t>
-            </a:r>
-            <a:endParaRPr lang="en-US" sz="1100" dirty="0"/>
+              <a:t>/!\ don’t put blank char in the definition of parameters (,a=67011,b=67010,c=…)</a:t>
+            </a:r>
           </a:p>
         </p:txBody>
       </p:sp>

</xml_diff>

<commit_message>
REPORTGEN-189 : update explanations about component PF_BC_RELEASE_PERFORMANCE
</commit_message>
<xml_diff>
--- a/CastReporting.Reporting/PortfolioTemplatesFiles/1- Portfolio-Powerpoint-components-library.pptx
+++ b/CastReporting.Reporting/PortfolioTemplatesFiles/1- Portfolio-Powerpoint-components-library.pptx
@@ -10,7 +10,7 @@
     <p:sldMasterId id="2147483713" r:id="rId6"/>
   </p:sldMasterIdLst>
   <p:notesMasterIdLst>
-    <p:notesMasterId r:id="rId30"/>
+    <p:notesMasterId r:id="rId31"/>
   </p:notesMasterIdLst>
   <p:sldIdLst>
     <p:sldId id="262" r:id="rId7"/>
@@ -34,8 +34,9 @@
     <p:sldId id="280" r:id="rId25"/>
     <p:sldId id="332" r:id="rId26"/>
     <p:sldId id="303" r:id="rId27"/>
-    <p:sldId id="333" r:id="rId28"/>
-    <p:sldId id="318" r:id="rId29"/>
+    <p:sldId id="335" r:id="rId28"/>
+    <p:sldId id="333" r:id="rId29"/>
+    <p:sldId id="318" r:id="rId30"/>
   </p:sldIdLst>
   <p:sldSz cx="9144000" cy="6858000" type="screen4x3"/>
   <p:notesSz cx="6858000" cy="9144000"/>
@@ -330,11 +331,11 @@
         </c:dLbls>
         <c:gapWidth val="150"/>
         <c:overlap val="100"/>
-        <c:axId val="249590528"/>
-        <c:axId val="249592880"/>
+        <c:axId val="471426128"/>
+        <c:axId val="471425344"/>
       </c:barChart>
       <c:catAx>
-        <c:axId val="249590528"/>
+        <c:axId val="471426128"/>
         <c:scaling>
           <c:orientation val="minMax"/>
         </c:scaling>
@@ -353,7 +354,7 @@
             </a:solidFill>
           </a:ln>
         </c:spPr>
-        <c:crossAx val="249592880"/>
+        <c:crossAx val="471425344"/>
         <c:crosses val="autoZero"/>
         <c:auto val="0"/>
         <c:lblAlgn val="ctr"/>
@@ -361,7 +362,7 @@
         <c:noMultiLvlLbl val="1"/>
       </c:catAx>
       <c:valAx>
-        <c:axId val="249592880"/>
+        <c:axId val="471425344"/>
         <c:scaling>
           <c:orientation val="minMax"/>
         </c:scaling>
@@ -381,7 +382,7 @@
             </a:solidFill>
           </a:ln>
         </c:spPr>
-        <c:crossAx val="249590528"/>
+        <c:crossAx val="471426128"/>
         <c:crosses val="autoZero"/>
         <c:crossBetween val="between"/>
       </c:valAx>
@@ -597,11 +598,11 @@
         </c:dLbls>
         <c:gapWidth val="150"/>
         <c:overlap val="100"/>
-        <c:axId val="249595624"/>
-        <c:axId val="249596016"/>
+        <c:axId val="471422600"/>
+        <c:axId val="471419072"/>
       </c:barChart>
       <c:catAx>
-        <c:axId val="249595624"/>
+        <c:axId val="471422600"/>
         <c:scaling>
           <c:orientation val="minMax"/>
         </c:scaling>
@@ -620,7 +621,7 @@
             </a:solidFill>
           </a:ln>
         </c:spPr>
-        <c:crossAx val="249596016"/>
+        <c:crossAx val="471419072"/>
         <c:crosses val="autoZero"/>
         <c:auto val="0"/>
         <c:lblAlgn val="ctr"/>
@@ -628,7 +629,7 @@
         <c:noMultiLvlLbl val="1"/>
       </c:catAx>
       <c:valAx>
-        <c:axId val="249596016"/>
+        <c:axId val="471419072"/>
         <c:scaling>
           <c:orientation val="minMax"/>
         </c:scaling>
@@ -648,7 +649,7 @@
             </a:solidFill>
           </a:ln>
         </c:spPr>
-        <c:crossAx val="249595624"/>
+        <c:crossAx val="471422600"/>
         <c:crosses val="autoZero"/>
         <c:crossBetween val="between"/>
       </c:valAx>
@@ -738,6 +739,7 @@
           <c:dLbls>
             <c:dLbl>
               <c:idx val="0"/>
+              <c:layout/>
               <c:tx>
                 <c:rich>
                   <a:bodyPr/>
@@ -765,6 +767,7 @@
               <c:showBubbleSize val="0"/>
               <c:extLst>
                 <c:ext xmlns:c15="http://schemas.microsoft.com/office/drawing/2012/chart" uri="{CE6537A1-D6FC-4f65-9D91-7224C49458BB}">
+                  <c15:layout/>
                   <c15:dlblFieldTable/>
                   <c15:showDataLabelsRange val="1"/>
                 </c:ext>
@@ -772,6 +775,7 @@
             </c:dLbl>
             <c:dLbl>
               <c:idx val="1"/>
+              <c:layout/>
               <c:tx>
                 <c:rich>
                   <a:bodyPr/>
@@ -799,6 +803,7 @@
               <c:showBubbleSize val="0"/>
               <c:extLst>
                 <c:ext xmlns:c15="http://schemas.microsoft.com/office/drawing/2012/chart" uri="{CE6537A1-D6FC-4f65-9D91-7224C49458BB}">
+                  <c15:layout/>
                   <c15:dlblFieldTable/>
                   <c15:showDataLabelsRange val="1"/>
                 </c:ext>
@@ -806,6 +811,7 @@
             </c:dLbl>
             <c:dLbl>
               <c:idx val="2"/>
+              <c:layout/>
               <c:tx>
                 <c:rich>
                   <a:bodyPr/>
@@ -833,6 +839,7 @@
               <c:showBubbleSize val="0"/>
               <c:extLst>
                 <c:ext xmlns:c15="http://schemas.microsoft.com/office/drawing/2012/chart" uri="{CE6537A1-D6FC-4f65-9D91-7224C49458BB}">
+                  <c15:layout/>
                   <c15:dlblFieldTable/>
                   <c15:showDataLabelsRange val="1"/>
                 </c:ext>
@@ -840,6 +847,7 @@
             </c:dLbl>
             <c:dLbl>
               <c:idx val="3"/>
+              <c:layout/>
               <c:tx>
                 <c:rich>
                   <a:bodyPr/>
@@ -867,6 +875,7 @@
               <c:showBubbleSize val="0"/>
               <c:extLst>
                 <c:ext xmlns:c15="http://schemas.microsoft.com/office/drawing/2012/chart" uri="{CE6537A1-D6FC-4f65-9D91-7224C49458BB}">
+                  <c15:layout/>
                   <c15:dlblFieldTable/>
                   <c15:showDataLabelsRange val="1"/>
                 </c:ext>
@@ -874,6 +883,7 @@
             </c:dLbl>
             <c:dLbl>
               <c:idx val="4"/>
+              <c:layout/>
               <c:tx>
                 <c:rich>
                   <a:bodyPr/>
@@ -901,6 +911,7 @@
               <c:showBubbleSize val="0"/>
               <c:extLst>
                 <c:ext xmlns:c15="http://schemas.microsoft.com/office/drawing/2012/chart" uri="{CE6537A1-D6FC-4f65-9D91-7224C49458BB}">
+                  <c15:layout/>
                   <c15:dlblFieldTable/>
                   <c15:showDataLabelsRange val="1"/>
                 </c:ext>
@@ -908,6 +919,7 @@
             </c:dLbl>
             <c:dLbl>
               <c:idx val="5"/>
+              <c:layout/>
               <c:tx>
                 <c:rich>
                   <a:bodyPr/>
@@ -935,6 +947,7 @@
               <c:showBubbleSize val="0"/>
               <c:extLst>
                 <c:ext xmlns:c15="http://schemas.microsoft.com/office/drawing/2012/chart" uri="{CE6537A1-D6FC-4f65-9D91-7224C49458BB}">
+                  <c15:layout/>
                   <c15:dlblFieldTable/>
                   <c15:showDataLabelsRange val="1"/>
                 </c:ext>
@@ -942,6 +955,7 @@
             </c:dLbl>
             <c:dLbl>
               <c:idx val="6"/>
+              <c:layout/>
               <c:tx>
                 <c:rich>
                   <a:bodyPr/>
@@ -969,6 +983,7 @@
               <c:showBubbleSize val="0"/>
               <c:extLst>
                 <c:ext xmlns:c15="http://schemas.microsoft.com/office/drawing/2012/chart" uri="{CE6537A1-D6FC-4f65-9D91-7224C49458BB}">
+                  <c15:layout/>
                   <c15:dlblFieldTable/>
                   <c15:showDataLabelsRange val="1"/>
                 </c:ext>
@@ -976,6 +991,7 @@
             </c:dLbl>
             <c:dLbl>
               <c:idx val="7"/>
+              <c:layout/>
               <c:tx>
                 <c:rich>
                   <a:bodyPr/>
@@ -1003,6 +1019,7 @@
               <c:showBubbleSize val="0"/>
               <c:extLst>
                 <c:ext xmlns:c15="http://schemas.microsoft.com/office/drawing/2012/chart" uri="{CE6537A1-D6FC-4f65-9D91-7224C49458BB}">
+                  <c15:layout/>
                   <c15:dlblFieldTable/>
                   <c15:showDataLabelsRange val="1"/>
                 </c:ext>
@@ -1010,6 +1027,7 @@
             </c:dLbl>
             <c:dLbl>
               <c:idx val="8"/>
+              <c:layout/>
               <c:tx>
                 <c:rich>
                   <a:bodyPr/>
@@ -1037,6 +1055,7 @@
               <c:showBubbleSize val="0"/>
               <c:extLst>
                 <c:ext xmlns:c15="http://schemas.microsoft.com/office/drawing/2012/chart" uri="{CE6537A1-D6FC-4f65-9D91-7224C49458BB}">
+                  <c15:layout/>
                   <c15:dlblFieldTable/>
                   <c15:showDataLabelsRange val="1"/>
                 </c:ext>
@@ -1044,6 +1063,7 @@
             </c:dLbl>
             <c:dLbl>
               <c:idx val="9"/>
+              <c:layout/>
               <c:tx>
                 <c:rich>
                   <a:bodyPr/>
@@ -1071,6 +1091,7 @@
               <c:showBubbleSize val="0"/>
               <c:extLst>
                 <c:ext xmlns:c15="http://schemas.microsoft.com/office/drawing/2012/chart" uri="{CE6537A1-D6FC-4f65-9D91-7224C49458BB}">
+                  <c15:layout/>
                   <c15:dlblFieldTable/>
                   <c15:showDataLabelsRange val="1"/>
                 </c:ext>
@@ -1078,6 +1099,7 @@
             </c:dLbl>
             <c:dLbl>
               <c:idx val="10"/>
+              <c:layout/>
               <c:tx>
                 <c:rich>
                   <a:bodyPr/>
@@ -1105,6 +1127,7 @@
               <c:showBubbleSize val="0"/>
               <c:extLst>
                 <c:ext xmlns:c15="http://schemas.microsoft.com/office/drawing/2012/chart" uri="{CE6537A1-D6FC-4f65-9D91-7224C49458BB}">
+                  <c15:layout/>
                   <c15:dlblFieldTable/>
                   <c15:showDataLabelsRange val="1"/>
                 </c:ext>
@@ -1112,6 +1135,7 @@
             </c:dLbl>
             <c:dLbl>
               <c:idx val="11"/>
+              <c:layout/>
               <c:tx>
                 <c:rich>
                   <a:bodyPr/>
@@ -1139,6 +1163,7 @@
               <c:showBubbleSize val="0"/>
               <c:extLst>
                 <c:ext xmlns:c15="http://schemas.microsoft.com/office/drawing/2012/chart" uri="{CE6537A1-D6FC-4f65-9D91-7224C49458BB}">
+                  <c15:layout/>
                   <c15:dlblFieldTable/>
                   <c15:showDataLabelsRange val="1"/>
                 </c:ext>
@@ -1146,6 +1171,7 @@
             </c:dLbl>
             <c:dLbl>
               <c:idx val="12"/>
+              <c:layout/>
               <c:tx>
                 <c:rich>
                   <a:bodyPr/>
@@ -1173,6 +1199,7 @@
               <c:showBubbleSize val="0"/>
               <c:extLst>
                 <c:ext xmlns:c15="http://schemas.microsoft.com/office/drawing/2012/chart" uri="{CE6537A1-D6FC-4f65-9D91-7224C49458BB}">
+                  <c15:layout/>
                   <c15:dlblFieldTable/>
                   <c15:showDataLabelsRange val="1"/>
                 </c:ext>
@@ -1433,8 +1460,8 @@
         <c:bubbleScale val="100"/>
         <c:showNegBubbles val="0"/>
         <c:sizeRepresents val="w"/>
-        <c:axId val="249597192"/>
-        <c:axId val="332531192"/>
+        <c:axId val="471426912"/>
+        <c:axId val="471432008"/>
         <c:extLst>
           <c:ext xmlns:c15="http://schemas.microsoft.com/office/drawing/2012/chart" uri="{02D57815-91ED-43cb-92C2-25804820EDAC}">
             <c15:filteredBubbleSeries>
@@ -1624,7 +1651,7 @@
         </c:extLst>
       </c:bubbleChart>
       <c:valAx>
-        <c:axId val="249597192"/>
+        <c:axId val="471426912"/>
         <c:scaling>
           <c:orientation val="minMax"/>
           <c:max val="4"/>
@@ -1675,6 +1702,7 @@
               </a:p>
             </c:rich>
           </c:tx>
+          <c:layout/>
           <c:overlay val="0"/>
         </c:title>
         <c:numFmt formatCode="0.00" sourceLinked="0"/>
@@ -1709,13 +1737,13 @@
             <a:endParaRPr lang="en-US"/>
           </a:p>
         </c:txPr>
-        <c:crossAx val="332531192"/>
+        <c:crossAx val="471432008"/>
         <c:crosses val="autoZero"/>
         <c:crossBetween val="midCat"/>
         <c:minorUnit val="0.25"/>
       </c:valAx>
       <c:valAx>
-        <c:axId val="332531192"/>
+        <c:axId val="471432008"/>
         <c:scaling>
           <c:orientation val="minMax"/>
           <c:min val="0"/>
@@ -1765,6 +1793,7 @@
               </a:p>
             </c:rich>
           </c:tx>
+          <c:layout/>
           <c:overlay val="0"/>
         </c:title>
         <c:numFmt formatCode="General" sourceLinked="0"/>
@@ -1799,7 +1828,7 @@
             <a:endParaRPr lang="en-US"/>
           </a:p>
         </c:txPr>
-        <c:crossAx val="249597192"/>
+        <c:crossAx val="471426912"/>
         <c:crosses val="autoZero"/>
         <c:crossBetween val="midCat"/>
       </c:valAx>
@@ -1920,7 +1949,7 @@
           <a:p>
             <a:fld id="{268042A1-6D91-4513-A62D-1E3FD70C84BE}" type="datetimeFigureOut">
               <a:rPr lang="fr-FR" smtClean="0"/>
-              <a:t>17/11/2016</a:t>
+              <a:t>30/12/2016</a:t>
             </a:fld>
             <a:endParaRPr lang="fr-FR"/>
           </a:p>
@@ -2523,7 +2552,7 @@
             <a:fld id="{D8E3BBD6-5DF7-411E-B793-6A3558CCCDCA}" type="datetimeFigureOut">
               <a:rPr lang="fr-FR" smtClean="0"/>
               <a:pPr/>
-              <a:t>17/11/2016</a:t>
+              <a:t>30/12/2016</a:t>
             </a:fld>
             <a:endParaRPr lang="fr-FR" dirty="0"/>
           </a:p>
@@ -2688,7 +2717,7 @@
             <a:fld id="{D8E3BBD6-5DF7-411E-B793-6A3558CCCDCA}" type="datetimeFigureOut">
               <a:rPr lang="fr-FR" smtClean="0"/>
               <a:pPr/>
-              <a:t>17/11/2016</a:t>
+              <a:t>30/12/2016</a:t>
             </a:fld>
             <a:endParaRPr lang="fr-FR" dirty="0"/>
           </a:p>
@@ -4222,7 +4251,7 @@
             <a:fld id="{D8E3BBD6-5DF7-411E-B793-6A3558CCCDCA}" type="datetimeFigureOut">
               <a:rPr lang="fr-FR" smtClean="0"/>
               <a:pPr/>
-              <a:t>17/11/2016</a:t>
+              <a:t>30/12/2016</a:t>
             </a:fld>
             <a:endParaRPr lang="fr-FR" dirty="0"/>
           </a:p>
@@ -6647,7 +6676,7 @@
             <a:fld id="{D8E3BBD6-5DF7-411E-B793-6A3558CCCDCA}" type="datetimeFigureOut">
               <a:rPr lang="fr-FR" smtClean="0"/>
               <a:pPr/>
-              <a:t>17/11/2016</a:t>
+              <a:t>30/12/2016</a:t>
             </a:fld>
             <a:endParaRPr lang="fr-FR" dirty="0"/>
           </a:p>
@@ -9328,7 +9357,7 @@
             <a:fld id="{D8E3BBD6-5DF7-411E-B793-6A3558CCCDCA}" type="datetimeFigureOut">
               <a:rPr lang="fr-FR" smtClean="0"/>
               <a:pPr/>
-              <a:t>17/11/2016</a:t>
+              <a:t>30/12/2016</a:t>
             </a:fld>
             <a:endParaRPr lang="fr-FR" dirty="0"/>
           </a:p>
@@ -12234,7 +12263,7 @@
             <a:fld id="{D8E3BBD6-5DF7-411E-B793-6A3558CCCDCA}" type="datetimeFigureOut">
               <a:rPr lang="fr-FR" smtClean="0"/>
               <a:pPr/>
-              <a:t>17/11/2016</a:t>
+              <a:t>30/12/2016</a:t>
             </a:fld>
             <a:endParaRPr lang="fr-FR" dirty="0"/>
           </a:p>
@@ -14021,7 +14050,7 @@
             <a:fld id="{D8E3BBD6-5DF7-411E-B793-6A3558CCCDCA}" type="datetimeFigureOut">
               <a:rPr lang="fr-FR" smtClean="0"/>
               <a:pPr/>
-              <a:t>17/11/2016</a:t>
+              <a:t>30/12/2016</a:t>
             </a:fld>
             <a:endParaRPr lang="fr-FR" dirty="0"/>
           </a:p>
@@ -14101,7 +14130,7 @@
             <a:fld id="{D8E3BBD6-5DF7-411E-B793-6A3558CCCDCA}" type="datetimeFigureOut">
               <a:rPr lang="fr-FR" smtClean="0"/>
               <a:pPr/>
-              <a:t>17/11/2016</a:t>
+              <a:t>30/12/2016</a:t>
             </a:fld>
             <a:endParaRPr lang="fr-FR" dirty="0"/>
           </a:p>
@@ -14363,7 +14392,7 @@
             <a:fld id="{D8E3BBD6-5DF7-411E-B793-6A3558CCCDCA}" type="datetimeFigureOut">
               <a:rPr lang="fr-FR" smtClean="0"/>
               <a:pPr/>
-              <a:t>17/11/2016</a:t>
+              <a:t>30/12/2016</a:t>
             </a:fld>
             <a:endParaRPr lang="fr-FR" dirty="0"/>
           </a:p>
@@ -14606,7 +14635,7 @@
             <a:fld id="{D8E3BBD6-5DF7-411E-B793-6A3558CCCDCA}" type="datetimeFigureOut">
               <a:rPr lang="fr-FR" smtClean="0"/>
               <a:pPr/>
-              <a:t>17/11/2016</a:t>
+              <a:t>30/12/2016</a:t>
             </a:fld>
             <a:endParaRPr lang="fr-FR" dirty="0"/>
           </a:p>
@@ -14808,7 +14837,7 @@
             <a:fld id="{D8E3BBD6-5DF7-411E-B793-6A3558CCCDCA}" type="datetimeFigureOut">
               <a:rPr lang="fr-FR" smtClean="0"/>
               <a:pPr/>
-              <a:t>17/11/2016</a:t>
+              <a:t>30/12/2016</a:t>
             </a:fld>
             <a:endParaRPr lang="fr-FR" dirty="0"/>
           </a:p>
@@ -19333,7 +19362,11 @@
           <a:p>
             <a:r>
               <a:rPr lang="en-US" dirty="0" smtClean="0"/>
-              <a:t>PowerPoint Templates – Text [2]</a:t>
+              <a:t>PowerPoint Templates – </a:t>
+            </a:r>
+            <a:r>
+              <a:rPr lang="en-US" dirty="0" smtClean="0"/>
+              <a:t>Text</a:t>
             </a:r>
             <a:endParaRPr lang="en-US" dirty="0"/>
           </a:p>
@@ -20597,7 +20630,11 @@
           <a:p>
             <a:r>
               <a:rPr lang="en-US" dirty="0" smtClean="0"/>
-              <a:t>PowerPoint Templates – Text [3]</a:t>
+              <a:t>PowerPoint Templates – </a:t>
+            </a:r>
+            <a:r>
+              <a:rPr lang="en-US" dirty="0" smtClean="0"/>
+              <a:t>Text</a:t>
             </a:r>
             <a:endParaRPr lang="en-US" dirty="0"/>
           </a:p>
@@ -21921,7 +21958,11 @@
           <a:p>
             <a:r>
               <a:rPr lang="en-US" dirty="0" smtClean="0"/>
-              <a:t>PowerPoint Templates – Text [4]</a:t>
+              <a:t>PowerPoint Templates – </a:t>
+            </a:r>
+            <a:r>
+              <a:rPr lang="en-US" dirty="0" smtClean="0"/>
+              <a:t>Text</a:t>
             </a:r>
             <a:endParaRPr lang="en-US" dirty="0"/>
           </a:p>
@@ -22624,7 +22665,11 @@
           <a:p>
             <a:r>
               <a:rPr lang="fr-FR" dirty="0" smtClean="0"/>
-              <a:t>PowerPoint Templates – Graphics [1]</a:t>
+              <a:t>PowerPoint Templates – </a:t>
+            </a:r>
+            <a:r>
+              <a:rPr lang="fr-FR" dirty="0" smtClean="0"/>
+              <a:t>Graphics</a:t>
             </a:r>
             <a:endParaRPr lang="fr-FR" dirty="0"/>
           </a:p>
@@ -22735,7 +22780,11 @@
           <a:p>
             <a:r>
               <a:rPr lang="en-US" dirty="0" smtClean="0"/>
-              <a:t>PowerPoint Templates – Graphics [5]</a:t>
+              <a:t>PowerPoint Templates – </a:t>
+            </a:r>
+            <a:r>
+              <a:rPr lang="en-US" dirty="0" smtClean="0"/>
+              <a:t>Graphics</a:t>
             </a:r>
             <a:endParaRPr lang="en-US" dirty="0"/>
           </a:p>
@@ -23167,7 +23216,11 @@
           <a:p>
             <a:r>
               <a:rPr lang="en-US" dirty="0" smtClean="0"/>
-              <a:t>PowerPoint Templates – Graphics [5]</a:t>
+              <a:t>PowerPoint Templates – </a:t>
+            </a:r>
+            <a:r>
+              <a:rPr lang="en-US" dirty="0" smtClean="0"/>
+              <a:t>Graphics</a:t>
             </a:r>
             <a:endParaRPr lang="en-US" dirty="0"/>
           </a:p>
@@ -23611,12 +23664,8 @@
               <a:t>PowerPoint Templates – </a:t>
             </a:r>
             <a:r>
-              <a:rPr lang="fr-FR" dirty="0" err="1" smtClean="0"/>
+              <a:rPr lang="fr-FR" dirty="0" smtClean="0"/>
               <a:t>Graphics</a:t>
-            </a:r>
-            <a:r>
-              <a:rPr lang="fr-FR" dirty="0" smtClean="0"/>
-              <a:t> [6]</a:t>
             </a:r>
             <a:endParaRPr lang="fr-FR" dirty="0"/>
           </a:p>
@@ -24135,7 +24184,11 @@
           <a:p>
             <a:r>
               <a:rPr lang="fr-FR" dirty="0" smtClean="0"/>
-              <a:t>PowerPoint Templates – Tables [1]</a:t>
+              <a:t>PowerPoint Templates – </a:t>
+            </a:r>
+            <a:r>
+              <a:rPr lang="fr-FR" dirty="0" smtClean="0"/>
+              <a:t>Tables</a:t>
             </a:r>
             <a:endParaRPr lang="fr-FR" dirty="0"/>
           </a:p>
@@ -24341,7 +24394,11 @@
           <a:p>
             <a:r>
               <a:rPr lang="en-US" dirty="0" smtClean="0"/>
-              <a:t>PowerPoint Templates – Tables – [8]</a:t>
+              <a:t>PowerPoint Templates – </a:t>
+            </a:r>
+            <a:r>
+              <a:rPr lang="en-US" dirty="0" smtClean="0"/>
+              <a:t>Tables</a:t>
             </a:r>
             <a:endParaRPr lang="en-US" dirty="0"/>
           </a:p>
@@ -26168,7 +26225,11 @@
           <a:p>
             <a:r>
               <a:rPr lang="en-US" dirty="0" smtClean="0"/>
-              <a:t>PowerPoint Templates – Tables – [9]</a:t>
+              <a:t>PowerPoint Templates – </a:t>
+            </a:r>
+            <a:r>
+              <a:rPr lang="en-US" dirty="0" smtClean="0"/>
+              <a:t>Tables</a:t>
             </a:r>
             <a:endParaRPr lang="en-US" dirty="0"/>
           </a:p>
@@ -26503,13 +26564,13 @@
           <p:nvPr>
             <p:extLst>
               <p:ext uri="{D42A27DB-BD31-4B8C-83A1-F6EECF244321}">
-                <p14:modId xmlns:p14="http://schemas.microsoft.com/office/powerpoint/2010/main" val="3399398948"/>
+                <p14:modId xmlns:p14="http://schemas.microsoft.com/office/powerpoint/2010/main" val="1441438410"/>
               </p:ext>
             </p:extLst>
           </p:nvPr>
         </p:nvGraphicFramePr>
         <p:xfrm>
-          <a:off x="827584" y="3755990"/>
+          <a:off x="827583" y="3896588"/>
           <a:ext cx="7488834" cy="2697346"/>
         </p:xfrm>
         <a:graphic>
@@ -28047,201 +28108,6 @@
       </p:graphicFrame>
       <p:sp>
         <p:nvSpPr>
-          <p:cNvPr id="2" name="Rectangle 1"/>
-          <p:cNvSpPr/>
-          <p:nvPr/>
-        </p:nvSpPr>
-        <p:spPr>
-          <a:xfrm>
-            <a:off x="1985510" y="2248996"/>
-            <a:ext cx="6785832" cy="1615827"/>
-          </a:xfrm>
-          <a:prstGeom prst="rect">
-            <a:avLst/>
-          </a:prstGeom>
-          <a:noFill/>
-        </p:spPr>
-        <p:txBody>
-          <a:bodyPr wrap="none" rtlCol="0">
-            <a:spAutoFit/>
-          </a:bodyPr>
-          <a:lstStyle/>
-          <a:p>
-            <a:r>
-              <a:rPr lang="en-US" sz="1100" b="1" dirty="0" smtClean="0">
-                <a:solidFill>
-                  <a:schemeClr val="bg1">
-                    <a:lumMod val="50000"/>
-                  </a:schemeClr>
-                </a:solidFill>
-              </a:rPr>
-              <a:t>SLA Assessment thresholds</a:t>
-            </a:r>
-          </a:p>
-          <a:p>
-            <a:pPr lvl="1"/>
-            <a:r>
-              <a:rPr lang="en-US" sz="1100" dirty="0" smtClean="0">
-                <a:solidFill>
-                  <a:schemeClr val="bg1">
-                    <a:lumMod val="50000"/>
-                  </a:schemeClr>
-                </a:solidFill>
-              </a:rPr>
-              <a:t>Good if % difference between Target and Actual is less than 2%</a:t>
-            </a:r>
-          </a:p>
-          <a:p>
-            <a:pPr lvl="1"/>
-            <a:r>
-              <a:rPr lang="en-US" sz="1100" dirty="0" smtClean="0">
-                <a:solidFill>
-                  <a:schemeClr val="bg1">
-                    <a:lumMod val="50000"/>
-                  </a:schemeClr>
-                </a:solidFill>
-              </a:rPr>
-              <a:t>Acceptable if &amp; difference between Target and Actual is between 2% and 5%</a:t>
-            </a:r>
-          </a:p>
-          <a:p>
-            <a:pPr lvl="1"/>
-            <a:r>
-              <a:rPr lang="en-US" sz="1100" dirty="0" smtClean="0">
-                <a:solidFill>
-                  <a:schemeClr val="bg1">
-                    <a:lumMod val="50000"/>
-                  </a:schemeClr>
-                </a:solidFill>
-              </a:rPr>
-              <a:t>Poor if % difference between Target and Actual is greater than 5%</a:t>
-            </a:r>
-          </a:p>
-          <a:p>
-            <a:r>
-              <a:rPr lang="en-US" sz="1100" b="1" dirty="0" smtClean="0">
-                <a:solidFill>
-                  <a:schemeClr val="bg1">
-                    <a:lumMod val="50000"/>
-                  </a:schemeClr>
-                </a:solidFill>
-              </a:rPr>
-              <a:t>Actual score </a:t>
-            </a:r>
-            <a:r>
-              <a:rPr lang="en-US" sz="1100" dirty="0" smtClean="0">
-                <a:solidFill>
-                  <a:schemeClr val="bg1">
-                    <a:lumMod val="50000"/>
-                  </a:schemeClr>
-                </a:solidFill>
-              </a:rPr>
-              <a:t>: average score using latest snapshot data (even if snapshot date is before current quarter</a:t>
-            </a:r>
-          </a:p>
-          <a:p>
-            <a:r>
-              <a:rPr lang="en-US" sz="1100" b="1" dirty="0" smtClean="0">
-                <a:solidFill>
-                  <a:schemeClr val="bg1">
-                    <a:lumMod val="50000"/>
-                  </a:schemeClr>
-                </a:solidFill>
-              </a:rPr>
-              <a:t>Target score</a:t>
-            </a:r>
-            <a:r>
-              <a:rPr lang="en-US" sz="1100" dirty="0" smtClean="0">
-                <a:solidFill>
-                  <a:schemeClr val="bg1">
-                    <a:lumMod val="50000"/>
-                  </a:schemeClr>
-                </a:solidFill>
-              </a:rPr>
-              <a:t>: score to reach, to be configured as an option of the component</a:t>
-            </a:r>
-          </a:p>
-          <a:p>
-            <a:r>
-              <a:rPr lang="en-US" sz="1100" b="1" dirty="0" smtClean="0">
-                <a:solidFill>
-                  <a:schemeClr val="bg1">
-                    <a:lumMod val="50000"/>
-                  </a:schemeClr>
-                </a:solidFill>
-              </a:rPr>
-              <a:t>Score </a:t>
-            </a:r>
-            <a:r>
-              <a:rPr lang="en-US" sz="1100" b="1" dirty="0">
-                <a:solidFill>
-                  <a:schemeClr val="bg1">
-                    <a:lumMod val="50000"/>
-                  </a:schemeClr>
-                </a:solidFill>
-              </a:rPr>
-              <a:t>from previous quarter</a:t>
-            </a:r>
-            <a:r>
-              <a:rPr lang="en-US" sz="1100" dirty="0">
-                <a:solidFill>
-                  <a:schemeClr val="bg1">
-                    <a:lumMod val="50000"/>
-                  </a:schemeClr>
-                </a:solidFill>
-              </a:rPr>
-              <a:t>: average score using snapshot from previous quarter. If last snapshot date </a:t>
-            </a:r>
-            <a:br>
-              <a:rPr lang="en-US" sz="1100" dirty="0">
-                <a:solidFill>
-                  <a:schemeClr val="bg1">
-                    <a:lumMod val="50000"/>
-                  </a:schemeClr>
-                </a:solidFill>
-              </a:rPr>
-            </a:br>
-            <a:r>
-              <a:rPr lang="en-US" sz="1100" dirty="0">
-                <a:solidFill>
-                  <a:schemeClr val="bg1">
-                    <a:lumMod val="50000"/>
-                  </a:schemeClr>
-                </a:solidFill>
-              </a:rPr>
-              <a:t>is </a:t>
-            </a:r>
-            <a:r>
-              <a:rPr lang="en-US" sz="1100" dirty="0" smtClean="0">
-                <a:solidFill>
-                  <a:schemeClr val="bg1">
-                    <a:lumMod val="50000"/>
-                  </a:schemeClr>
-                </a:solidFill>
-              </a:rPr>
-              <a:t>old and previous current quarter, last snapshot date will be used also for previous quarter calculation</a:t>
-            </a:r>
-            <a:endParaRPr lang="en-US" sz="1100" dirty="0">
-              <a:solidFill>
-                <a:schemeClr val="bg1">
-                  <a:lumMod val="50000"/>
-                </a:schemeClr>
-              </a:solidFill>
-            </a:endParaRPr>
-          </a:p>
-          <a:p>
-            <a:endParaRPr lang="en-US" sz="1100" dirty="0">
-              <a:solidFill>
-                <a:schemeClr val="bg1">
-                  <a:lumMod val="50000"/>
-                </a:schemeClr>
-              </a:solidFill>
-            </a:endParaRPr>
-          </a:p>
-        </p:txBody>
-      </p:sp>
-      <p:sp>
-        <p:nvSpPr>
           <p:cNvPr id="19" name="TextBox 18"/>
           <p:cNvSpPr txBox="1"/>
           <p:nvPr/>
@@ -28280,6 +28146,193 @@
               <a:t>Note :</a:t>
             </a:r>
             <a:endParaRPr lang="en-US" sz="1800" dirty="0"/>
+          </a:p>
+        </p:txBody>
+      </p:sp>
+      <p:sp>
+        <p:nvSpPr>
+          <p:cNvPr id="18" name="Rectangle 17"/>
+          <p:cNvSpPr/>
+          <p:nvPr/>
+        </p:nvSpPr>
+        <p:spPr>
+          <a:xfrm>
+            <a:off x="1943741" y="2264164"/>
+            <a:ext cx="6702476" cy="1785104"/>
+          </a:xfrm>
+          <a:prstGeom prst="rect">
+            <a:avLst/>
+          </a:prstGeom>
+          <a:noFill/>
+        </p:spPr>
+        <p:txBody>
+          <a:bodyPr wrap="none" rtlCol="0">
+            <a:spAutoFit/>
+          </a:bodyPr>
+          <a:lstStyle/>
+          <a:p>
+            <a:r>
+              <a:rPr lang="en-US" sz="1100" b="1" dirty="0">
+                <a:solidFill>
+                  <a:schemeClr val="bg1">
+                    <a:lumMod val="50000"/>
+                  </a:schemeClr>
+                </a:solidFill>
+              </a:rPr>
+              <a:t>-SLA Assessment thresholds</a:t>
+            </a:r>
+          </a:p>
+          <a:p>
+            <a:pPr lvl="1"/>
+            <a:r>
+              <a:rPr lang="en-US" sz="1100" dirty="0">
+                <a:solidFill>
+                  <a:schemeClr val="bg1">
+                    <a:lumMod val="50000"/>
+                  </a:schemeClr>
+                </a:solidFill>
+              </a:rPr>
+              <a:t>Good if % difference between Target and Actual is less than 2%</a:t>
+            </a:r>
+          </a:p>
+          <a:p>
+            <a:pPr lvl="1"/>
+            <a:r>
+              <a:rPr lang="en-US" sz="1100" dirty="0">
+                <a:solidFill>
+                  <a:schemeClr val="bg1">
+                    <a:lumMod val="50000"/>
+                  </a:schemeClr>
+                </a:solidFill>
+              </a:rPr>
+              <a:t>Acceptable if &amp; difference between Target and Actual is between 2% and 5%</a:t>
+            </a:r>
+          </a:p>
+          <a:p>
+            <a:pPr lvl="1"/>
+            <a:r>
+              <a:rPr lang="en-US" sz="1100" dirty="0">
+                <a:solidFill>
+                  <a:schemeClr val="bg1">
+                    <a:lumMod val="50000"/>
+                  </a:schemeClr>
+                </a:solidFill>
+              </a:rPr>
+              <a:t>Poor if % difference between Target and Actual is greater than 5%</a:t>
+            </a:r>
+          </a:p>
+          <a:p>
+            <a:r>
+              <a:rPr lang="en-US" sz="1100" b="1" dirty="0">
+                <a:solidFill>
+                  <a:schemeClr val="bg1">
+                    <a:lumMod val="50000"/>
+                  </a:schemeClr>
+                </a:solidFill>
+              </a:rPr>
+              <a:t>-Actual score</a:t>
+            </a:r>
+            <a:r>
+              <a:rPr lang="en-US" sz="1100" dirty="0">
+                <a:solidFill>
+                  <a:schemeClr val="bg1">
+                    <a:lumMod val="50000"/>
+                  </a:schemeClr>
+                </a:solidFill>
+              </a:rPr>
+              <a:t>: for each app, score from latest snapshot (even if snapshot date is before current quarter), </a:t>
+            </a:r>
+            <a:br>
+              <a:rPr lang="en-US" sz="1100" dirty="0">
+                <a:solidFill>
+                  <a:schemeClr val="bg1">
+                    <a:lumMod val="50000"/>
+                  </a:schemeClr>
+                </a:solidFill>
+              </a:rPr>
+            </a:br>
+            <a:r>
+              <a:rPr lang="en-US" sz="1100" dirty="0">
+                <a:solidFill>
+                  <a:schemeClr val="bg1">
+                    <a:lumMod val="50000"/>
+                  </a:schemeClr>
+                </a:solidFill>
+              </a:rPr>
+              <a:t>then average for all apps</a:t>
+            </a:r>
+          </a:p>
+          <a:p>
+            <a:r>
+              <a:rPr lang="en-US" sz="1100" b="1" dirty="0">
+                <a:solidFill>
+                  <a:schemeClr val="bg1">
+                    <a:lumMod val="50000"/>
+                  </a:schemeClr>
+                </a:solidFill>
+              </a:rPr>
+              <a:t>-Target score</a:t>
+            </a:r>
+            <a:r>
+              <a:rPr lang="en-US" sz="1100" dirty="0">
+                <a:solidFill>
+                  <a:schemeClr val="bg1">
+                    <a:lumMod val="50000"/>
+                  </a:schemeClr>
+                </a:solidFill>
+              </a:rPr>
+              <a:t>: score to reach, to be configured as an option of the component. </a:t>
+            </a:r>
+          </a:p>
+          <a:p>
+            <a:r>
+              <a:rPr lang="en-US" sz="1100" b="1" dirty="0">
+                <a:solidFill>
+                  <a:schemeClr val="bg1">
+                    <a:lumMod val="50000"/>
+                  </a:schemeClr>
+                </a:solidFill>
+              </a:rPr>
+              <a:t>-Previous quarter</a:t>
+            </a:r>
+            <a:r>
+              <a:rPr lang="en-US" sz="1100" dirty="0">
+                <a:solidFill>
+                  <a:schemeClr val="bg1">
+                    <a:lumMod val="50000"/>
+                  </a:schemeClr>
+                </a:solidFill>
+              </a:rPr>
+              <a:t>: for each app, score from latest snapshot in previous quarter (even if snapshot date is </a:t>
+            </a:r>
+            <a:br>
+              <a:rPr lang="en-US" sz="1100" dirty="0">
+                <a:solidFill>
+                  <a:schemeClr val="bg1">
+                    <a:lumMod val="50000"/>
+                  </a:schemeClr>
+                </a:solidFill>
+              </a:rPr>
+            </a:br>
+            <a:r>
+              <a:rPr lang="en-US" sz="1100" dirty="0">
+                <a:solidFill>
+                  <a:schemeClr val="bg1">
+                    <a:lumMod val="50000"/>
+                  </a:schemeClr>
+                </a:solidFill>
+              </a:rPr>
+              <a:t>before previous quarter). then average for all apps</a:t>
+            </a:r>
+          </a:p>
+          <a:p>
+            <a:endParaRPr lang="en-US" sz="1100" dirty="0">
+              <a:solidFill>
+                <a:schemeClr val="bg1">
+                  <a:lumMod val="50000"/>
+                </a:schemeClr>
+              </a:solidFill>
+            </a:endParaRPr>
           </a:p>
         </p:txBody>
       </p:sp>
@@ -28317,6 +28370,259 @@
       </p:grpSpPr>
       <p:sp>
         <p:nvSpPr>
+          <p:cNvPr id="2" name="Slide Number Placeholder 1"/>
+          <p:cNvSpPr>
+            <a:spLocks noGrp="1"/>
+          </p:cNvSpPr>
+          <p:nvPr>
+            <p:ph type="sldNum" sz="quarter" idx="10"/>
+          </p:nvPr>
+        </p:nvSpPr>
+        <p:spPr/>
+        <p:txBody>
+          <a:bodyPr/>
+          <a:lstStyle/>
+          <a:p>
+            <a:pPr>
+              <a:buClr>
+                <a:prstClr val="black"/>
+              </a:buClr>
+            </a:pPr>
+            <a:fld id="{F71C7896-8E11-4384-BFC5-C0974CDBC83D}" type="slidenum">
+              <a:rPr lang="en-US" smtClean="0">
+                <a:solidFill>
+                  <a:srgbClr val="000000">
+                    <a:lumMod val="65000"/>
+                    <a:lumOff val="35000"/>
+                  </a:srgbClr>
+                </a:solidFill>
+              </a:rPr>
+              <a:pPr>
+                <a:buClr>
+                  <a:prstClr val="black"/>
+                </a:buClr>
+              </a:pPr>
+              <a:t>22</a:t>
+            </a:fld>
+            <a:endParaRPr lang="en-US" dirty="0">
+              <a:solidFill>
+                <a:srgbClr val="000000">
+                  <a:lumMod val="65000"/>
+                  <a:lumOff val="35000"/>
+                </a:srgbClr>
+              </a:solidFill>
+            </a:endParaRPr>
+          </a:p>
+        </p:txBody>
+      </p:sp>
+      <p:sp>
+        <p:nvSpPr>
+          <p:cNvPr id="3" name="Title 2"/>
+          <p:cNvSpPr>
+            <a:spLocks noGrp="1"/>
+          </p:cNvSpPr>
+          <p:nvPr>
+            <p:ph type="title"/>
+          </p:nvPr>
+        </p:nvSpPr>
+        <p:spPr/>
+        <p:txBody>
+          <a:bodyPr/>
+          <a:lstStyle/>
+          <a:p>
+            <a:r>
+              <a:rPr lang="en-US" dirty="0"/>
+              <a:t>PowerPoint Templates – </a:t>
+            </a:r>
+            <a:r>
+              <a:rPr lang="en-US" dirty="0" smtClean="0"/>
+              <a:t>Tables</a:t>
+            </a:r>
+            <a:endParaRPr lang="en-US" dirty="0"/>
+          </a:p>
+        </p:txBody>
+      </p:sp>
+      <p:sp>
+        <p:nvSpPr>
+          <p:cNvPr id="6" name="TextBox 5"/>
+          <p:cNvSpPr txBox="1"/>
+          <p:nvPr/>
+        </p:nvSpPr>
+        <p:spPr>
+          <a:xfrm>
+            <a:off x="395536" y="1218238"/>
+            <a:ext cx="8143200" cy="338554"/>
+          </a:xfrm>
+          <a:prstGeom prst="rect">
+            <a:avLst/>
+          </a:prstGeom>
+          <a:noFill/>
+        </p:spPr>
+        <p:txBody>
+          <a:bodyPr wrap="square" lIns="180000" rIns="180000" rtlCol="0">
+            <a:spAutoFit/>
+          </a:bodyPr>
+          <a:lstStyle>
+            <a:defPPr>
+              <a:defRPr lang="fr-FR"/>
+            </a:defPPr>
+            <a:lvl1pPr>
+              <a:defRPr sz="2000" b="1">
+                <a:solidFill>
+                  <a:schemeClr val="tx1">
+                    <a:lumMod val="75000"/>
+                    <a:lumOff val="25000"/>
+                  </a:schemeClr>
+                </a:solidFill>
+              </a:defRPr>
+            </a:lvl1pPr>
+          </a:lstStyle>
+          <a:p>
+            <a:r>
+              <a:rPr lang="en-US" sz="1600" b="0" dirty="0"/>
+              <a:t>Illustration to explain how scores are calculated</a:t>
+            </a:r>
+          </a:p>
+        </p:txBody>
+      </p:sp>
+      <p:sp>
+        <p:nvSpPr>
+          <p:cNvPr id="7" name="TextBox 6"/>
+          <p:cNvSpPr txBox="1"/>
+          <p:nvPr/>
+        </p:nvSpPr>
+        <p:spPr>
+          <a:xfrm>
+            <a:off x="2051720" y="724634"/>
+            <a:ext cx="6630534" cy="369332"/>
+          </a:xfrm>
+          <a:prstGeom prst="rect">
+            <a:avLst/>
+          </a:prstGeom>
+          <a:noFill/>
+        </p:spPr>
+        <p:txBody>
+          <a:bodyPr wrap="square" rtlCol="0">
+            <a:spAutoFit/>
+          </a:bodyPr>
+          <a:lstStyle>
+            <a:defPPr>
+              <a:defRPr lang="fr-FR"/>
+            </a:defPPr>
+            <a:lvl1pPr>
+              <a:defRPr sz="2000" b="1">
+                <a:solidFill>
+                  <a:srgbClr val="5E5E5E"/>
+                </a:solidFill>
+              </a:defRPr>
+            </a:lvl1pPr>
+          </a:lstStyle>
+          <a:p>
+            <a:r>
+              <a:rPr lang="en-US" sz="1800" dirty="0"/>
+              <a:t>PF_BC_RELEASE_PERFORMANCE</a:t>
+            </a:r>
+          </a:p>
+        </p:txBody>
+      </p:sp>
+      <p:sp>
+        <p:nvSpPr>
+          <p:cNvPr id="8" name="TextBox 7"/>
+          <p:cNvSpPr txBox="1"/>
+          <p:nvPr/>
+        </p:nvSpPr>
+        <p:spPr>
+          <a:xfrm>
+            <a:off x="467544" y="724634"/>
+            <a:ext cx="1709122" cy="400110"/>
+          </a:xfrm>
+          <a:prstGeom prst="rect">
+            <a:avLst/>
+          </a:prstGeom>
+          <a:noFill/>
+        </p:spPr>
+        <p:txBody>
+          <a:bodyPr wrap="none" rtlCol="0">
+            <a:spAutoFit/>
+          </a:bodyPr>
+          <a:lstStyle>
+            <a:defPPr>
+              <a:defRPr lang="fr-FR"/>
+            </a:defPPr>
+            <a:lvl1pPr algn="r">
+              <a:defRPr sz="2000">
+                <a:solidFill>
+                  <a:schemeClr val="bg1">
+                    <a:lumMod val="50000"/>
+                  </a:schemeClr>
+                </a:solidFill>
+              </a:defRPr>
+            </a:lvl1pPr>
+          </a:lstStyle>
+          <a:p>
+            <a:r>
+              <a:rPr lang="en-US" dirty="0"/>
+              <a:t>Block Name :</a:t>
+            </a:r>
+          </a:p>
+        </p:txBody>
+      </p:sp>
+      <p:pic>
+        <p:nvPicPr>
+          <p:cNvPr id="10" name="Picture 9"/>
+          <p:cNvPicPr>
+            <a:picLocks noChangeAspect="1"/>
+          </p:cNvPicPr>
+          <p:nvPr/>
+        </p:nvPicPr>
+        <p:blipFill>
+          <a:blip r:embed="rId2"/>
+          <a:stretch>
+            <a:fillRect/>
+          </a:stretch>
+        </p:blipFill>
+        <p:spPr>
+          <a:xfrm>
+            <a:off x="21223" y="1711934"/>
+            <a:ext cx="9144000" cy="4226011"/>
+          </a:xfrm>
+          <a:prstGeom prst="rect">
+            <a:avLst/>
+          </a:prstGeom>
+        </p:spPr>
+      </p:pic>
+    </p:spTree>
+    <p:extLst>
+      <p:ext uri="{BB962C8B-B14F-4D97-AF65-F5344CB8AC3E}">
+        <p14:creationId xmlns:p14="http://schemas.microsoft.com/office/powerpoint/2010/main" val="1344075048"/>
+      </p:ext>
+    </p:extLst>
+  </p:cSld>
+  <p:clrMapOvr>
+    <a:masterClrMapping/>
+  </p:clrMapOvr>
+</p:sld>
+</file>
+
+<file path=ppt/slides/slide23.xml><?xml version="1.0" encoding="utf-8"?>
+<p:sld xmlns:a="http://schemas.openxmlformats.org/drawingml/2006/main" xmlns:r="http://schemas.openxmlformats.org/officeDocument/2006/relationships" xmlns:p="http://schemas.openxmlformats.org/presentationml/2006/main">
+  <p:cSld>
+    <p:spTree>
+      <p:nvGrpSpPr>
+        <p:cNvPr id="1" name=""/>
+        <p:cNvGrpSpPr/>
+        <p:nvPr/>
+      </p:nvGrpSpPr>
+      <p:grpSpPr>
+        <a:xfrm>
+          <a:off x="0" y="0"/>
+          <a:ext cx="0" cy="0"/>
+          <a:chOff x="0" y="0"/>
+          <a:chExt cx="0" cy="0"/>
+        </a:xfrm>
+      </p:grpSpPr>
+      <p:sp>
+        <p:nvSpPr>
           <p:cNvPr id="24" name="Title 1"/>
           <p:cNvSpPr>
             <a:spLocks noGrp="1"/>
@@ -28334,7 +28640,11 @@
           <a:p>
             <a:r>
               <a:rPr lang="en-US" dirty="0" smtClean="0"/>
-              <a:t>PowerPoint Templates – Tables – [9]</a:t>
+              <a:t>PowerPoint Templates – </a:t>
+            </a:r>
+            <a:r>
+              <a:rPr lang="en-US" dirty="0" smtClean="0"/>
+              <a:t>Tables</a:t>
             </a:r>
             <a:endParaRPr lang="en-US" dirty="0"/>
           </a:p>
@@ -29441,7 +29751,7 @@
 </p:sld>
 </file>
 
-<file path=ppt/slides/slide23.xml><?xml version="1.0" encoding="utf-8"?>
+<file path=ppt/slides/slide24.xml><?xml version="1.0" encoding="utf-8"?>
 <p:sld xmlns:a="http://schemas.openxmlformats.org/drawingml/2006/main" xmlns:r="http://schemas.openxmlformats.org/officeDocument/2006/relationships" xmlns:p="http://schemas.openxmlformats.org/presentationml/2006/main">
   <p:cSld>
     <p:spTree>
@@ -29492,7 +29802,7 @@
                   <a:prstClr val="black"/>
                 </a:buClr>
               </a:pPr>
-              <a:t>23</a:t>
+              <a:t>24</a:t>
             </a:fld>
             <a:endParaRPr lang="en-US" dirty="0">
               <a:solidFill>
@@ -29522,11 +29832,11 @@
           <a:p>
             <a:r>
               <a:rPr lang="en-US" dirty="0"/>
-              <a:t>PowerPoint Templates – Tables </a:t>
+              <a:t>PowerPoint Templates – </a:t>
             </a:r>
             <a:r>
               <a:rPr lang="en-US" dirty="0" smtClean="0"/>
-              <a:t>[11]</a:t>
+              <a:t>Tables</a:t>
             </a:r>
             <a:endParaRPr lang="en-US" dirty="0"/>
           </a:p>
@@ -31815,7 +32125,11 @@
           <a:p>
             <a:r>
               <a:rPr lang="fr-FR" dirty="0" smtClean="0"/>
-              <a:t>PowerPoint Templates – Text [1]</a:t>
+              <a:t>PowerPoint Templates – </a:t>
+            </a:r>
+            <a:r>
+              <a:rPr lang="fr-FR" dirty="0" err="1" smtClean="0"/>
+              <a:t>Text</a:t>
             </a:r>
             <a:endParaRPr lang="fr-FR" dirty="0"/>
           </a:p>

</xml_diff>

<commit_message>
REPORTGEN-187 : fix ppt templates
</commit_message>
<xml_diff>
--- a/CastReporting.Reporting/PortfolioTemplatesFiles/1- Portfolio-Powerpoint-components-library.pptx
+++ b/CastReporting.Reporting/PortfolioTemplatesFiles/1- Portfolio-Powerpoint-components-library.pptx
@@ -10,7 +10,7 @@
     <p:sldMasterId id="2147483713" r:id="rId6"/>
   </p:sldMasterIdLst>
   <p:notesMasterIdLst>
-    <p:notesMasterId r:id="rId29"/>
+    <p:notesMasterId r:id="rId30"/>
   </p:notesMasterIdLst>
   <p:sldIdLst>
     <p:sldId id="262" r:id="rId7"/>
@@ -33,8 +33,9 @@
     <p:sldId id="280" r:id="rId24"/>
     <p:sldId id="332" r:id="rId25"/>
     <p:sldId id="303" r:id="rId26"/>
-    <p:sldId id="333" r:id="rId27"/>
-    <p:sldId id="318" r:id="rId28"/>
+    <p:sldId id="334" r:id="rId27"/>
+    <p:sldId id="333" r:id="rId28"/>
+    <p:sldId id="318" r:id="rId29"/>
   </p:sldIdLst>
   <p:sldSz cx="9144000" cy="6858000" type="screen4x3"/>
   <p:notesSz cx="6858000" cy="9144000"/>
@@ -135,7 +136,7 @@
   </p:defaultTextStyle>
   <p:extLst>
     <p:ext uri="{EFAFB233-063F-42B5-8137-9DF3F51BA10A}">
-      <p15:sldGuideLst xmlns:p15="http://schemas.microsoft.com/office/powerpoint/2012/main" xmlns="">
+      <p15:sldGuideLst xmlns:p15="http://schemas.microsoft.com/office/powerpoint/2012/main">
         <p15:guide id="1" orient="horz" pos="2160">
           <p15:clr>
             <a:srgbClr val="A4A3A4"/>
@@ -329,11 +330,11 @@
         </c:dLbls>
         <c:gapWidth val="150"/>
         <c:overlap val="100"/>
-        <c:axId val="189446016"/>
-        <c:axId val="189447552"/>
+        <c:axId val="245096512"/>
+        <c:axId val="245097296"/>
       </c:barChart>
       <c:catAx>
-        <c:axId val="189446016"/>
+        <c:axId val="245096512"/>
         <c:scaling>
           <c:orientation val="minMax"/>
         </c:scaling>
@@ -352,7 +353,7 @@
             </a:solidFill>
           </a:ln>
         </c:spPr>
-        <c:crossAx val="189447552"/>
+        <c:crossAx val="245097296"/>
         <c:crosses val="autoZero"/>
         <c:auto val="0"/>
         <c:lblAlgn val="ctr"/>
@@ -360,7 +361,7 @@
         <c:noMultiLvlLbl val="1"/>
       </c:catAx>
       <c:valAx>
-        <c:axId val="189447552"/>
+        <c:axId val="245097296"/>
         <c:scaling>
           <c:orientation val="minMax"/>
         </c:scaling>
@@ -380,7 +381,7 @@
             </a:solidFill>
           </a:ln>
         </c:spPr>
-        <c:crossAx val="189446016"/>
+        <c:crossAx val="245096512"/>
         <c:crosses val="autoZero"/>
         <c:crossBetween val="between"/>
       </c:valAx>
@@ -596,11 +597,11 @@
         </c:dLbls>
         <c:gapWidth val="150"/>
         <c:overlap val="100"/>
-        <c:axId val="189513728"/>
-        <c:axId val="189515264"/>
+        <c:axId val="245100040"/>
+        <c:axId val="245098080"/>
       </c:barChart>
       <c:catAx>
-        <c:axId val="189513728"/>
+        <c:axId val="245100040"/>
         <c:scaling>
           <c:orientation val="minMax"/>
         </c:scaling>
@@ -619,7 +620,7 @@
             </a:solidFill>
           </a:ln>
         </c:spPr>
-        <c:crossAx val="189515264"/>
+        <c:crossAx val="245098080"/>
         <c:crosses val="autoZero"/>
         <c:auto val="0"/>
         <c:lblAlgn val="ctr"/>
@@ -627,7 +628,7 @@
         <c:noMultiLvlLbl val="1"/>
       </c:catAx>
       <c:valAx>
-        <c:axId val="189515264"/>
+        <c:axId val="245098080"/>
         <c:scaling>
           <c:orientation val="minMax"/>
         </c:scaling>
@@ -647,7 +648,7 @@
             </a:solidFill>
           </a:ln>
         </c:spPr>
-        <c:crossAx val="189513728"/>
+        <c:crossAx val="245100040"/>
         <c:crosses val="autoZero"/>
         <c:crossBetween val="between"/>
       </c:valAx>
@@ -767,7 +768,6 @@
                 <c:ext xmlns:c15="http://schemas.microsoft.com/office/drawing/2012/chart" uri="{CE6537A1-D6FC-4f65-9D91-7224C49458BB}">
                   <c15:layout/>
                   <c15:dlblFieldTable/>
-                  <c15:xForSave val="1"/>
                   <c15:showDataLabelsRange val="1"/>
                 </c:ext>
               </c:extLst>
@@ -804,7 +804,6 @@
                 <c:ext xmlns:c15="http://schemas.microsoft.com/office/drawing/2012/chart" uri="{CE6537A1-D6FC-4f65-9D91-7224C49458BB}">
                   <c15:layout/>
                   <c15:dlblFieldTable/>
-                  <c15:xForSave val="1"/>
                   <c15:showDataLabelsRange val="1"/>
                 </c:ext>
               </c:extLst>
@@ -841,7 +840,6 @@
                 <c:ext xmlns:c15="http://schemas.microsoft.com/office/drawing/2012/chart" uri="{CE6537A1-D6FC-4f65-9D91-7224C49458BB}">
                   <c15:layout/>
                   <c15:dlblFieldTable/>
-                  <c15:xForSave val="1"/>
                   <c15:showDataLabelsRange val="1"/>
                 </c:ext>
               </c:extLst>
@@ -878,7 +876,6 @@
                 <c:ext xmlns:c15="http://schemas.microsoft.com/office/drawing/2012/chart" uri="{CE6537A1-D6FC-4f65-9D91-7224C49458BB}">
                   <c15:layout/>
                   <c15:dlblFieldTable/>
-                  <c15:xForSave val="1"/>
                   <c15:showDataLabelsRange val="1"/>
                 </c:ext>
               </c:extLst>
@@ -915,7 +912,6 @@
                 <c:ext xmlns:c15="http://schemas.microsoft.com/office/drawing/2012/chart" uri="{CE6537A1-D6FC-4f65-9D91-7224C49458BB}">
                   <c15:layout/>
                   <c15:dlblFieldTable/>
-                  <c15:xForSave val="1"/>
                   <c15:showDataLabelsRange val="1"/>
                 </c:ext>
               </c:extLst>
@@ -952,7 +948,6 @@
                 <c:ext xmlns:c15="http://schemas.microsoft.com/office/drawing/2012/chart" uri="{CE6537A1-D6FC-4f65-9D91-7224C49458BB}">
                   <c15:layout/>
                   <c15:dlblFieldTable/>
-                  <c15:xForSave val="1"/>
                   <c15:showDataLabelsRange val="1"/>
                 </c:ext>
               </c:extLst>
@@ -989,7 +984,6 @@
                 <c:ext xmlns:c15="http://schemas.microsoft.com/office/drawing/2012/chart" uri="{CE6537A1-D6FC-4f65-9D91-7224C49458BB}">
                   <c15:layout/>
                   <c15:dlblFieldTable/>
-                  <c15:xForSave val="1"/>
                   <c15:showDataLabelsRange val="1"/>
                 </c:ext>
               </c:extLst>
@@ -1026,7 +1020,6 @@
                 <c:ext xmlns:c15="http://schemas.microsoft.com/office/drawing/2012/chart" uri="{CE6537A1-D6FC-4f65-9D91-7224C49458BB}">
                   <c15:layout/>
                   <c15:dlblFieldTable/>
-                  <c15:xForSave val="1"/>
                   <c15:showDataLabelsRange val="1"/>
                 </c:ext>
               </c:extLst>
@@ -1063,7 +1056,6 @@
                 <c:ext xmlns:c15="http://schemas.microsoft.com/office/drawing/2012/chart" uri="{CE6537A1-D6FC-4f65-9D91-7224C49458BB}">
                   <c15:layout/>
                   <c15:dlblFieldTable/>
-                  <c15:xForSave val="1"/>
                   <c15:showDataLabelsRange val="1"/>
                 </c:ext>
               </c:extLst>
@@ -1100,7 +1092,6 @@
                 <c:ext xmlns:c15="http://schemas.microsoft.com/office/drawing/2012/chart" uri="{CE6537A1-D6FC-4f65-9D91-7224C49458BB}">
                   <c15:layout/>
                   <c15:dlblFieldTable/>
-                  <c15:xForSave val="1"/>
                   <c15:showDataLabelsRange val="1"/>
                 </c:ext>
               </c:extLst>
@@ -1137,7 +1128,6 @@
                 <c:ext xmlns:c15="http://schemas.microsoft.com/office/drawing/2012/chart" uri="{CE6537A1-D6FC-4f65-9D91-7224C49458BB}">
                   <c15:layout/>
                   <c15:dlblFieldTable/>
-                  <c15:xForSave val="1"/>
                   <c15:showDataLabelsRange val="1"/>
                 </c:ext>
               </c:extLst>
@@ -1159,7 +1149,7 @@
                       <a:pPr/>
                       <a:t>[CELLRANGE]</a:t>
                     </a:fld>
-                    <a:endParaRPr lang="en-US" dirty="0"/>
+                    <a:endParaRPr lang="en-US"/>
                   </a:p>
                 </c:rich>
               </c:tx>
@@ -1174,7 +1164,6 @@
                 <c:ext xmlns:c15="http://schemas.microsoft.com/office/drawing/2012/chart" uri="{CE6537A1-D6FC-4f65-9D91-7224C49458BB}">
                   <c15:layout/>
                   <c15:dlblFieldTable/>
-                  <c15:xForSave val="1"/>
                   <c15:showDataLabelsRange val="1"/>
                 </c:ext>
               </c:extLst>
@@ -1196,7 +1185,7 @@
                       <a:pPr/>
                       <a:t>[CELLRANGE]</a:t>
                     </a:fld>
-                    <a:endParaRPr lang="en-US" dirty="0"/>
+                    <a:endParaRPr lang="en-US"/>
                   </a:p>
                 </c:rich>
               </c:tx>
@@ -1211,7 +1200,6 @@
                 <c:ext xmlns:c15="http://schemas.microsoft.com/office/drawing/2012/chart" uri="{CE6537A1-D6FC-4f65-9D91-7224C49458BB}">
                   <c15:layout/>
                   <c15:dlblFieldTable/>
-                  <c15:xForSave val="1"/>
                   <c15:showDataLabelsRange val="1"/>
                 </c:ext>
               </c:extLst>
@@ -1252,6 +1240,7 @@
             <c:showSerName val="0"/>
             <c:showPercent val="0"/>
             <c:showBubbleSize val="0"/>
+            <c:showLeaderLines val="0"/>
             <c:extLst>
               <c:ext xmlns:c15="http://schemas.microsoft.com/office/drawing/2012/chart" uri="{CE6537A1-D6FC-4f65-9D91-7224C49458BB}">
                 <c15:spPr xmlns:c15="http://schemas.microsoft.com/office/drawing/2012/chart">
@@ -1259,7 +1248,6 @@
                     <a:avLst/>
                   </a:prstGeom>
                 </c15:spPr>
-                <c15:layout/>
                 <c15:showDataLabelsRange val="1"/>
                 <c15:showLeaderLines val="0"/>
               </c:ext>
@@ -1471,8 +1459,8 @@
         <c:bubbleScale val="100"/>
         <c:showNegBubbles val="0"/>
         <c:sizeRepresents val="w"/>
-        <c:axId val="189667584"/>
-        <c:axId val="189714816"/>
+        <c:axId val="316622016"/>
+        <c:axId val="316622800"/>
         <c:extLst>
           <c:ext xmlns:c15="http://schemas.microsoft.com/office/drawing/2012/chart" uri="{02D57815-91ED-43cb-92C2-25804820EDAC}">
             <c15:filteredBubbleSeries>
@@ -1662,7 +1650,7 @@
         </c:extLst>
       </c:bubbleChart>
       <c:valAx>
-        <c:axId val="189667584"/>
+        <c:axId val="316622016"/>
         <c:scaling>
           <c:orientation val="minMax"/>
           <c:max val="4"/>
@@ -1748,13 +1736,13 @@
             <a:endParaRPr lang="en-US"/>
           </a:p>
         </c:txPr>
-        <c:crossAx val="189714816"/>
+        <c:crossAx val="316622800"/>
         <c:crosses val="autoZero"/>
         <c:crossBetween val="midCat"/>
         <c:minorUnit val="0.25"/>
       </c:valAx>
       <c:valAx>
-        <c:axId val="189714816"/>
+        <c:axId val="316622800"/>
         <c:scaling>
           <c:orientation val="minMax"/>
           <c:min val="0"/>
@@ -1839,7 +1827,7 @@
             <a:endParaRPr lang="en-US"/>
           </a:p>
         </c:txPr>
-        <c:crossAx val="189667584"/>
+        <c:crossAx val="316622016"/>
         <c:crosses val="autoZero"/>
         <c:crossBetween val="midCat"/>
       </c:valAx>
@@ -1960,7 +1948,7 @@
           <a:p>
             <a:fld id="{268042A1-6D91-4513-A62D-1E3FD70C84BE}" type="datetimeFigureOut">
               <a:rPr lang="fr-FR" smtClean="0"/>
-              <a:t>05/10/2016</a:t>
+              <a:t>17/01/2017</a:t>
             </a:fld>
             <a:endParaRPr lang="fr-FR"/>
           </a:p>
@@ -2563,7 +2551,7 @@
             <a:fld id="{D8E3BBD6-5DF7-411E-B793-6A3558CCCDCA}" type="datetimeFigureOut">
               <a:rPr lang="fr-FR" smtClean="0"/>
               <a:pPr/>
-              <a:t>05/10/2016</a:t>
+              <a:t>17/01/2017</a:t>
             </a:fld>
             <a:endParaRPr lang="fr-FR" dirty="0"/>
           </a:p>
@@ -2728,7 +2716,7 @@
             <a:fld id="{D8E3BBD6-5DF7-411E-B793-6A3558CCCDCA}" type="datetimeFigureOut">
               <a:rPr lang="fr-FR" smtClean="0"/>
               <a:pPr/>
-              <a:t>05/10/2016</a:t>
+              <a:t>17/01/2017</a:t>
             </a:fld>
             <a:endParaRPr lang="fr-FR" dirty="0"/>
           </a:p>
@@ -4262,7 +4250,7 @@
             <a:fld id="{D8E3BBD6-5DF7-411E-B793-6A3558CCCDCA}" type="datetimeFigureOut">
               <a:rPr lang="fr-FR" smtClean="0"/>
               <a:pPr/>
-              <a:t>05/10/2016</a:t>
+              <a:t>17/01/2017</a:t>
             </a:fld>
             <a:endParaRPr lang="fr-FR" dirty="0"/>
           </a:p>
@@ -6687,7 +6675,7 @@
             <a:fld id="{D8E3BBD6-5DF7-411E-B793-6A3558CCCDCA}" type="datetimeFigureOut">
               <a:rPr lang="fr-FR" smtClean="0"/>
               <a:pPr/>
-              <a:t>05/10/2016</a:t>
+              <a:t>17/01/2017</a:t>
             </a:fld>
             <a:endParaRPr lang="fr-FR" dirty="0"/>
           </a:p>
@@ -9368,7 +9356,7 @@
             <a:fld id="{D8E3BBD6-5DF7-411E-B793-6A3558CCCDCA}" type="datetimeFigureOut">
               <a:rPr lang="fr-FR" smtClean="0"/>
               <a:pPr/>
-              <a:t>05/10/2016</a:t>
+              <a:t>17/01/2017</a:t>
             </a:fld>
             <a:endParaRPr lang="fr-FR" dirty="0"/>
           </a:p>
@@ -12274,7 +12262,7 @@
             <a:fld id="{D8E3BBD6-5DF7-411E-B793-6A3558CCCDCA}" type="datetimeFigureOut">
               <a:rPr lang="fr-FR" smtClean="0"/>
               <a:pPr/>
-              <a:t>05/10/2016</a:t>
+              <a:t>17/01/2017</a:t>
             </a:fld>
             <a:endParaRPr lang="fr-FR" dirty="0"/>
           </a:p>
@@ -14061,7 +14049,7 @@
             <a:fld id="{D8E3BBD6-5DF7-411E-B793-6A3558CCCDCA}" type="datetimeFigureOut">
               <a:rPr lang="fr-FR" smtClean="0"/>
               <a:pPr/>
-              <a:t>05/10/2016</a:t>
+              <a:t>17/01/2017</a:t>
             </a:fld>
             <a:endParaRPr lang="fr-FR" dirty="0"/>
           </a:p>
@@ -14141,7 +14129,7 @@
             <a:fld id="{D8E3BBD6-5DF7-411E-B793-6A3558CCCDCA}" type="datetimeFigureOut">
               <a:rPr lang="fr-FR" smtClean="0"/>
               <a:pPr/>
-              <a:t>05/10/2016</a:t>
+              <a:t>17/01/2017</a:t>
             </a:fld>
             <a:endParaRPr lang="fr-FR" dirty="0"/>
           </a:p>
@@ -14403,7 +14391,7 @@
             <a:fld id="{D8E3BBD6-5DF7-411E-B793-6A3558CCCDCA}" type="datetimeFigureOut">
               <a:rPr lang="fr-FR" smtClean="0"/>
               <a:pPr/>
-              <a:t>05/10/2016</a:t>
+              <a:t>17/01/2017</a:t>
             </a:fld>
             <a:endParaRPr lang="fr-FR" dirty="0"/>
           </a:p>
@@ -14646,7 +14634,7 @@
             <a:fld id="{D8E3BBD6-5DF7-411E-B793-6A3558CCCDCA}" type="datetimeFigureOut">
               <a:rPr lang="fr-FR" smtClean="0"/>
               <a:pPr/>
-              <a:t>05/10/2016</a:t>
+              <a:t>17/01/2017</a:t>
             </a:fld>
             <a:endParaRPr lang="fr-FR" dirty="0"/>
           </a:p>
@@ -14848,7 +14836,7 @@
             <a:fld id="{D8E3BBD6-5DF7-411E-B793-6A3558CCCDCA}" type="datetimeFigureOut">
               <a:rPr lang="fr-FR" smtClean="0"/>
               <a:pPr/>
-              <a:t>05/10/2016</a:t>
+              <a:t>17/01/2017</a:t>
             </a:fld>
             <a:endParaRPr lang="fr-FR" dirty="0"/>
           </a:p>
@@ -27682,6 +27670,254 @@
       </p:grpSpPr>
       <p:sp>
         <p:nvSpPr>
+          <p:cNvPr id="2" name="Slide Number Placeholder 1"/>
+          <p:cNvSpPr>
+            <a:spLocks noGrp="1"/>
+          </p:cNvSpPr>
+          <p:nvPr>
+            <p:ph type="sldNum" sz="quarter" idx="10"/>
+          </p:nvPr>
+        </p:nvSpPr>
+        <p:spPr/>
+        <p:txBody>
+          <a:bodyPr/>
+          <a:lstStyle/>
+          <a:p>
+            <a:pPr>
+              <a:buClr>
+                <a:prstClr val="black"/>
+              </a:buClr>
+            </a:pPr>
+            <a:fld id="{F71C7896-8E11-4384-BFC5-C0974CDBC83D}" type="slidenum">
+              <a:rPr lang="en-US" smtClean="0">
+                <a:solidFill>
+                  <a:srgbClr val="000000">
+                    <a:lumMod val="65000"/>
+                    <a:lumOff val="35000"/>
+                  </a:srgbClr>
+                </a:solidFill>
+              </a:rPr>
+              <a:pPr>
+                <a:buClr>
+                  <a:prstClr val="black"/>
+                </a:buClr>
+              </a:pPr>
+              <a:t>21</a:t>
+            </a:fld>
+            <a:endParaRPr lang="en-US" dirty="0">
+              <a:solidFill>
+                <a:srgbClr val="000000">
+                  <a:lumMod val="65000"/>
+                  <a:lumOff val="35000"/>
+                </a:srgbClr>
+              </a:solidFill>
+            </a:endParaRPr>
+          </a:p>
+        </p:txBody>
+      </p:sp>
+      <p:sp>
+        <p:nvSpPr>
+          <p:cNvPr id="3" name="Title 2"/>
+          <p:cNvSpPr>
+            <a:spLocks noGrp="1"/>
+          </p:cNvSpPr>
+          <p:nvPr>
+            <p:ph type="title"/>
+          </p:nvPr>
+        </p:nvSpPr>
+        <p:spPr/>
+        <p:txBody>
+          <a:bodyPr/>
+          <a:lstStyle/>
+          <a:p>
+            <a:r>
+              <a:rPr lang="en-US" dirty="0"/>
+              <a:t>PowerPoint Templates – Tables – [9]</a:t>
+            </a:r>
+          </a:p>
+        </p:txBody>
+      </p:sp>
+      <p:sp>
+        <p:nvSpPr>
+          <p:cNvPr id="6" name="TextBox 5"/>
+          <p:cNvSpPr txBox="1"/>
+          <p:nvPr/>
+        </p:nvSpPr>
+        <p:spPr>
+          <a:xfrm>
+            <a:off x="395536" y="1218238"/>
+            <a:ext cx="8143200" cy="338554"/>
+          </a:xfrm>
+          <a:prstGeom prst="rect">
+            <a:avLst/>
+          </a:prstGeom>
+          <a:noFill/>
+        </p:spPr>
+        <p:txBody>
+          <a:bodyPr wrap="square" lIns="180000" rIns="180000" rtlCol="0">
+            <a:spAutoFit/>
+          </a:bodyPr>
+          <a:lstStyle>
+            <a:defPPr>
+              <a:defRPr lang="fr-FR"/>
+            </a:defPPr>
+            <a:lvl1pPr>
+              <a:defRPr sz="2000" b="1">
+                <a:solidFill>
+                  <a:schemeClr val="tx1">
+                    <a:lumMod val="75000"/>
+                    <a:lumOff val="25000"/>
+                  </a:schemeClr>
+                </a:solidFill>
+              </a:defRPr>
+            </a:lvl1pPr>
+          </a:lstStyle>
+          <a:p>
+            <a:r>
+              <a:rPr lang="en-US" sz="1600" b="0" dirty="0"/>
+              <a:t>Illustration to explain how scores are calculated</a:t>
+            </a:r>
+          </a:p>
+        </p:txBody>
+      </p:sp>
+      <p:sp>
+        <p:nvSpPr>
+          <p:cNvPr id="7" name="TextBox 6"/>
+          <p:cNvSpPr txBox="1"/>
+          <p:nvPr/>
+        </p:nvSpPr>
+        <p:spPr>
+          <a:xfrm>
+            <a:off x="2051720" y="724634"/>
+            <a:ext cx="6630534" cy="369332"/>
+          </a:xfrm>
+          <a:prstGeom prst="rect">
+            <a:avLst/>
+          </a:prstGeom>
+          <a:noFill/>
+        </p:spPr>
+        <p:txBody>
+          <a:bodyPr wrap="square" rtlCol="0">
+            <a:spAutoFit/>
+          </a:bodyPr>
+          <a:lstStyle>
+            <a:defPPr>
+              <a:defRPr lang="fr-FR"/>
+            </a:defPPr>
+            <a:lvl1pPr>
+              <a:defRPr sz="2000" b="1">
+                <a:solidFill>
+                  <a:srgbClr val="5E5E5E"/>
+                </a:solidFill>
+              </a:defRPr>
+            </a:lvl1pPr>
+          </a:lstStyle>
+          <a:p>
+            <a:r>
+              <a:rPr lang="en-US" sz="1800" dirty="0"/>
+              <a:t>PF_BC_RELEASE_PERFORMANCE</a:t>
+            </a:r>
+          </a:p>
+        </p:txBody>
+      </p:sp>
+      <p:sp>
+        <p:nvSpPr>
+          <p:cNvPr id="8" name="TextBox 7"/>
+          <p:cNvSpPr txBox="1"/>
+          <p:nvPr/>
+        </p:nvSpPr>
+        <p:spPr>
+          <a:xfrm>
+            <a:off x="467544" y="724634"/>
+            <a:ext cx="1709122" cy="400110"/>
+          </a:xfrm>
+          <a:prstGeom prst="rect">
+            <a:avLst/>
+          </a:prstGeom>
+          <a:noFill/>
+        </p:spPr>
+        <p:txBody>
+          <a:bodyPr wrap="none" rtlCol="0">
+            <a:spAutoFit/>
+          </a:bodyPr>
+          <a:lstStyle>
+            <a:defPPr>
+              <a:defRPr lang="fr-FR"/>
+            </a:defPPr>
+            <a:lvl1pPr algn="r">
+              <a:defRPr sz="2000">
+                <a:solidFill>
+                  <a:schemeClr val="bg1">
+                    <a:lumMod val="50000"/>
+                  </a:schemeClr>
+                </a:solidFill>
+              </a:defRPr>
+            </a:lvl1pPr>
+          </a:lstStyle>
+          <a:p>
+            <a:r>
+              <a:rPr lang="en-US" dirty="0"/>
+              <a:t>Block Name :</a:t>
+            </a:r>
+          </a:p>
+        </p:txBody>
+      </p:sp>
+      <p:pic>
+        <p:nvPicPr>
+          <p:cNvPr id="10" name="Picture 9"/>
+          <p:cNvPicPr>
+            <a:picLocks noChangeAspect="1"/>
+          </p:cNvPicPr>
+          <p:nvPr/>
+        </p:nvPicPr>
+        <p:blipFill>
+          <a:blip r:embed="rId2"/>
+          <a:stretch>
+            <a:fillRect/>
+          </a:stretch>
+        </p:blipFill>
+        <p:spPr>
+          <a:xfrm>
+            <a:off x="21223" y="1711934"/>
+            <a:ext cx="9144000" cy="4226011"/>
+          </a:xfrm>
+          <a:prstGeom prst="rect">
+            <a:avLst/>
+          </a:prstGeom>
+        </p:spPr>
+      </p:pic>
+    </p:spTree>
+    <p:extLst>
+      <p:ext uri="{BB962C8B-B14F-4D97-AF65-F5344CB8AC3E}">
+        <p14:creationId xmlns:p14="http://schemas.microsoft.com/office/powerpoint/2010/main" val="629001227"/>
+      </p:ext>
+    </p:extLst>
+  </p:cSld>
+  <p:clrMapOvr>
+    <a:masterClrMapping/>
+  </p:clrMapOvr>
+</p:sld>
+</file>
+
+<file path=ppt/slides/slide22.xml><?xml version="1.0" encoding="utf-8"?>
+<p:sld xmlns:a="http://schemas.openxmlformats.org/drawingml/2006/main" xmlns:r="http://schemas.openxmlformats.org/officeDocument/2006/relationships" xmlns:p="http://schemas.openxmlformats.org/presentationml/2006/main">
+  <p:cSld>
+    <p:spTree>
+      <p:nvGrpSpPr>
+        <p:cNvPr id="1" name=""/>
+        <p:cNvGrpSpPr/>
+        <p:nvPr/>
+      </p:nvGrpSpPr>
+      <p:grpSpPr>
+        <a:xfrm>
+          <a:off x="0" y="0"/>
+          <a:ext cx="0" cy="0"/>
+          <a:chOff x="0" y="0"/>
+          <a:chExt cx="0" cy="0"/>
+        </a:xfrm>
+      </p:grpSpPr>
+      <p:sp>
+        <p:nvSpPr>
           <p:cNvPr id="24" name="Title 1"/>
           <p:cNvSpPr>
             <a:spLocks noGrp="1"/>
@@ -27699,7 +27935,11 @@
           <a:p>
             <a:r>
               <a:rPr lang="en-US" dirty="0" smtClean="0"/>
-              <a:t>PowerPoint Templates – Tables – [9]</a:t>
+              <a:t>PowerPoint Templates – Tables – </a:t>
+            </a:r>
+            <a:r>
+              <a:rPr lang="en-US" dirty="0" smtClean="0"/>
+              <a:t>[10]</a:t>
             </a:r>
             <a:endParaRPr lang="en-US" dirty="0"/>
           </a:p>
@@ -28806,7 +29046,7 @@
 </p:sld>
 </file>
 
-<file path=ppt/slides/slide22.xml><?xml version="1.0" encoding="utf-8"?>
+<file path=ppt/slides/slide23.xml><?xml version="1.0" encoding="utf-8"?>
 <p:sld xmlns:a="http://schemas.openxmlformats.org/drawingml/2006/main" xmlns:r="http://schemas.openxmlformats.org/officeDocument/2006/relationships" xmlns:p="http://schemas.openxmlformats.org/presentationml/2006/main">
   <p:cSld>
     <p:spTree>
@@ -28857,7 +29097,7 @@
                   <a:prstClr val="black"/>
                 </a:buClr>
               </a:pPr>
-              <a:t>22</a:t>
+              <a:t>23</a:t>
             </a:fld>
             <a:endParaRPr lang="en-US" dirty="0">
               <a:solidFill>

</xml_diff>

<commit_message>
REPORTGEN-224 : Add Bar chart component for apps
</commit_message>
<xml_diff>
--- a/CastReporting.Reporting/PortfolioTemplatesFiles/1- Portfolio-Powerpoint-components-library.pptx
+++ b/CastReporting.Reporting/PortfolioTemplatesFiles/1- Portfolio-Powerpoint-components-library.pptx
@@ -10,7 +10,7 @@
     <p:sldMasterId id="2147483713" r:id="rId6"/>
   </p:sldMasterIdLst>
   <p:notesMasterIdLst>
-    <p:notesMasterId r:id="rId31"/>
+    <p:notesMasterId r:id="rId32"/>
   </p:notesMasterIdLst>
   <p:sldIdLst>
     <p:sldId id="262" r:id="rId7"/>
@@ -30,13 +30,14 @@
     <p:sldId id="279" r:id="rId21"/>
     <p:sldId id="331" r:id="rId22"/>
     <p:sldId id="297" r:id="rId23"/>
-    <p:sldId id="294" r:id="rId24"/>
-    <p:sldId id="280" r:id="rId25"/>
-    <p:sldId id="332" r:id="rId26"/>
-    <p:sldId id="303" r:id="rId27"/>
-    <p:sldId id="335" r:id="rId28"/>
-    <p:sldId id="333" r:id="rId29"/>
-    <p:sldId id="318" r:id="rId30"/>
+    <p:sldId id="336" r:id="rId24"/>
+    <p:sldId id="294" r:id="rId25"/>
+    <p:sldId id="280" r:id="rId26"/>
+    <p:sldId id="332" r:id="rId27"/>
+    <p:sldId id="303" r:id="rId28"/>
+    <p:sldId id="335" r:id="rId29"/>
+    <p:sldId id="333" r:id="rId30"/>
+    <p:sldId id="318" r:id="rId31"/>
   </p:sldIdLst>
   <p:sldSz cx="9144000" cy="6858000" type="screen4x3"/>
   <p:notesSz cx="6858000" cy="9144000"/>
@@ -331,11 +332,11 @@
         </c:dLbls>
         <c:gapWidth val="150"/>
         <c:overlap val="100"/>
-        <c:axId val="471426128"/>
-        <c:axId val="471425344"/>
+        <c:axId val="487024024"/>
+        <c:axId val="487022456"/>
       </c:barChart>
       <c:catAx>
-        <c:axId val="471426128"/>
+        <c:axId val="487024024"/>
         <c:scaling>
           <c:orientation val="minMax"/>
         </c:scaling>
@@ -354,7 +355,7 @@
             </a:solidFill>
           </a:ln>
         </c:spPr>
-        <c:crossAx val="471425344"/>
+        <c:crossAx val="487022456"/>
         <c:crosses val="autoZero"/>
         <c:auto val="0"/>
         <c:lblAlgn val="ctr"/>
@@ -362,7 +363,7 @@
         <c:noMultiLvlLbl val="1"/>
       </c:catAx>
       <c:valAx>
-        <c:axId val="471425344"/>
+        <c:axId val="487022456"/>
         <c:scaling>
           <c:orientation val="minMax"/>
         </c:scaling>
@@ -382,7 +383,7 @@
             </a:solidFill>
           </a:ln>
         </c:spPr>
-        <c:crossAx val="471426128"/>
+        <c:crossAx val="487024024"/>
         <c:crosses val="autoZero"/>
         <c:crossBetween val="between"/>
       </c:valAx>
@@ -598,11 +599,11 @@
         </c:dLbls>
         <c:gapWidth val="150"/>
         <c:overlap val="100"/>
-        <c:axId val="471422600"/>
-        <c:axId val="471419072"/>
+        <c:axId val="487022848"/>
+        <c:axId val="492357792"/>
       </c:barChart>
       <c:catAx>
-        <c:axId val="471422600"/>
+        <c:axId val="487022848"/>
         <c:scaling>
           <c:orientation val="minMax"/>
         </c:scaling>
@@ -621,7 +622,7 @@
             </a:solidFill>
           </a:ln>
         </c:spPr>
-        <c:crossAx val="471419072"/>
+        <c:crossAx val="492357792"/>
         <c:crosses val="autoZero"/>
         <c:auto val="0"/>
         <c:lblAlgn val="ctr"/>
@@ -629,7 +630,7 @@
         <c:noMultiLvlLbl val="1"/>
       </c:catAx>
       <c:valAx>
-        <c:axId val="471419072"/>
+        <c:axId val="492357792"/>
         <c:scaling>
           <c:orientation val="minMax"/>
         </c:scaling>
@@ -649,7 +650,7 @@
             </a:solidFill>
           </a:ln>
         </c:spPr>
-        <c:crossAx val="471422600"/>
+        <c:crossAx val="487022848"/>
         <c:crosses val="autoZero"/>
         <c:crossBetween val="between"/>
       </c:valAx>
@@ -739,7 +740,6 @@
           <c:dLbls>
             <c:dLbl>
               <c:idx val="0"/>
-              <c:layout/>
               <c:tx>
                 <c:rich>
                   <a:bodyPr/>
@@ -767,7 +767,6 @@
               <c:showBubbleSize val="0"/>
               <c:extLst>
                 <c:ext xmlns:c15="http://schemas.microsoft.com/office/drawing/2012/chart" uri="{CE6537A1-D6FC-4f65-9D91-7224C49458BB}">
-                  <c15:layout/>
                   <c15:dlblFieldTable/>
                   <c15:showDataLabelsRange val="1"/>
                 </c:ext>
@@ -775,7 +774,6 @@
             </c:dLbl>
             <c:dLbl>
               <c:idx val="1"/>
-              <c:layout/>
               <c:tx>
                 <c:rich>
                   <a:bodyPr/>
@@ -803,7 +801,6 @@
               <c:showBubbleSize val="0"/>
               <c:extLst>
                 <c:ext xmlns:c15="http://schemas.microsoft.com/office/drawing/2012/chart" uri="{CE6537A1-D6FC-4f65-9D91-7224C49458BB}">
-                  <c15:layout/>
                   <c15:dlblFieldTable/>
                   <c15:showDataLabelsRange val="1"/>
                 </c:ext>
@@ -811,7 +808,6 @@
             </c:dLbl>
             <c:dLbl>
               <c:idx val="2"/>
-              <c:layout/>
               <c:tx>
                 <c:rich>
                   <a:bodyPr/>
@@ -839,7 +835,6 @@
               <c:showBubbleSize val="0"/>
               <c:extLst>
                 <c:ext xmlns:c15="http://schemas.microsoft.com/office/drawing/2012/chart" uri="{CE6537A1-D6FC-4f65-9D91-7224C49458BB}">
-                  <c15:layout/>
                   <c15:dlblFieldTable/>
                   <c15:showDataLabelsRange val="1"/>
                 </c:ext>
@@ -847,7 +842,6 @@
             </c:dLbl>
             <c:dLbl>
               <c:idx val="3"/>
-              <c:layout/>
               <c:tx>
                 <c:rich>
                   <a:bodyPr/>
@@ -875,7 +869,6 @@
               <c:showBubbleSize val="0"/>
               <c:extLst>
                 <c:ext xmlns:c15="http://schemas.microsoft.com/office/drawing/2012/chart" uri="{CE6537A1-D6FC-4f65-9D91-7224C49458BB}">
-                  <c15:layout/>
                   <c15:dlblFieldTable/>
                   <c15:showDataLabelsRange val="1"/>
                 </c:ext>
@@ -883,7 +876,6 @@
             </c:dLbl>
             <c:dLbl>
               <c:idx val="4"/>
-              <c:layout/>
               <c:tx>
                 <c:rich>
                   <a:bodyPr/>
@@ -911,7 +903,6 @@
               <c:showBubbleSize val="0"/>
               <c:extLst>
                 <c:ext xmlns:c15="http://schemas.microsoft.com/office/drawing/2012/chart" uri="{CE6537A1-D6FC-4f65-9D91-7224C49458BB}">
-                  <c15:layout/>
                   <c15:dlblFieldTable/>
                   <c15:showDataLabelsRange val="1"/>
                 </c:ext>
@@ -919,7 +910,6 @@
             </c:dLbl>
             <c:dLbl>
               <c:idx val="5"/>
-              <c:layout/>
               <c:tx>
                 <c:rich>
                   <a:bodyPr/>
@@ -947,7 +937,6 @@
               <c:showBubbleSize val="0"/>
               <c:extLst>
                 <c:ext xmlns:c15="http://schemas.microsoft.com/office/drawing/2012/chart" uri="{CE6537A1-D6FC-4f65-9D91-7224C49458BB}">
-                  <c15:layout/>
                   <c15:dlblFieldTable/>
                   <c15:showDataLabelsRange val="1"/>
                 </c:ext>
@@ -955,7 +944,6 @@
             </c:dLbl>
             <c:dLbl>
               <c:idx val="6"/>
-              <c:layout/>
               <c:tx>
                 <c:rich>
                   <a:bodyPr/>
@@ -983,7 +971,6 @@
               <c:showBubbleSize val="0"/>
               <c:extLst>
                 <c:ext xmlns:c15="http://schemas.microsoft.com/office/drawing/2012/chart" uri="{CE6537A1-D6FC-4f65-9D91-7224C49458BB}">
-                  <c15:layout/>
                   <c15:dlblFieldTable/>
                   <c15:showDataLabelsRange val="1"/>
                 </c:ext>
@@ -991,7 +978,6 @@
             </c:dLbl>
             <c:dLbl>
               <c:idx val="7"/>
-              <c:layout/>
               <c:tx>
                 <c:rich>
                   <a:bodyPr/>
@@ -1019,7 +1005,6 @@
               <c:showBubbleSize val="0"/>
               <c:extLst>
                 <c:ext xmlns:c15="http://schemas.microsoft.com/office/drawing/2012/chart" uri="{CE6537A1-D6FC-4f65-9D91-7224C49458BB}">
-                  <c15:layout/>
                   <c15:dlblFieldTable/>
                   <c15:showDataLabelsRange val="1"/>
                 </c:ext>
@@ -1027,7 +1012,6 @@
             </c:dLbl>
             <c:dLbl>
               <c:idx val="8"/>
-              <c:layout/>
               <c:tx>
                 <c:rich>
                   <a:bodyPr/>
@@ -1055,7 +1039,6 @@
               <c:showBubbleSize val="0"/>
               <c:extLst>
                 <c:ext xmlns:c15="http://schemas.microsoft.com/office/drawing/2012/chart" uri="{CE6537A1-D6FC-4f65-9D91-7224C49458BB}">
-                  <c15:layout/>
                   <c15:dlblFieldTable/>
                   <c15:showDataLabelsRange val="1"/>
                 </c:ext>
@@ -1063,7 +1046,6 @@
             </c:dLbl>
             <c:dLbl>
               <c:idx val="9"/>
-              <c:layout/>
               <c:tx>
                 <c:rich>
                   <a:bodyPr/>
@@ -1091,7 +1073,6 @@
               <c:showBubbleSize val="0"/>
               <c:extLst>
                 <c:ext xmlns:c15="http://schemas.microsoft.com/office/drawing/2012/chart" uri="{CE6537A1-D6FC-4f65-9D91-7224C49458BB}">
-                  <c15:layout/>
                   <c15:dlblFieldTable/>
                   <c15:showDataLabelsRange val="1"/>
                 </c:ext>
@@ -1099,7 +1080,6 @@
             </c:dLbl>
             <c:dLbl>
               <c:idx val="10"/>
-              <c:layout/>
               <c:tx>
                 <c:rich>
                   <a:bodyPr/>
@@ -1127,7 +1107,6 @@
               <c:showBubbleSize val="0"/>
               <c:extLst>
                 <c:ext xmlns:c15="http://schemas.microsoft.com/office/drawing/2012/chart" uri="{CE6537A1-D6FC-4f65-9D91-7224C49458BB}">
-                  <c15:layout/>
                   <c15:dlblFieldTable/>
                   <c15:showDataLabelsRange val="1"/>
                 </c:ext>
@@ -1135,7 +1114,6 @@
             </c:dLbl>
             <c:dLbl>
               <c:idx val="11"/>
-              <c:layout/>
               <c:tx>
                 <c:rich>
                   <a:bodyPr/>
@@ -1163,7 +1141,6 @@
               <c:showBubbleSize val="0"/>
               <c:extLst>
                 <c:ext xmlns:c15="http://schemas.microsoft.com/office/drawing/2012/chart" uri="{CE6537A1-D6FC-4f65-9D91-7224C49458BB}">
-                  <c15:layout/>
                   <c15:dlblFieldTable/>
                   <c15:showDataLabelsRange val="1"/>
                 </c:ext>
@@ -1171,7 +1148,6 @@
             </c:dLbl>
             <c:dLbl>
               <c:idx val="12"/>
-              <c:layout/>
               <c:tx>
                 <c:rich>
                   <a:bodyPr/>
@@ -1199,7 +1175,6 @@
               <c:showBubbleSize val="0"/>
               <c:extLst>
                 <c:ext xmlns:c15="http://schemas.microsoft.com/office/drawing/2012/chart" uri="{CE6537A1-D6FC-4f65-9D91-7224C49458BB}">
-                  <c15:layout/>
                   <c15:dlblFieldTable/>
                   <c15:showDataLabelsRange val="1"/>
                 </c:ext>
@@ -1460,8 +1435,8 @@
         <c:bubbleScale val="100"/>
         <c:showNegBubbles val="0"/>
         <c:sizeRepresents val="w"/>
-        <c:axId val="471426912"/>
-        <c:axId val="471432008"/>
+        <c:axId val="492355048"/>
+        <c:axId val="492355832"/>
         <c:extLst>
           <c:ext xmlns:c15="http://schemas.microsoft.com/office/drawing/2012/chart" uri="{02D57815-91ED-43cb-92C2-25804820EDAC}">
             <c15:filteredBubbleSeries>
@@ -1651,7 +1626,7 @@
         </c:extLst>
       </c:bubbleChart>
       <c:valAx>
-        <c:axId val="471426912"/>
+        <c:axId val="492355048"/>
         <c:scaling>
           <c:orientation val="minMax"/>
           <c:max val="4"/>
@@ -1702,7 +1677,6 @@
               </a:p>
             </c:rich>
           </c:tx>
-          <c:layout/>
           <c:overlay val="0"/>
         </c:title>
         <c:numFmt formatCode="0.00" sourceLinked="0"/>
@@ -1737,13 +1711,13 @@
             <a:endParaRPr lang="en-US"/>
           </a:p>
         </c:txPr>
-        <c:crossAx val="471432008"/>
+        <c:crossAx val="492355832"/>
         <c:crosses val="autoZero"/>
         <c:crossBetween val="midCat"/>
         <c:minorUnit val="0.25"/>
       </c:valAx>
       <c:valAx>
-        <c:axId val="471432008"/>
+        <c:axId val="492355832"/>
         <c:scaling>
           <c:orientation val="minMax"/>
           <c:min val="0"/>
@@ -1793,7 +1767,6 @@
               </a:p>
             </c:rich>
           </c:tx>
-          <c:layout/>
           <c:overlay val="0"/>
         </c:title>
         <c:numFmt formatCode="General" sourceLinked="0"/>
@@ -1828,7 +1801,7 @@
             <a:endParaRPr lang="en-US"/>
           </a:p>
         </c:txPr>
-        <c:crossAx val="471426912"/>
+        <c:crossAx val="492355048"/>
         <c:crosses val="autoZero"/>
         <c:crossBetween val="midCat"/>
       </c:valAx>
@@ -1867,6 +1840,202 @@
 </c:chartSpace>
 </file>
 
+<file path=ppt/charts/chart4.xml><?xml version="1.0" encoding="utf-8"?>
+<c:chartSpace xmlns:c="http://schemas.openxmlformats.org/drawingml/2006/chart" xmlns:a="http://schemas.openxmlformats.org/drawingml/2006/main" xmlns:r="http://schemas.openxmlformats.org/officeDocument/2006/relationships">
+  <c:date1904 val="0"/>
+  <c:lang val="en-US"/>
+  <c:roundedCorners val="0"/>
+  <mc:AlternateContent xmlns:mc="http://schemas.openxmlformats.org/markup-compatibility/2006">
+    <mc:Choice xmlns:c14="http://schemas.microsoft.com/office/drawing/2007/8/2/chart" Requires="c14">
+      <c14:style val="102"/>
+    </mc:Choice>
+    <mc:Fallback>
+      <c:style val="2"/>
+    </mc:Fallback>
+  </mc:AlternateContent>
+  <c:chart>
+    <c:title>
+      <c:layout>
+        <c:manualLayout>
+          <c:xMode val="edge"/>
+          <c:yMode val="edge"/>
+          <c:x val="0.4261355426706076"/>
+          <c:y val="7.189568384014558E-2"/>
+        </c:manualLayout>
+      </c:layout>
+      <c:overlay val="0"/>
+    </c:title>
+    <c:autoTitleDeleted val="0"/>
+    <c:plotArea>
+      <c:layout>
+        <c:manualLayout>
+          <c:layoutTarget val="inner"/>
+          <c:xMode val="edge"/>
+          <c:yMode val="edge"/>
+          <c:x val="0.15304370393752798"/>
+          <c:y val="0.23455799593740495"/>
+          <c:w val="0.6433020470685219"/>
+          <c:h val="0.59729289338221658"/>
+        </c:manualLayout>
+      </c:layout>
+      <c:barChart>
+        <c:barDir val="col"/>
+        <c:grouping val="clustered"/>
+        <c:varyColors val="0"/>
+        <c:ser>
+          <c:idx val="1"/>
+          <c:order val="0"/>
+          <c:tx>
+            <c:strRef>
+              <c:f>Sheet1!$B$1</c:f>
+              <c:strCache>
+                <c:ptCount val="1"/>
+                <c:pt idx="0">
+                  <c:v>My Metric</c:v>
+                </c:pt>
+              </c:strCache>
+            </c:strRef>
+          </c:tx>
+          <c:spPr>
+            <a:solidFill>
+              <a:schemeClr val="accent5">
+                <a:lumMod val="50000"/>
+                <a:lumOff val="50000"/>
+              </a:schemeClr>
+            </a:solidFill>
+            <a:ln w="12700">
+              <a:noFill/>
+            </a:ln>
+          </c:spPr>
+          <c:invertIfNegative val="0"/>
+          <c:cat>
+            <c:strRef>
+              <c:f>Sheet1!$A$2:$A$5</c:f>
+              <c:strCache>
+                <c:ptCount val="4"/>
+                <c:pt idx="0">
+                  <c:v>Appli1</c:v>
+                </c:pt>
+                <c:pt idx="1">
+                  <c:v>Appli2</c:v>
+                </c:pt>
+                <c:pt idx="2">
+                  <c:v>Appli3</c:v>
+                </c:pt>
+                <c:pt idx="3">
+                  <c:v>Appli4</c:v>
+                </c:pt>
+              </c:strCache>
+            </c:strRef>
+          </c:cat>
+          <c:val>
+            <c:numRef>
+              <c:f>Sheet1!$B$2:$B$5</c:f>
+              <c:numCache>
+                <c:formatCode>#,##0.00</c:formatCode>
+                <c:ptCount val="4"/>
+                <c:pt idx="0">
+                  <c:v>2.5</c:v>
+                </c:pt>
+                <c:pt idx="1">
+                  <c:v>3.2</c:v>
+                </c:pt>
+                <c:pt idx="2">
+                  <c:v>2.2999999999999998</c:v>
+                </c:pt>
+                <c:pt idx="3">
+                  <c:v>1.3</c:v>
+                </c:pt>
+              </c:numCache>
+            </c:numRef>
+          </c:val>
+        </c:ser>
+        <c:dLbls>
+          <c:showLegendKey val="0"/>
+          <c:showVal val="0"/>
+          <c:showCatName val="0"/>
+          <c:showSerName val="0"/>
+          <c:showPercent val="0"/>
+          <c:showBubbleSize val="0"/>
+        </c:dLbls>
+        <c:gapWidth val="150"/>
+        <c:overlap val="100"/>
+        <c:axId val="495542144"/>
+        <c:axId val="495542928"/>
+      </c:barChart>
+      <c:catAx>
+        <c:axId val="495542144"/>
+        <c:scaling>
+          <c:orientation val="minMax"/>
+        </c:scaling>
+        <c:delete val="0"/>
+        <c:axPos val="b"/>
+        <c:numFmt formatCode="General" sourceLinked="1"/>
+        <c:majorTickMark val="out"/>
+        <c:minorTickMark val="none"/>
+        <c:tickLblPos val="low"/>
+        <c:spPr>
+          <a:ln w="12700">
+            <a:solidFill>
+              <a:prstClr val="white">
+                <a:lumMod val="50000"/>
+              </a:prstClr>
+            </a:solidFill>
+          </a:ln>
+        </c:spPr>
+        <c:crossAx val="495542928"/>
+        <c:crosses val="autoZero"/>
+        <c:auto val="0"/>
+        <c:lblAlgn val="ctr"/>
+        <c:lblOffset val="100"/>
+        <c:noMultiLvlLbl val="1"/>
+      </c:catAx>
+      <c:valAx>
+        <c:axId val="495542928"/>
+        <c:scaling>
+          <c:orientation val="minMax"/>
+        </c:scaling>
+        <c:delete val="0"/>
+        <c:axPos val="l"/>
+        <c:majorGridlines/>
+        <c:numFmt formatCode="#,##0.00" sourceLinked="1"/>
+        <c:majorTickMark val="cross"/>
+        <c:minorTickMark val="none"/>
+        <c:tickLblPos val="nextTo"/>
+        <c:spPr>
+          <a:ln>
+            <a:solidFill>
+              <a:prstClr val="white">
+                <a:lumMod val="50000"/>
+              </a:prstClr>
+            </a:solidFill>
+          </a:ln>
+        </c:spPr>
+        <c:crossAx val="495542144"/>
+        <c:crosses val="autoZero"/>
+        <c:crossBetween val="between"/>
+      </c:valAx>
+    </c:plotArea>
+    <c:plotVisOnly val="1"/>
+    <c:dispBlanksAs val="gap"/>
+    <c:showDLblsOverMax val="0"/>
+  </c:chart>
+  <c:txPr>
+    <a:bodyPr/>
+    <a:lstStyle/>
+    <a:p>
+      <a:pPr>
+        <a:defRPr sz="1200"/>
+      </a:pPr>
+      <a:endParaRPr lang="en-US"/>
+    </a:p>
+  </c:txPr>
+  <c:externalData r:id="rId1">
+    <c:autoUpdate val="0"/>
+  </c:externalData>
+</c:chartSpace>
+</file>
+
 <file path=ppt/notesMasters/notesMaster1.xml><?xml version="1.0" encoding="utf-8"?>
 <p:notesMaster xmlns:a="http://schemas.openxmlformats.org/drawingml/2006/main" xmlns:r="http://schemas.openxmlformats.org/officeDocument/2006/relationships" xmlns:p="http://schemas.openxmlformats.org/presentationml/2006/main">
   <p:cSld>
@@ -1949,7 +2118,7 @@
           <a:p>
             <a:fld id="{268042A1-6D91-4513-A62D-1E3FD70C84BE}" type="datetimeFigureOut">
               <a:rPr lang="fr-FR" smtClean="0"/>
-              <a:t>30/12/2016</a:t>
+              <a:t>31/01/2017</a:t>
             </a:fld>
             <a:endParaRPr lang="fr-FR"/>
           </a:p>
@@ -2552,7 +2721,7 @@
             <a:fld id="{D8E3BBD6-5DF7-411E-B793-6A3558CCCDCA}" type="datetimeFigureOut">
               <a:rPr lang="fr-FR" smtClean="0"/>
               <a:pPr/>
-              <a:t>30/12/2016</a:t>
+              <a:t>31/01/2017</a:t>
             </a:fld>
             <a:endParaRPr lang="fr-FR" dirty="0"/>
           </a:p>
@@ -2717,7 +2886,7 @@
             <a:fld id="{D8E3BBD6-5DF7-411E-B793-6A3558CCCDCA}" type="datetimeFigureOut">
               <a:rPr lang="fr-FR" smtClean="0"/>
               <a:pPr/>
-              <a:t>30/12/2016</a:t>
+              <a:t>31/01/2017</a:t>
             </a:fld>
             <a:endParaRPr lang="fr-FR" dirty="0"/>
           </a:p>
@@ -4251,7 +4420,7 @@
             <a:fld id="{D8E3BBD6-5DF7-411E-B793-6A3558CCCDCA}" type="datetimeFigureOut">
               <a:rPr lang="fr-FR" smtClean="0"/>
               <a:pPr/>
-              <a:t>30/12/2016</a:t>
+              <a:t>31/01/2017</a:t>
             </a:fld>
             <a:endParaRPr lang="fr-FR" dirty="0"/>
           </a:p>
@@ -6676,7 +6845,7 @@
             <a:fld id="{D8E3BBD6-5DF7-411E-B793-6A3558CCCDCA}" type="datetimeFigureOut">
               <a:rPr lang="fr-FR" smtClean="0"/>
               <a:pPr/>
-              <a:t>30/12/2016</a:t>
+              <a:t>31/01/2017</a:t>
             </a:fld>
             <a:endParaRPr lang="fr-FR" dirty="0"/>
           </a:p>
@@ -9357,7 +9526,7 @@
             <a:fld id="{D8E3BBD6-5DF7-411E-B793-6A3558CCCDCA}" type="datetimeFigureOut">
               <a:rPr lang="fr-FR" smtClean="0"/>
               <a:pPr/>
-              <a:t>30/12/2016</a:t>
+              <a:t>31/01/2017</a:t>
             </a:fld>
             <a:endParaRPr lang="fr-FR" dirty="0"/>
           </a:p>
@@ -12263,7 +12432,7 @@
             <a:fld id="{D8E3BBD6-5DF7-411E-B793-6A3558CCCDCA}" type="datetimeFigureOut">
               <a:rPr lang="fr-FR" smtClean="0"/>
               <a:pPr/>
-              <a:t>30/12/2016</a:t>
+              <a:t>31/01/2017</a:t>
             </a:fld>
             <a:endParaRPr lang="fr-FR" dirty="0"/>
           </a:p>
@@ -14050,7 +14219,7 @@
             <a:fld id="{D8E3BBD6-5DF7-411E-B793-6A3558CCCDCA}" type="datetimeFigureOut">
               <a:rPr lang="fr-FR" smtClean="0"/>
               <a:pPr/>
-              <a:t>30/12/2016</a:t>
+              <a:t>31/01/2017</a:t>
             </a:fld>
             <a:endParaRPr lang="fr-FR" dirty="0"/>
           </a:p>
@@ -14130,7 +14299,7 @@
             <a:fld id="{D8E3BBD6-5DF7-411E-B793-6A3558CCCDCA}" type="datetimeFigureOut">
               <a:rPr lang="fr-FR" smtClean="0"/>
               <a:pPr/>
-              <a:t>30/12/2016</a:t>
+              <a:t>31/01/2017</a:t>
             </a:fld>
             <a:endParaRPr lang="fr-FR" dirty="0"/>
           </a:p>
@@ -14392,7 +14561,7 @@
             <a:fld id="{D8E3BBD6-5DF7-411E-B793-6A3558CCCDCA}" type="datetimeFigureOut">
               <a:rPr lang="fr-FR" smtClean="0"/>
               <a:pPr/>
-              <a:t>30/12/2016</a:t>
+              <a:t>31/01/2017</a:t>
             </a:fld>
             <a:endParaRPr lang="fr-FR" dirty="0"/>
           </a:p>
@@ -14635,7 +14804,7 @@
             <a:fld id="{D8E3BBD6-5DF7-411E-B793-6A3558CCCDCA}" type="datetimeFigureOut">
               <a:rPr lang="fr-FR" smtClean="0"/>
               <a:pPr/>
-              <a:t>30/12/2016</a:t>
+              <a:t>31/01/2017</a:t>
             </a:fld>
             <a:endParaRPr lang="fr-FR" dirty="0"/>
           </a:p>
@@ -14837,7 +15006,7 @@
             <a:fld id="{D8E3BBD6-5DF7-411E-B793-6A3558CCCDCA}" type="datetimeFigureOut">
               <a:rPr lang="fr-FR" smtClean="0"/>
               <a:pPr/>
-              <a:t>30/12/2016</a:t>
+              <a:t>31/01/2017</a:t>
             </a:fld>
             <a:endParaRPr lang="fr-FR" dirty="0"/>
           </a:p>
@@ -19362,11 +19531,7 @@
           <a:p>
             <a:r>
               <a:rPr lang="en-US" dirty="0" smtClean="0"/>
-              <a:t>PowerPoint Templates – </a:t>
-            </a:r>
-            <a:r>
-              <a:rPr lang="en-US" dirty="0" smtClean="0"/>
-              <a:t>Text</a:t>
+              <a:t>PowerPoint Templates – Text</a:t>
             </a:r>
             <a:endParaRPr lang="en-US" dirty="0"/>
           </a:p>
@@ -20630,11 +20795,7 @@
           <a:p>
             <a:r>
               <a:rPr lang="en-US" dirty="0" smtClean="0"/>
-              <a:t>PowerPoint Templates – </a:t>
-            </a:r>
-            <a:r>
-              <a:rPr lang="en-US" dirty="0" smtClean="0"/>
-              <a:t>Text</a:t>
+              <a:t>PowerPoint Templates – Text</a:t>
             </a:r>
             <a:endParaRPr lang="en-US" dirty="0"/>
           </a:p>
@@ -21958,11 +22119,7 @@
           <a:p>
             <a:r>
               <a:rPr lang="en-US" dirty="0" smtClean="0"/>
-              <a:t>PowerPoint Templates – </a:t>
-            </a:r>
-            <a:r>
-              <a:rPr lang="en-US" dirty="0" smtClean="0"/>
-              <a:t>Text</a:t>
+              <a:t>PowerPoint Templates – Text</a:t>
             </a:r>
             <a:endParaRPr lang="en-US" dirty="0"/>
           </a:p>
@@ -22665,11 +22822,7 @@
           <a:p>
             <a:r>
               <a:rPr lang="fr-FR" dirty="0" smtClean="0"/>
-              <a:t>PowerPoint Templates – </a:t>
-            </a:r>
-            <a:r>
-              <a:rPr lang="fr-FR" dirty="0" smtClean="0"/>
-              <a:t>Graphics</a:t>
+              <a:t>PowerPoint Templates – Graphics</a:t>
             </a:r>
             <a:endParaRPr lang="fr-FR" dirty="0"/>
           </a:p>
@@ -22780,11 +22933,7 @@
           <a:p>
             <a:r>
               <a:rPr lang="en-US" dirty="0" smtClean="0"/>
-              <a:t>PowerPoint Templates – </a:t>
-            </a:r>
-            <a:r>
-              <a:rPr lang="en-US" dirty="0" smtClean="0"/>
-              <a:t>Graphics</a:t>
+              <a:t>PowerPoint Templates – Graphics</a:t>
             </a:r>
             <a:endParaRPr lang="en-US" dirty="0"/>
           </a:p>
@@ -23216,11 +23365,7 @@
           <a:p>
             <a:r>
               <a:rPr lang="en-US" dirty="0" smtClean="0"/>
-              <a:t>PowerPoint Templates – </a:t>
-            </a:r>
-            <a:r>
-              <a:rPr lang="en-US" dirty="0" smtClean="0"/>
-              <a:t>Graphics</a:t>
+              <a:t>PowerPoint Templates – Graphics</a:t>
             </a:r>
             <a:endParaRPr lang="en-US" dirty="0"/>
           </a:p>
@@ -23661,11 +23806,7 @@
           <a:p>
             <a:r>
               <a:rPr lang="fr-FR" dirty="0" smtClean="0"/>
-              <a:t>PowerPoint Templates – </a:t>
-            </a:r>
-            <a:r>
-              <a:rPr lang="fr-FR" dirty="0" smtClean="0"/>
-              <a:t>Graphics</a:t>
+              <a:t>PowerPoint Templates – Graphics</a:t>
             </a:r>
             <a:endParaRPr lang="fr-FR" dirty="0"/>
           </a:p>
@@ -24089,22 +24230,24 @@
       </p:grpSpPr>
       <p:sp>
         <p:nvSpPr>
-          <p:cNvPr id="11" name="Subtitle 10"/>
+          <p:cNvPr id="24" name="Title 1"/>
           <p:cNvSpPr>
             <a:spLocks noGrp="1"/>
           </p:cNvSpPr>
           <p:nvPr>
-            <p:ph type="subTitle" idx="1"/>
+            <p:ph type="title"/>
           </p:nvPr>
         </p:nvSpPr>
         <p:spPr/>
         <p:txBody>
-          <a:bodyPr/>
+          <a:bodyPr>
+            <a:normAutofit/>
+          </a:bodyPr>
           <a:lstStyle/>
           <a:p>
             <a:r>
               <a:rPr lang="en-US" dirty="0" smtClean="0"/>
-              <a:t>Table Templates</a:t>
+              <a:t>PowerPoint Templates – Graphics</a:t>
             </a:r>
             <a:endParaRPr lang="en-US" dirty="0"/>
           </a:p>
@@ -24112,28 +24255,303 @@
       </p:sp>
       <p:sp>
         <p:nvSpPr>
-          <p:cNvPr id="10" name="Title 9"/>
-          <p:cNvSpPr>
-            <a:spLocks noGrp="1"/>
-          </p:cNvSpPr>
+          <p:cNvPr id="33" name="Rounded Rectangle 32"/>
+          <p:cNvSpPr/>
+          <p:nvPr/>
+        </p:nvSpPr>
+        <p:spPr>
+          <a:xfrm>
+            <a:off x="276935" y="908720"/>
+            <a:ext cx="8327272" cy="5585266"/>
+          </a:xfrm>
+          <a:prstGeom prst="roundRect">
+            <a:avLst>
+              <a:gd name="adj" fmla="val 3762"/>
+            </a:avLst>
+          </a:prstGeom>
+          <a:solidFill>
+            <a:schemeClr val="bg1">
+              <a:lumMod val="95000"/>
+            </a:schemeClr>
+          </a:solidFill>
+          <a:ln>
+            <a:noFill/>
+          </a:ln>
+          <a:effectLst/>
+        </p:spPr>
+        <p:style>
+          <a:lnRef idx="1">
+            <a:schemeClr val="accent5"/>
+          </a:lnRef>
+          <a:fillRef idx="3">
+            <a:schemeClr val="accent5"/>
+          </a:fillRef>
+          <a:effectRef idx="2">
+            <a:schemeClr val="accent5"/>
+          </a:effectRef>
+          <a:fontRef idx="minor">
+            <a:schemeClr val="lt1"/>
+          </a:fontRef>
+        </p:style>
+        <p:txBody>
+          <a:bodyPr rtlCol="0" anchor="ctr"/>
+          <a:lstStyle/>
+          <a:p>
+            <a:pPr algn="ctr"/>
+            <a:endParaRPr lang="en-US" dirty="0">
+              <a:solidFill>
+                <a:schemeClr val="lt1"/>
+              </a:solidFill>
+            </a:endParaRPr>
+          </a:p>
+        </p:txBody>
+      </p:sp>
+      <p:sp>
+        <p:nvSpPr>
+          <p:cNvPr id="34" name="TextBox 33"/>
+          <p:cNvSpPr txBox="1"/>
+          <p:nvPr/>
+        </p:nvSpPr>
+        <p:spPr>
+          <a:xfrm>
+            <a:off x="251520" y="1052736"/>
+            <a:ext cx="8143200" cy="369332"/>
+          </a:xfrm>
+          <a:prstGeom prst="rect">
+            <a:avLst/>
+          </a:prstGeom>
+          <a:noFill/>
+        </p:spPr>
+        <p:txBody>
+          <a:bodyPr wrap="square" lIns="180000" rIns="180000" rtlCol="0">
+            <a:spAutoFit/>
+          </a:bodyPr>
+          <a:lstStyle>
+            <a:defPPr>
+              <a:defRPr lang="fr-FR"/>
+            </a:defPPr>
+            <a:lvl1pPr>
+              <a:defRPr sz="2000" b="1">
+                <a:solidFill>
+                  <a:schemeClr val="tx1">
+                    <a:lumMod val="75000"/>
+                    <a:lumOff val="25000"/>
+                  </a:schemeClr>
+                </a:solidFill>
+              </a:defRPr>
+            </a:lvl1pPr>
+          </a:lstStyle>
+          <a:p>
+            <a:r>
+              <a:rPr lang="en-US" sz="1800" dirty="0" smtClean="0"/>
+              <a:t>List of applications regarding a specific indicator</a:t>
+            </a:r>
+            <a:endParaRPr lang="en-US" sz="1800" dirty="0"/>
+          </a:p>
+        </p:txBody>
+      </p:sp>
+      <p:sp>
+        <p:nvSpPr>
+          <p:cNvPr id="36" name="TextBox 35"/>
+          <p:cNvSpPr txBox="1"/>
+          <p:nvPr/>
+        </p:nvSpPr>
+        <p:spPr>
+          <a:xfrm>
+            <a:off x="1907704" y="1484784"/>
+            <a:ext cx="6630534" cy="369332"/>
+          </a:xfrm>
+          <a:prstGeom prst="rect">
+            <a:avLst/>
+          </a:prstGeom>
+          <a:noFill/>
+        </p:spPr>
+        <p:txBody>
+          <a:bodyPr wrap="square" rtlCol="0">
+            <a:spAutoFit/>
+          </a:bodyPr>
+          <a:lstStyle>
+            <a:defPPr>
+              <a:defRPr lang="fr-FR"/>
+            </a:defPPr>
+            <a:lvl1pPr>
+              <a:defRPr sz="2000" b="1">
+                <a:solidFill>
+                  <a:srgbClr val="5E5E5E"/>
+                </a:solidFill>
+              </a:defRPr>
+            </a:lvl1pPr>
+          </a:lstStyle>
+          <a:p>
+            <a:r>
+              <a:rPr lang="en-US" sz="1800" dirty="0" smtClean="0"/>
+              <a:t>PF_BAR_CHART</a:t>
+            </a:r>
+            <a:endParaRPr lang="en-US" sz="1800" dirty="0"/>
+          </a:p>
+        </p:txBody>
+      </p:sp>
+      <p:sp>
+        <p:nvSpPr>
+          <p:cNvPr id="37" name="TextBox 36"/>
+          <p:cNvSpPr txBox="1"/>
+          <p:nvPr/>
+        </p:nvSpPr>
+        <p:spPr>
+          <a:xfrm>
+            <a:off x="395536" y="1475492"/>
+            <a:ext cx="1556836" cy="369332"/>
+          </a:xfrm>
+          <a:prstGeom prst="rect">
+            <a:avLst/>
+          </a:prstGeom>
+          <a:noFill/>
+        </p:spPr>
+        <p:txBody>
+          <a:bodyPr wrap="none" rtlCol="0">
+            <a:spAutoFit/>
+          </a:bodyPr>
+          <a:lstStyle>
+            <a:defPPr>
+              <a:defRPr lang="fr-FR"/>
+            </a:defPPr>
+            <a:lvl1pPr algn="r">
+              <a:defRPr sz="2000">
+                <a:solidFill>
+                  <a:schemeClr val="bg1">
+                    <a:lumMod val="50000"/>
+                  </a:schemeClr>
+                </a:solidFill>
+              </a:defRPr>
+            </a:lvl1pPr>
+          </a:lstStyle>
+          <a:p>
+            <a:r>
+              <a:rPr lang="en-US" sz="1800" dirty="0" smtClean="0"/>
+              <a:t>Block Name :</a:t>
+            </a:r>
+            <a:endParaRPr lang="en-US" sz="1800" dirty="0"/>
+          </a:p>
+        </p:txBody>
+      </p:sp>
+      <p:sp>
+        <p:nvSpPr>
+          <p:cNvPr id="38" name="TextBox 37"/>
+          <p:cNvSpPr txBox="1"/>
+          <p:nvPr/>
+        </p:nvSpPr>
+        <p:spPr>
+          <a:xfrm>
+            <a:off x="1907704" y="1835532"/>
+            <a:ext cx="6192688" cy="646331"/>
+          </a:xfrm>
+          <a:prstGeom prst="rect">
+            <a:avLst/>
+          </a:prstGeom>
+          <a:noFill/>
+        </p:spPr>
+        <p:txBody>
+          <a:bodyPr wrap="square" rtlCol="0">
+            <a:spAutoFit/>
+          </a:bodyPr>
+          <a:lstStyle>
+            <a:defPPr>
+              <a:defRPr lang="fr-FR"/>
+            </a:defPPr>
+            <a:lvl1pPr>
+              <a:defRPr sz="2000" i="1">
+                <a:solidFill>
+                  <a:schemeClr val="bg1">
+                    <a:lumMod val="50000"/>
+                  </a:schemeClr>
+                </a:solidFill>
+              </a:defRPr>
+            </a:lvl1pPr>
+          </a:lstStyle>
+          <a:p>
+            <a:r>
+              <a:rPr lang="en-US" sz="1800" b="1" dirty="0" smtClean="0"/>
+              <a:t>METRIC=ID</a:t>
+            </a:r>
+            <a:r>
+              <a:rPr lang="en-US" sz="1800" dirty="0" smtClean="0"/>
+              <a:t> (where ID can be a quality indicator or a background fact)</a:t>
+            </a:r>
+            <a:endParaRPr lang="en-US" sz="1800" dirty="0"/>
+          </a:p>
+        </p:txBody>
+      </p:sp>
+      <p:sp>
+        <p:nvSpPr>
+          <p:cNvPr id="39" name="TextBox 38"/>
+          <p:cNvSpPr txBox="1"/>
+          <p:nvPr/>
+        </p:nvSpPr>
+        <p:spPr>
+          <a:xfrm>
+            <a:off x="827584" y="1835532"/>
+            <a:ext cx="1107996" cy="369332"/>
+          </a:xfrm>
+          <a:prstGeom prst="rect">
+            <a:avLst/>
+          </a:prstGeom>
+          <a:noFill/>
+        </p:spPr>
+        <p:txBody>
+          <a:bodyPr wrap="none" rtlCol="0">
+            <a:spAutoFit/>
+          </a:bodyPr>
+          <a:lstStyle>
+            <a:defPPr>
+              <a:defRPr lang="fr-FR"/>
+            </a:defPPr>
+            <a:lvl1pPr algn="r">
+              <a:defRPr sz="2000">
+                <a:solidFill>
+                  <a:schemeClr val="bg1">
+                    <a:lumMod val="50000"/>
+                  </a:schemeClr>
+                </a:solidFill>
+              </a:defRPr>
+            </a:lvl1pPr>
+          </a:lstStyle>
+          <a:p>
+            <a:r>
+              <a:rPr lang="en-US" sz="1800" dirty="0" smtClean="0"/>
+              <a:t>Options :</a:t>
+            </a:r>
+            <a:endParaRPr lang="en-US" sz="1800" dirty="0"/>
+          </a:p>
+        </p:txBody>
+      </p:sp>
+      <p:graphicFrame>
+        <p:nvGraphicFramePr>
+          <p:cNvPr id="10" name="Chart 9" descr="GRAPH;PF_BAR_CHART;METRIC=60014"/>
+          <p:cNvGraphicFramePr/>
           <p:nvPr>
-            <p:ph type="ctrTitle" sz="quarter"/>
+            <p:extLst>
+              <p:ext uri="{D42A27DB-BD31-4B8C-83A1-F6EECF244321}">
+                <p14:modId xmlns:p14="http://schemas.microsoft.com/office/powerpoint/2010/main" val="1818613036"/>
+              </p:ext>
+            </p:extLst>
           </p:nvPr>
-        </p:nvSpPr>
-        <p:spPr/>
-        <p:txBody>
-          <a:bodyPr/>
-          <a:lstStyle/>
-          <a:p>
-            <a:r>
-              <a:rPr lang="en-US" dirty="0" smtClean="0"/>
-              <a:t>PowerPoint Templates</a:t>
-            </a:r>
-            <a:endParaRPr lang="en-US" dirty="0"/>
-          </a:p>
-        </p:txBody>
-      </p:sp>
+        </p:nvGraphicFramePr>
+        <p:xfrm>
+          <a:off x="539552" y="2497280"/>
+          <a:ext cx="7945188" cy="3795237"/>
+        </p:xfrm>
+        <a:graphic>
+          <a:graphicData uri="http://schemas.openxmlformats.org/drawingml/2006/chart">
+            <c:chart xmlns:c="http://schemas.openxmlformats.org/drawingml/2006/chart" xmlns:r="http://schemas.openxmlformats.org/officeDocument/2006/relationships" r:id="rId2"/>
+          </a:graphicData>
+        </a:graphic>
+      </p:graphicFrame>
     </p:spTree>
+    <p:extLst>
+      <p:ext uri="{BB962C8B-B14F-4D97-AF65-F5344CB8AC3E}">
+        <p14:creationId xmlns:p14="http://schemas.microsoft.com/office/powerpoint/2010/main" val="4039169699"/>
+      </p:ext>
+    </p:extLst>
   </p:cSld>
   <p:clrMapOvr>
     <a:masterClrMapping/>
@@ -24167,89 +24585,47 @@
       </p:grpSpPr>
       <p:sp>
         <p:nvSpPr>
-          <p:cNvPr id="2" name="Title 1"/>
+          <p:cNvPr id="11" name="Subtitle 10"/>
           <p:cNvSpPr>
             <a:spLocks noGrp="1"/>
           </p:cNvSpPr>
           <p:nvPr>
-            <p:ph type="title"/>
+            <p:ph type="subTitle" idx="1"/>
           </p:nvPr>
         </p:nvSpPr>
         <p:spPr/>
         <p:txBody>
-          <a:bodyPr>
-            <a:normAutofit/>
-          </a:bodyPr>
+          <a:bodyPr/>
           <a:lstStyle/>
           <a:p>
             <a:r>
-              <a:rPr lang="fr-FR" dirty="0" smtClean="0"/>
-              <a:t>PowerPoint Templates – </a:t>
-            </a:r>
-            <a:r>
-              <a:rPr lang="fr-FR" dirty="0" smtClean="0"/>
-              <a:t>Tables</a:t>
-            </a:r>
-            <a:endParaRPr lang="fr-FR" dirty="0"/>
-          </a:p>
-        </p:txBody>
-      </p:sp>
-      <p:sp>
-        <p:nvSpPr>
-          <p:cNvPr id="78" name="Content Placeholder 77"/>
+              <a:rPr lang="en-US" dirty="0" smtClean="0"/>
+              <a:t>Table Templates</a:t>
+            </a:r>
+            <a:endParaRPr lang="en-US" dirty="0"/>
+          </a:p>
+        </p:txBody>
+      </p:sp>
+      <p:sp>
+        <p:nvSpPr>
+          <p:cNvPr id="10" name="Title 9"/>
           <p:cNvSpPr>
             <a:spLocks noGrp="1"/>
           </p:cNvSpPr>
           <p:nvPr>
-            <p:ph type="body" sz="quarter" idx="11"/>
+            <p:ph type="ctrTitle" sz="quarter"/>
           </p:nvPr>
         </p:nvSpPr>
-        <p:spPr>
-          <a:xfrm>
-            <a:off x="325438" y="907126"/>
-            <a:ext cx="8504237" cy="2208297"/>
-          </a:xfrm>
-        </p:spPr>
+        <p:spPr/>
         <p:txBody>
           <a:bodyPr/>
           <a:lstStyle/>
           <a:p>
             <a:r>
-              <a:rPr lang="fr-FR" sz="2400" dirty="0" smtClean="0"/>
-              <a:t>This kind of template is identified by a type value as</a:t>
-            </a:r>
-            <a:br>
-              <a:rPr lang="fr-FR" sz="2400" dirty="0" smtClean="0"/>
-            </a:br>
-            <a:r>
-              <a:rPr lang="fr-FR" sz="2400" dirty="0" smtClean="0"/>
-              <a:t>			</a:t>
-            </a:r>
-          </a:p>
-          <a:p>
-            <a:pPr marL="0" indent="0">
-              <a:buNone/>
-            </a:pPr>
-            <a:r>
-              <a:rPr lang="fr-FR" sz="2400" dirty="0" smtClean="0"/>
-              <a:t>			Type = </a:t>
-            </a:r>
-            <a:r>
-              <a:rPr lang="fr-FR" sz="2400" b="1" dirty="0" smtClean="0"/>
-              <a:t>TABLE</a:t>
-            </a:r>
-          </a:p>
-          <a:p>
-            <a:pPr marL="0" indent="0">
-              <a:buNone/>
-            </a:pPr>
-            <a:endParaRPr lang="fr-FR" sz="2400" b="1" dirty="0" smtClean="0"/>
-          </a:p>
-          <a:p>
-            <a:pPr marL="0" indent="0">
-              <a:buNone/>
-            </a:pPr>
-            <a:endParaRPr lang="fr-FR" sz="2400" b="1" dirty="0" smtClean="0"/>
+              <a:rPr lang="en-US" dirty="0" smtClean="0"/>
+              <a:t>PowerPoint Templates</a:t>
+            </a:r>
+            <a:endParaRPr lang="en-US" dirty="0"/>
           </a:p>
         </p:txBody>
       </p:sp>
@@ -24377,6 +24753,122 @@
       </p:grpSpPr>
       <p:sp>
         <p:nvSpPr>
+          <p:cNvPr id="2" name="Title 1"/>
+          <p:cNvSpPr>
+            <a:spLocks noGrp="1"/>
+          </p:cNvSpPr>
+          <p:nvPr>
+            <p:ph type="title"/>
+          </p:nvPr>
+        </p:nvSpPr>
+        <p:spPr/>
+        <p:txBody>
+          <a:bodyPr>
+            <a:normAutofit/>
+          </a:bodyPr>
+          <a:lstStyle/>
+          <a:p>
+            <a:r>
+              <a:rPr lang="fr-FR" dirty="0" smtClean="0"/>
+              <a:t>PowerPoint Templates – Tables</a:t>
+            </a:r>
+            <a:endParaRPr lang="fr-FR" dirty="0"/>
+          </a:p>
+        </p:txBody>
+      </p:sp>
+      <p:sp>
+        <p:nvSpPr>
+          <p:cNvPr id="78" name="Content Placeholder 77"/>
+          <p:cNvSpPr>
+            <a:spLocks noGrp="1"/>
+          </p:cNvSpPr>
+          <p:nvPr>
+            <p:ph type="body" sz="quarter" idx="11"/>
+          </p:nvPr>
+        </p:nvSpPr>
+        <p:spPr>
+          <a:xfrm>
+            <a:off x="325438" y="907126"/>
+            <a:ext cx="8504237" cy="2208297"/>
+          </a:xfrm>
+        </p:spPr>
+        <p:txBody>
+          <a:bodyPr/>
+          <a:lstStyle/>
+          <a:p>
+            <a:r>
+              <a:rPr lang="fr-FR" sz="2400" dirty="0" smtClean="0"/>
+              <a:t>This kind of template is identified by a type value as</a:t>
+            </a:r>
+            <a:br>
+              <a:rPr lang="fr-FR" sz="2400" dirty="0" smtClean="0"/>
+            </a:br>
+            <a:r>
+              <a:rPr lang="fr-FR" sz="2400" dirty="0" smtClean="0"/>
+              <a:t>			</a:t>
+            </a:r>
+          </a:p>
+          <a:p>
+            <a:pPr marL="0" indent="0">
+              <a:buNone/>
+            </a:pPr>
+            <a:r>
+              <a:rPr lang="fr-FR" sz="2400" dirty="0" smtClean="0"/>
+              <a:t>			Type = </a:t>
+            </a:r>
+            <a:r>
+              <a:rPr lang="fr-FR" sz="2400" b="1" dirty="0" smtClean="0"/>
+              <a:t>TABLE</a:t>
+            </a:r>
+          </a:p>
+          <a:p>
+            <a:pPr marL="0" indent="0">
+              <a:buNone/>
+            </a:pPr>
+            <a:endParaRPr lang="fr-FR" sz="2400" b="1" dirty="0" smtClean="0"/>
+          </a:p>
+          <a:p>
+            <a:pPr marL="0" indent="0">
+              <a:buNone/>
+            </a:pPr>
+            <a:endParaRPr lang="fr-FR" sz="2400" b="1" dirty="0" smtClean="0"/>
+          </a:p>
+        </p:txBody>
+      </p:sp>
+    </p:spTree>
+  </p:cSld>
+  <p:clrMapOvr>
+    <a:masterClrMapping/>
+  </p:clrMapOvr>
+  <p:timing>
+    <p:tnLst>
+      <p:par>
+        <p:cTn id="1" dur="indefinite" restart="never" nodeType="tmRoot"/>
+      </p:par>
+    </p:tnLst>
+  </p:timing>
+</p:sld>
+</file>
+
+<file path=ppt/slides/slide21.xml><?xml version="1.0" encoding="utf-8"?>
+<p:sld xmlns:a="http://schemas.openxmlformats.org/drawingml/2006/main" xmlns:r="http://schemas.openxmlformats.org/officeDocument/2006/relationships" xmlns:p="http://schemas.openxmlformats.org/presentationml/2006/main">
+  <p:cSld>
+    <p:spTree>
+      <p:nvGrpSpPr>
+        <p:cNvPr id="1" name=""/>
+        <p:cNvGrpSpPr/>
+        <p:nvPr/>
+      </p:nvGrpSpPr>
+      <p:grpSpPr>
+        <a:xfrm>
+          <a:off x="0" y="0"/>
+          <a:ext cx="0" cy="0"/>
+          <a:chOff x="0" y="0"/>
+          <a:chExt cx="0" cy="0"/>
+        </a:xfrm>
+      </p:grpSpPr>
+      <p:sp>
+        <p:nvSpPr>
           <p:cNvPr id="24" name="Title 1"/>
           <p:cNvSpPr>
             <a:spLocks noGrp="1"/>
@@ -24394,11 +24886,7 @@
           <a:p>
             <a:r>
               <a:rPr lang="en-US" dirty="0" smtClean="0"/>
-              <a:t>PowerPoint Templates – </a:t>
-            </a:r>
-            <a:r>
-              <a:rPr lang="en-US" dirty="0" smtClean="0"/>
-              <a:t>Tables</a:t>
+              <a:t>PowerPoint Templates – Tables</a:t>
             </a:r>
             <a:endParaRPr lang="en-US" dirty="0"/>
           </a:p>
@@ -26189,7 +26677,7 @@
 </p:sld>
 </file>
 
-<file path=ppt/slides/slide21.xml><?xml version="1.0" encoding="utf-8"?>
+<file path=ppt/slides/slide22.xml><?xml version="1.0" encoding="utf-8"?>
 <p:sld xmlns:a="http://schemas.openxmlformats.org/drawingml/2006/main" xmlns:r="http://schemas.openxmlformats.org/officeDocument/2006/relationships" xmlns:p="http://schemas.openxmlformats.org/presentationml/2006/main">
   <p:cSld>
     <p:spTree>
@@ -26225,11 +26713,7 @@
           <a:p>
             <a:r>
               <a:rPr lang="en-US" dirty="0" smtClean="0"/>
-              <a:t>PowerPoint Templates – </a:t>
-            </a:r>
-            <a:r>
-              <a:rPr lang="en-US" dirty="0" smtClean="0"/>
-              <a:t>Tables</a:t>
+              <a:t>PowerPoint Templates – Tables</a:t>
             </a:r>
             <a:endParaRPr lang="en-US" dirty="0"/>
           </a:p>
@@ -28351,7 +28835,7 @@
 </p:sld>
 </file>
 
-<file path=ppt/slides/slide22.xml><?xml version="1.0" encoding="utf-8"?>
+<file path=ppt/slides/slide23.xml><?xml version="1.0" encoding="utf-8"?>
 <p:sld xmlns:a="http://schemas.openxmlformats.org/drawingml/2006/main" xmlns:r="http://schemas.openxmlformats.org/officeDocument/2006/relationships" xmlns:p="http://schemas.openxmlformats.org/presentationml/2006/main">
   <p:cSld>
     <p:spTree>
@@ -28402,7 +28886,7 @@
                   <a:prstClr val="black"/>
                 </a:buClr>
               </a:pPr>
-              <a:t>22</a:t>
+              <a:t>23</a:t>
             </a:fld>
             <a:endParaRPr lang="en-US" dirty="0">
               <a:solidFill>
@@ -28604,7 +29088,7 @@
 </p:sld>
 </file>
 
-<file path=ppt/slides/slide23.xml><?xml version="1.0" encoding="utf-8"?>
+<file path=ppt/slides/slide24.xml><?xml version="1.0" encoding="utf-8"?>
 <p:sld xmlns:a="http://schemas.openxmlformats.org/drawingml/2006/main" xmlns:r="http://schemas.openxmlformats.org/officeDocument/2006/relationships" xmlns:p="http://schemas.openxmlformats.org/presentationml/2006/main">
   <p:cSld>
     <p:spTree>
@@ -28640,11 +29124,7 @@
           <a:p>
             <a:r>
               <a:rPr lang="en-US" dirty="0" smtClean="0"/>
-              <a:t>PowerPoint Templates – </a:t>
-            </a:r>
-            <a:r>
-              <a:rPr lang="en-US" dirty="0" smtClean="0"/>
-              <a:t>Tables</a:t>
+              <a:t>PowerPoint Templates – Tables</a:t>
             </a:r>
             <a:endParaRPr lang="en-US" dirty="0"/>
           </a:p>
@@ -29751,7 +30231,7 @@
 </p:sld>
 </file>
 
-<file path=ppt/slides/slide24.xml><?xml version="1.0" encoding="utf-8"?>
+<file path=ppt/slides/slide25.xml><?xml version="1.0" encoding="utf-8"?>
 <p:sld xmlns:a="http://schemas.openxmlformats.org/drawingml/2006/main" xmlns:r="http://schemas.openxmlformats.org/officeDocument/2006/relationships" xmlns:p="http://schemas.openxmlformats.org/presentationml/2006/main">
   <p:cSld>
     <p:spTree>
@@ -29802,7 +30282,7 @@
                   <a:prstClr val="black"/>
                 </a:buClr>
               </a:pPr>
-              <a:t>24</a:t>
+              <a:t>25</a:t>
             </a:fld>
             <a:endParaRPr lang="en-US" dirty="0">
               <a:solidFill>

</xml_diff>

<commit_message>
REPORTGEN-548 : close master view in report
</commit_message>
<xml_diff>
--- a/CastReporting.Reporting/PortfolioTemplatesFiles/1- Portfolio-Powerpoint-components-library.pptx
+++ b/CastReporting.Reporting/PortfolioTemplatesFiles/1- Portfolio-Powerpoint-components-library.pptx
@@ -2180,7 +2180,7 @@
           <a:p>
             <a:fld id="{268042A1-6D91-4513-A62D-1E3FD70C84BE}" type="datetimeFigureOut">
               <a:rPr lang="fr-FR" smtClean="0"/>
-              <a:t>21/01/2019</a:t>
+              <a:t>09/04/2019</a:t>
             </a:fld>
             <a:endParaRPr lang="fr-FR"/>
           </a:p>
@@ -2778,7 +2778,7 @@
             <a:fld id="{D8E3BBD6-5DF7-411E-B793-6A3558CCCDCA}" type="datetimeFigureOut">
               <a:rPr lang="fr-FR" smtClean="0"/>
               <a:pPr/>
-              <a:t>21/01/2019</a:t>
+              <a:t>09/04/2019</a:t>
             </a:fld>
             <a:endParaRPr lang="fr-FR" dirty="0"/>
           </a:p>
@@ -2941,7 +2941,7 @@
             <a:fld id="{D8E3BBD6-5DF7-411E-B793-6A3558CCCDCA}" type="datetimeFigureOut">
               <a:rPr lang="fr-FR" smtClean="0"/>
               <a:pPr/>
-              <a:t>21/01/2019</a:t>
+              <a:t>09/04/2019</a:t>
             </a:fld>
             <a:endParaRPr lang="fr-FR" dirty="0"/>
           </a:p>
@@ -4446,7 +4446,7 @@
             <a:fld id="{D8E3BBD6-5DF7-411E-B793-6A3558CCCDCA}" type="datetimeFigureOut">
               <a:rPr lang="fr-FR" smtClean="0"/>
               <a:pPr/>
-              <a:t>21/01/2019</a:t>
+              <a:t>09/04/2019</a:t>
             </a:fld>
             <a:endParaRPr lang="fr-FR" dirty="0"/>
           </a:p>
@@ -6806,7 +6806,7 @@
             <a:fld id="{D8E3BBD6-5DF7-411E-B793-6A3558CCCDCA}" type="datetimeFigureOut">
               <a:rPr lang="fr-FR" smtClean="0"/>
               <a:pPr/>
-              <a:t>21/01/2019</a:t>
+              <a:t>09/04/2019</a:t>
             </a:fld>
             <a:endParaRPr lang="fr-FR" dirty="0"/>
           </a:p>
@@ -9432,7 +9432,7 @@
             <a:fld id="{D8E3BBD6-5DF7-411E-B793-6A3558CCCDCA}" type="datetimeFigureOut">
               <a:rPr lang="fr-FR" smtClean="0"/>
               <a:pPr/>
-              <a:t>21/01/2019</a:t>
+              <a:t>09/04/2019</a:t>
             </a:fld>
             <a:endParaRPr lang="fr-FR" dirty="0"/>
           </a:p>
@@ -12341,7 +12341,7 @@
             <a:fld id="{D8E3BBD6-5DF7-411E-B793-6A3558CCCDCA}" type="datetimeFigureOut">
               <a:rPr lang="fr-FR" smtClean="0"/>
               <a:pPr/>
-              <a:t>21/01/2019</a:t>
+              <a:t>09/04/2019</a:t>
             </a:fld>
             <a:endParaRPr lang="fr-FR" dirty="0"/>
           </a:p>
@@ -14125,7 +14125,7 @@
             <a:fld id="{D8E3BBD6-5DF7-411E-B793-6A3558CCCDCA}" type="datetimeFigureOut">
               <a:rPr lang="fr-FR" smtClean="0"/>
               <a:pPr/>
-              <a:t>21/01/2019</a:t>
+              <a:t>09/04/2019</a:t>
             </a:fld>
             <a:endParaRPr lang="fr-FR" dirty="0"/>
           </a:p>
@@ -14205,7 +14205,7 @@
             <a:fld id="{D8E3BBD6-5DF7-411E-B793-6A3558CCCDCA}" type="datetimeFigureOut">
               <a:rPr lang="fr-FR" smtClean="0"/>
               <a:pPr/>
-              <a:t>21/01/2019</a:t>
+              <a:t>09/04/2019</a:t>
             </a:fld>
             <a:endParaRPr lang="fr-FR" dirty="0"/>
           </a:p>
@@ -14465,7 +14465,7 @@
             <a:fld id="{D8E3BBD6-5DF7-411E-B793-6A3558CCCDCA}" type="datetimeFigureOut">
               <a:rPr lang="fr-FR" smtClean="0"/>
               <a:pPr/>
-              <a:t>21/01/2019</a:t>
+              <a:t>09/04/2019</a:t>
             </a:fld>
             <a:endParaRPr lang="fr-FR" dirty="0"/>
           </a:p>
@@ -14707,7 +14707,7 @@
             <a:fld id="{D8E3BBD6-5DF7-411E-B793-6A3558CCCDCA}" type="datetimeFigureOut">
               <a:rPr lang="fr-FR" smtClean="0"/>
               <a:pPr/>
-              <a:t>21/01/2019</a:t>
+              <a:t>09/04/2019</a:t>
             </a:fld>
             <a:endParaRPr lang="fr-FR" dirty="0"/>
           </a:p>
@@ -14909,7 +14909,7 @@
             <a:fld id="{D8E3BBD6-5DF7-411E-B793-6A3558CCCDCA}" type="datetimeFigureOut">
               <a:rPr lang="fr-FR" smtClean="0"/>
               <a:pPr/>
-              <a:t>21/01/2019</a:t>
+              <a:t>09/04/2019</a:t>
             </a:fld>
             <a:endParaRPr lang="fr-FR" dirty="0"/>
           </a:p>

</xml_diff>